<commit_message>
Comment main.go, server.go, and modify presentation
</commit_message>
<xml_diff>
--- a/software-engineering-final.pptx
+++ b/software-engineering-final.pptx
@@ -254,7 +254,7 @@
           <a:p>
             <a:fld id="{94ABC641-97F1-8C45-A694-1B07B93F9841}" type="datetimeFigureOut">
               <a:rPr lang="en-US" smtClean="0"/>
-              <a:t>5/1/17</a:t>
+              <a:t>5/1/2017</a:t>
             </a:fld>
             <a:endParaRPr lang="en-US"/>
           </a:p>
@@ -424,7 +424,7 @@
           <a:p>
             <a:fld id="{94ABC641-97F1-8C45-A694-1B07B93F9841}" type="datetimeFigureOut">
               <a:rPr lang="en-US" smtClean="0"/>
-              <a:t>5/1/17</a:t>
+              <a:t>5/1/2017</a:t>
             </a:fld>
             <a:endParaRPr lang="en-US"/>
           </a:p>
@@ -604,7 +604,7 @@
           <a:p>
             <a:fld id="{94ABC641-97F1-8C45-A694-1B07B93F9841}" type="datetimeFigureOut">
               <a:rPr lang="en-US" smtClean="0"/>
-              <a:t>5/1/17</a:t>
+              <a:t>5/1/2017</a:t>
             </a:fld>
             <a:endParaRPr lang="en-US"/>
           </a:p>
@@ -774,7 +774,7 @@
           <a:p>
             <a:fld id="{94ABC641-97F1-8C45-A694-1B07B93F9841}" type="datetimeFigureOut">
               <a:rPr lang="en-US" smtClean="0"/>
-              <a:t>5/1/17</a:t>
+              <a:t>5/1/2017</a:t>
             </a:fld>
             <a:endParaRPr lang="en-US"/>
           </a:p>
@@ -1018,7 +1018,7 @@
           <a:p>
             <a:fld id="{94ABC641-97F1-8C45-A694-1B07B93F9841}" type="datetimeFigureOut">
               <a:rPr lang="en-US" smtClean="0"/>
-              <a:t>5/1/17</a:t>
+              <a:t>5/1/2017</a:t>
             </a:fld>
             <a:endParaRPr lang="en-US"/>
           </a:p>
@@ -1250,7 +1250,7 @@
           <a:p>
             <a:fld id="{94ABC641-97F1-8C45-A694-1B07B93F9841}" type="datetimeFigureOut">
               <a:rPr lang="en-US" smtClean="0"/>
-              <a:t>5/1/17</a:t>
+              <a:t>5/1/2017</a:t>
             </a:fld>
             <a:endParaRPr lang="en-US"/>
           </a:p>
@@ -1617,7 +1617,7 @@
           <a:p>
             <a:fld id="{94ABC641-97F1-8C45-A694-1B07B93F9841}" type="datetimeFigureOut">
               <a:rPr lang="en-US" smtClean="0"/>
-              <a:t>5/1/17</a:t>
+              <a:t>5/1/2017</a:t>
             </a:fld>
             <a:endParaRPr lang="en-US"/>
           </a:p>
@@ -1735,7 +1735,7 @@
           <a:p>
             <a:fld id="{94ABC641-97F1-8C45-A694-1B07B93F9841}" type="datetimeFigureOut">
               <a:rPr lang="en-US" smtClean="0"/>
-              <a:t>5/1/17</a:t>
+              <a:t>5/1/2017</a:t>
             </a:fld>
             <a:endParaRPr lang="en-US"/>
           </a:p>
@@ -1830,7 +1830,7 @@
           <a:p>
             <a:fld id="{94ABC641-97F1-8C45-A694-1B07B93F9841}" type="datetimeFigureOut">
               <a:rPr lang="en-US" smtClean="0"/>
-              <a:t>5/1/17</a:t>
+              <a:t>5/1/2017</a:t>
             </a:fld>
             <a:endParaRPr lang="en-US"/>
           </a:p>
@@ -2107,7 +2107,7 @@
           <a:p>
             <a:fld id="{94ABC641-97F1-8C45-A694-1B07B93F9841}" type="datetimeFigureOut">
               <a:rPr lang="en-US" smtClean="0"/>
-              <a:t>5/1/17</a:t>
+              <a:t>5/1/2017</a:t>
             </a:fld>
             <a:endParaRPr lang="en-US"/>
           </a:p>
@@ -2364,7 +2364,7 @@
           <a:p>
             <a:fld id="{94ABC641-97F1-8C45-A694-1B07B93F9841}" type="datetimeFigureOut">
               <a:rPr lang="en-US" smtClean="0"/>
-              <a:t>5/1/17</a:t>
+              <a:t>5/1/2017</a:t>
             </a:fld>
             <a:endParaRPr lang="en-US"/>
           </a:p>
@@ -2617,7 +2617,7 @@
           <a:p>
             <a:fld id="{94ABC641-97F1-8C45-A694-1B07B93F9841}" type="datetimeFigureOut">
               <a:rPr lang="en-US" smtClean="0"/>
-              <a:t>5/1/17</a:t>
+              <a:t>5/1/2017</a:t>
             </a:fld>
             <a:endParaRPr lang="en-US" dirty="0"/>
           </a:p>
@@ -3438,14 +3438,12 @@
               <a:rPr lang="en-US" dirty="0" smtClean="0"/>
               <a:t>flex</a:t>
             </a:r>
-            <a:endParaRPr lang="en-US" dirty="0" smtClean="0"/>
           </a:p>
           <a:p>
             <a:r>
               <a:rPr lang="en-US" dirty="0" smtClean="0"/>
               <a:t>What was learned</a:t>
             </a:r>
-            <a:endParaRPr lang="en-US" dirty="0" smtClean="0"/>
           </a:p>
           <a:p>
             <a:pPr lvl="1"/>
@@ -3472,7 +3470,6 @@
               <a:rPr lang="en-US" dirty="0" smtClean="0"/>
               <a:t>lifecycle</a:t>
             </a:r>
-            <a:endParaRPr lang="en-US" dirty="0" smtClean="0"/>
           </a:p>
         </p:txBody>
       </p:sp>
@@ -4958,11 +4955,7 @@
           <a:p>
             <a:r>
               <a:rPr lang="en-US" dirty="0" smtClean="0"/>
-              <a:t>Flex used to create C parser for C, C++, &amp; </a:t>
-            </a:r>
-            <a:r>
-              <a:rPr lang="en-US" dirty="0" smtClean="0"/>
-              <a:t>Java</a:t>
+              <a:t>Flex used to create C parser for C, C++, &amp; Java</a:t>
             </a:r>
           </a:p>
           <a:p>
@@ -5243,14 +5236,14 @@
           <p:nvPr>
             <p:extLst>
               <p:ext uri="{D42A27DB-BD31-4B8C-83A1-F6EECF244321}">
-                <p14:modId xmlns:p14="http://schemas.microsoft.com/office/powerpoint/2010/main" val="2049516237"/>
+                <p14:modId xmlns:p14="http://schemas.microsoft.com/office/powerpoint/2010/main" val="2944736433"/>
               </p:ext>
             </p:extLst>
           </p:nvPr>
         </p:nvGraphicFramePr>
         <p:xfrm>
           <a:off x="2351313" y="1416817"/>
-          <a:ext cx="5114612" cy="2230305"/>
+          <a:ext cx="5244781" cy="2230305"/>
         </p:xfrm>
         <a:graphic>
           <a:graphicData uri="http://schemas.openxmlformats.org/drawingml/2006/table">
@@ -5259,11 +5252,41 @@
                 <a:tableStyleId>{5C22544A-7EE6-4342-B048-85BDC9FD1C3A}</a:tableStyleId>
               </a:tblPr>
               <a:tblGrid>
-                <a:gridCol w="381838"/>
-                <a:gridCol w="1607736"/>
-                <a:gridCol w="1266093"/>
-                <a:gridCol w="1296237"/>
-                <a:gridCol w="562708"/>
+                <a:gridCol w="421769">
+                  <a:extLst>
+                    <a:ext uri="{9D8B030D-6E8A-4147-A177-3AD203B41FA5}">
+                      <a16:colId xmlns:a16="http://schemas.microsoft.com/office/drawing/2014/main" val="20000"/>
+                    </a:ext>
+                  </a:extLst>
+                </a:gridCol>
+                <a:gridCol w="1691342">
+                  <a:extLst>
+                    <a:ext uri="{9D8B030D-6E8A-4147-A177-3AD203B41FA5}">
+                      <a16:colId xmlns:a16="http://schemas.microsoft.com/office/drawing/2014/main" val="20001"/>
+                    </a:ext>
+                  </a:extLst>
+                </a:gridCol>
+                <a:gridCol w="1284941">
+                  <a:extLst>
+                    <a:ext uri="{9D8B030D-6E8A-4147-A177-3AD203B41FA5}">
+                      <a16:colId xmlns:a16="http://schemas.microsoft.com/office/drawing/2014/main" val="20002"/>
+                    </a:ext>
+                  </a:extLst>
+                </a:gridCol>
+                <a:gridCol w="1272988">
+                  <a:extLst>
+                    <a:ext uri="{9D8B030D-6E8A-4147-A177-3AD203B41FA5}">
+                      <a16:colId xmlns:a16="http://schemas.microsoft.com/office/drawing/2014/main" val="20003"/>
+                    </a:ext>
+                  </a:extLst>
+                </a:gridCol>
+                <a:gridCol w="573741">
+                  <a:extLst>
+                    <a:ext uri="{9D8B030D-6E8A-4147-A177-3AD203B41FA5}">
+                      <a16:colId xmlns:a16="http://schemas.microsoft.com/office/drawing/2014/main" val="20004"/>
+                    </a:ext>
+                  </a:extLst>
+                </a:gridCol>
               </a:tblGrid>
               <a:tr h="313692">
                 <a:tc>
@@ -5361,6 +5384,11 @@
                   </a:txBody>
                   <a:tcPr anchor="ctr"/>
                 </a:tc>
+                <a:extLst>
+                  <a:ext uri="{0D108BD9-81ED-4DB2-BD59-A6C34878D82A}">
+                    <a16:rowId xmlns:a16="http://schemas.microsoft.com/office/drawing/2014/main" val="10000"/>
+                  </a:ext>
+                </a:extLst>
               </a:tr>
               <a:tr h="241093">
                 <a:tc>
@@ -5388,11 +5416,113 @@
                     <a:lstStyle/>
                     <a:p>
                       <a:r>
+                        <a:rPr lang="mr-IN" sz="1000" dirty="0">
+                          <a:effectLst/>
+                          <a:latin typeface="CMR10" charset="0"/>
+                        </a:rPr>
+                        <a:t>+ </a:t>
+                      </a:r>
+                      <a:endParaRPr lang="mr-IN" sz="1400" dirty="0">
+                        <a:effectLst/>
+                      </a:endParaRPr>
+                    </a:p>
+                  </a:txBody>
+                  <a:tcPr anchor="ctr"/>
+                </a:tc>
+                <a:tc>
+                  <a:txBody>
+                    <a:bodyPr/>
+                    <a:lstStyle/>
+                    <a:p>
+                      <a:r>
+                        <a:rPr lang="en-US" sz="1000">
+                          <a:effectLst/>
+                          <a:latin typeface="CMR10" charset="0"/>
+                        </a:rPr>
+                        <a:t>ADD </a:t>
+                      </a:r>
+                      <a:endParaRPr lang="en-US" sz="1400">
+                        <a:effectLst/>
+                      </a:endParaRPr>
+                    </a:p>
+                  </a:txBody>
+                  <a:tcPr anchor="ctr"/>
+                </a:tc>
+                <a:tc>
+                  <a:txBody>
+                    <a:bodyPr/>
+                    <a:lstStyle/>
+                    <a:p>
+                      <a:r>
+                        <a:rPr lang="en-US" sz="1000">
+                          <a:effectLst/>
+                          <a:latin typeface="CMR10" charset="0"/>
+                        </a:rPr>
+                        <a:t>ADD </a:t>
+                      </a:r>
+                      <a:endParaRPr lang="en-US" sz="1400">
+                        <a:effectLst/>
+                      </a:endParaRPr>
+                    </a:p>
+                  </a:txBody>
+                  <a:tcPr anchor="ctr"/>
+                </a:tc>
+                <a:tc>
+                  <a:txBody>
+                    <a:bodyPr/>
+                    <a:lstStyle/>
+                    <a:p>
+                      <a:r>
+                        <a:rPr lang="en-US" sz="1000">
+                          <a:effectLst/>
+                          <a:latin typeface="CMR10" charset="0"/>
+                        </a:rPr>
+                        <a:t>true </a:t>
+                      </a:r>
+                      <a:endParaRPr lang="en-US" sz="1400">
+                        <a:effectLst/>
+                      </a:endParaRPr>
+                    </a:p>
+                  </a:txBody>
+                  <a:tcPr anchor="ctr"/>
+                </a:tc>
+                <a:extLst>
+                  <a:ext uri="{0D108BD9-81ED-4DB2-BD59-A6C34878D82A}">
+                    <a16:rowId xmlns:a16="http://schemas.microsoft.com/office/drawing/2014/main" val="10001"/>
+                  </a:ext>
+                </a:extLst>
+              </a:tr>
+              <a:tr h="241093">
+                <a:tc>
+                  <a:txBody>
+                    <a:bodyPr/>
+                    <a:lstStyle/>
+                    <a:p>
+                      <a:r>
+                        <a:rPr lang="is-IS" sz="1000">
+                          <a:effectLst/>
+                          <a:latin typeface="CMR10" charset="0"/>
+                        </a:rPr>
+                        <a:t>2 </a:t>
+                      </a:r>
+                      <a:endParaRPr lang="is-IS" sz="1400">
+                        <a:effectLst/>
+                      </a:endParaRPr>
+                    </a:p>
+                  </a:txBody>
+                  <a:tcPr anchor="ctr"/>
+                </a:tc>
+                <a:tc>
+                  <a:txBody>
+                    <a:bodyPr/>
+                    <a:lstStyle/>
+                    <a:p>
+                      <a:r>
                         <a:rPr lang="mr-IN" sz="1000">
                           <a:effectLst/>
                           <a:latin typeface="CMR10" charset="0"/>
                         </a:rPr>
-                        <a:t>+ </a:t>
+                        <a:t>- </a:t>
                       </a:r>
                       <a:endParaRPr lang="mr-IN" sz="1400">
                         <a:effectLst/>
@@ -5411,7 +5541,7 @@
                           <a:effectLst/>
                           <a:latin typeface="CMR10" charset="0"/>
                         </a:rPr>
-                        <a:t>ADD </a:t>
+                        <a:t>SUB </a:t>
                       </a:r>
                       <a:endParaRPr lang="en-US" sz="1400">
                         <a:effectLst/>
@@ -5430,7 +5560,7 @@
                           <a:effectLst/>
                           <a:latin typeface="CMR10" charset="0"/>
                         </a:rPr>
-                        <a:t>ADD </a:t>
+                        <a:t>SUB </a:t>
                       </a:r>
                       <a:endParaRPr lang="en-US" sz="1400">
                         <a:effectLst/>
@@ -5458,8 +5588,866 @@
                   </a:txBody>
                   <a:tcPr anchor="ctr"/>
                 </a:tc>
+                <a:extLst>
+                  <a:ext uri="{0D108BD9-81ED-4DB2-BD59-A6C34878D82A}">
+                    <a16:rowId xmlns:a16="http://schemas.microsoft.com/office/drawing/2014/main" val="10002"/>
+                  </a:ext>
+                </a:extLst>
               </a:tr>
               <a:tr h="241093">
+                <a:tc>
+                  <a:txBody>
+                    <a:bodyPr/>
+                    <a:lstStyle/>
+                    <a:p>
+                      <a:r>
+                        <a:rPr lang="en-US" sz="1000">
+                          <a:effectLst/>
+                          <a:latin typeface="CMR10" charset="0"/>
+                        </a:rPr>
+                        <a:t>3 </a:t>
+                      </a:r>
+                      <a:endParaRPr lang="en-US" sz="1400">
+                        <a:effectLst/>
+                      </a:endParaRPr>
+                    </a:p>
+                  </a:txBody>
+                  <a:tcPr anchor="ctr"/>
+                </a:tc>
+                <a:tc>
+                  <a:txBody>
+                    <a:bodyPr/>
+                    <a:lstStyle/>
+                    <a:p>
+                      <a:r>
+                        <a:rPr lang="en-US" sz="1000" dirty="0" err="1">
+                          <a:effectLst/>
+                          <a:latin typeface="CMR10" charset="0"/>
+                        </a:rPr>
+                        <a:t>int</a:t>
+                      </a:r>
+                      <a:r>
+                        <a:rPr lang="en-US" sz="1000" dirty="0">
+                          <a:effectLst/>
+                          <a:latin typeface="CMR10" charset="0"/>
+                        </a:rPr>
+                        <a:t> main() </a:t>
+                      </a:r>
+                      <a:endParaRPr lang="en-US" sz="1400" dirty="0">
+                        <a:effectLst/>
+                      </a:endParaRPr>
+                    </a:p>
+                  </a:txBody>
+                  <a:tcPr anchor="ctr"/>
+                </a:tc>
+                <a:tc>
+                  <a:txBody>
+                    <a:bodyPr/>
+                    <a:lstStyle/>
+                    <a:p>
+                      <a:r>
+                        <a:rPr lang="en-US" sz="1000">
+                          <a:effectLst/>
+                          <a:latin typeface="CMR10" charset="0"/>
+                        </a:rPr>
+                        <a:t>FUNCTION </a:t>
+                      </a:r>
+                      <a:endParaRPr lang="en-US" sz="1400">
+                        <a:effectLst/>
+                      </a:endParaRPr>
+                    </a:p>
+                  </a:txBody>
+                  <a:tcPr anchor="ctr"/>
+                </a:tc>
+                <a:tc>
+                  <a:txBody>
+                    <a:bodyPr/>
+                    <a:lstStyle/>
+                    <a:p>
+                      <a:r>
+                        <a:rPr lang="en-US" sz="1000" dirty="0">
+                          <a:effectLst/>
+                          <a:latin typeface="CMR10" charset="0"/>
+                        </a:rPr>
+                        <a:t>FUNCTION </a:t>
+                      </a:r>
+                      <a:endParaRPr lang="en-US" sz="1400" dirty="0">
+                        <a:effectLst/>
+                      </a:endParaRPr>
+                    </a:p>
+                  </a:txBody>
+                  <a:tcPr anchor="ctr"/>
+                </a:tc>
+                <a:tc>
+                  <a:txBody>
+                    <a:bodyPr/>
+                    <a:lstStyle/>
+                    <a:p>
+                      <a:r>
+                        <a:rPr lang="en-US" sz="1000">
+                          <a:effectLst/>
+                          <a:latin typeface="CMR10" charset="0"/>
+                        </a:rPr>
+                        <a:t>true </a:t>
+                      </a:r>
+                      <a:endParaRPr lang="en-US" sz="1400">
+                        <a:effectLst/>
+                      </a:endParaRPr>
+                    </a:p>
+                  </a:txBody>
+                  <a:tcPr anchor="ctr"/>
+                </a:tc>
+                <a:extLst>
+                  <a:ext uri="{0D108BD9-81ED-4DB2-BD59-A6C34878D82A}">
+                    <a16:rowId xmlns:a16="http://schemas.microsoft.com/office/drawing/2014/main" val="10003"/>
+                  </a:ext>
+                </a:extLst>
+              </a:tr>
+              <a:tr h="277422">
+                <a:tc>
+                  <a:txBody>
+                    <a:bodyPr/>
+                    <a:lstStyle/>
+                    <a:p>
+                      <a:r>
+                        <a:rPr lang="en-US" sz="1000">
+                          <a:effectLst/>
+                          <a:latin typeface="CMR10" charset="0"/>
+                        </a:rPr>
+                        <a:t>4 </a:t>
+                      </a:r>
+                      <a:endParaRPr lang="en-US" sz="1400">
+                        <a:effectLst/>
+                      </a:endParaRPr>
+                    </a:p>
+                  </a:txBody>
+                  <a:tcPr anchor="ctr"/>
+                </a:tc>
+                <a:tc>
+                  <a:txBody>
+                    <a:bodyPr/>
+                    <a:lstStyle/>
+                    <a:p>
+                      <a:r>
+                        <a:rPr lang="en-US" sz="1000" dirty="0">
+                          <a:effectLst/>
+                          <a:latin typeface="CMR10" charset="0"/>
+                        </a:rPr>
+                        <a:t>#include </a:t>
+                      </a:r>
+                      <a:r>
+                        <a:rPr lang="en-US" sz="1000" dirty="0">
+                          <a:effectLst/>
+                          <a:latin typeface="CMMI10" charset="0"/>
+                        </a:rPr>
+                        <a:t>&lt;</a:t>
+                      </a:r>
+                      <a:r>
+                        <a:rPr lang="en-US" sz="1000" dirty="0" err="1">
+                          <a:effectLst/>
+                          <a:latin typeface="CMR10" charset="0"/>
+                        </a:rPr>
+                        <a:t>iostream</a:t>
+                      </a:r>
+                      <a:r>
+                        <a:rPr lang="en-US" sz="1000" dirty="0">
+                          <a:effectLst/>
+                          <a:latin typeface="CMR10" charset="0"/>
+                        </a:rPr>
+                        <a:t> </a:t>
+                      </a:r>
+                      <a:r>
+                        <a:rPr lang="en-US" sz="1000" dirty="0">
+                          <a:effectLst/>
+                          <a:latin typeface="CMMI10" charset="0"/>
+                        </a:rPr>
+                        <a:t>&gt;</a:t>
+                      </a:r>
+                      <a:r>
+                        <a:rPr lang="en-US" sz="1000" dirty="0">
+                          <a:effectLst/>
+                          <a:latin typeface="CMR10" charset="0"/>
+                        </a:rPr>
+                        <a:t>(.</a:t>
+                      </a:r>
+                      <a:r>
+                        <a:rPr lang="en-US" sz="1000" dirty="0" err="1">
+                          <a:effectLst/>
+                          <a:latin typeface="CMR10" charset="0"/>
+                        </a:rPr>
+                        <a:t>cpp</a:t>
+                      </a:r>
+                      <a:r>
+                        <a:rPr lang="en-US" sz="1000" dirty="0">
+                          <a:effectLst/>
+                          <a:latin typeface="CMR10" charset="0"/>
+                        </a:rPr>
+                        <a:t>) </a:t>
+                      </a:r>
+                      <a:endParaRPr lang="en-US" sz="1400" dirty="0">
+                        <a:effectLst/>
+                      </a:endParaRPr>
+                    </a:p>
+                  </a:txBody>
+                  <a:tcPr anchor="ctr"/>
+                </a:tc>
+                <a:tc>
+                  <a:txBody>
+                    <a:bodyPr/>
+                    <a:lstStyle/>
+                    <a:p>
+                      <a:r>
+                        <a:rPr lang="en-US" sz="1000">
+                          <a:effectLst/>
+                          <a:latin typeface="CMR10" charset="0"/>
+                        </a:rPr>
+                        <a:t>IMPORT </a:t>
+                      </a:r>
+                      <a:endParaRPr lang="en-US" sz="1400">
+                        <a:effectLst/>
+                      </a:endParaRPr>
+                    </a:p>
+                  </a:txBody>
+                  <a:tcPr anchor="ctr"/>
+                </a:tc>
+                <a:tc>
+                  <a:txBody>
+                    <a:bodyPr/>
+                    <a:lstStyle/>
+                    <a:p>
+                      <a:r>
+                        <a:rPr lang="en-US" sz="1000">
+                          <a:effectLst/>
+                          <a:latin typeface="CMR10" charset="0"/>
+                        </a:rPr>
+                        <a:t>IMPORT </a:t>
+                      </a:r>
+                      <a:endParaRPr lang="en-US" sz="1400">
+                        <a:effectLst/>
+                      </a:endParaRPr>
+                    </a:p>
+                  </a:txBody>
+                  <a:tcPr anchor="ctr"/>
+                </a:tc>
+                <a:tc>
+                  <a:txBody>
+                    <a:bodyPr/>
+                    <a:lstStyle/>
+                    <a:p>
+                      <a:r>
+                        <a:rPr lang="en-US" sz="1000">
+                          <a:effectLst/>
+                          <a:latin typeface="CMR10" charset="0"/>
+                        </a:rPr>
+                        <a:t>true </a:t>
+                      </a:r>
+                      <a:endParaRPr lang="en-US" sz="1400">
+                        <a:effectLst/>
+                      </a:endParaRPr>
+                    </a:p>
+                  </a:txBody>
+                  <a:tcPr anchor="ctr"/>
+                </a:tc>
+                <a:extLst>
+                  <a:ext uri="{0D108BD9-81ED-4DB2-BD59-A6C34878D82A}">
+                    <a16:rowId xmlns:a16="http://schemas.microsoft.com/office/drawing/2014/main" val="10004"/>
+                  </a:ext>
+                </a:extLst>
+              </a:tr>
+              <a:tr h="386409">
+                <a:tc>
+                  <a:txBody>
+                    <a:bodyPr/>
+                    <a:lstStyle/>
+                    <a:p>
+                      <a:r>
+                        <a:rPr lang="en-US" sz="1000">
+                          <a:effectLst/>
+                          <a:latin typeface="CMR10" charset="0"/>
+                        </a:rPr>
+                        <a:t>5 </a:t>
+                      </a:r>
+                      <a:endParaRPr lang="en-US" sz="1400">
+                        <a:effectLst/>
+                      </a:endParaRPr>
+                    </a:p>
+                  </a:txBody>
+                  <a:tcPr anchor="ctr"/>
+                </a:tc>
+                <a:tc>
+                  <a:txBody>
+                    <a:bodyPr/>
+                    <a:lstStyle/>
+                    <a:p>
+                      <a:r>
+                        <a:rPr lang="en-US" sz="1000" dirty="0">
+                          <a:effectLst/>
+                          <a:latin typeface="CMR10" charset="0"/>
+                        </a:rPr>
+                        <a:t>import </a:t>
+                      </a:r>
+                      <a:r>
+                        <a:rPr lang="en-US" sz="1000" dirty="0" err="1">
+                          <a:effectLst/>
+                          <a:latin typeface="CMR10" charset="0"/>
+                        </a:rPr>
+                        <a:t>java.util.Date</a:t>
+                      </a:r>
+                      <a:r>
+                        <a:rPr lang="en-US" sz="1000" dirty="0">
+                          <a:effectLst/>
+                          <a:latin typeface="CMR10" charset="0"/>
+                        </a:rPr>
+                        <a:t> (.java) </a:t>
+                      </a:r>
+                      <a:endParaRPr lang="en-US" sz="1400" dirty="0">
+                        <a:effectLst/>
+                      </a:endParaRPr>
+                    </a:p>
+                  </a:txBody>
+                  <a:tcPr anchor="ctr"/>
+                </a:tc>
+                <a:tc>
+                  <a:txBody>
+                    <a:bodyPr/>
+                    <a:lstStyle/>
+                    <a:p>
+                      <a:r>
+                        <a:rPr lang="en-US" sz="1000">
+                          <a:effectLst/>
+                          <a:latin typeface="CMR10" charset="0"/>
+                        </a:rPr>
+                        <a:t>IMPORT </a:t>
+                      </a:r>
+                      <a:endParaRPr lang="en-US" sz="1400">
+                        <a:effectLst/>
+                      </a:endParaRPr>
+                    </a:p>
+                  </a:txBody>
+                  <a:tcPr anchor="ctr"/>
+                </a:tc>
+                <a:tc>
+                  <a:txBody>
+                    <a:bodyPr/>
+                    <a:lstStyle/>
+                    <a:p>
+                      <a:r>
+                        <a:rPr lang="en-US" sz="1000">
+                          <a:effectLst/>
+                          <a:latin typeface="CMR10" charset="0"/>
+                        </a:rPr>
+                        <a:t>IMPORT </a:t>
+                      </a:r>
+                      <a:endParaRPr lang="en-US" sz="1400">
+                        <a:effectLst/>
+                      </a:endParaRPr>
+                    </a:p>
+                  </a:txBody>
+                  <a:tcPr anchor="ctr"/>
+                </a:tc>
+                <a:tc>
+                  <a:txBody>
+                    <a:bodyPr/>
+                    <a:lstStyle/>
+                    <a:p>
+                      <a:r>
+                        <a:rPr lang="en-US" sz="1000">
+                          <a:effectLst/>
+                          <a:latin typeface="CMR10" charset="0"/>
+                        </a:rPr>
+                        <a:t>true </a:t>
+                      </a:r>
+                      <a:endParaRPr lang="en-US" sz="1400">
+                        <a:effectLst/>
+                      </a:endParaRPr>
+                    </a:p>
+                  </a:txBody>
+                  <a:tcPr anchor="ctr"/>
+                </a:tc>
+                <a:extLst>
+                  <a:ext uri="{0D108BD9-81ED-4DB2-BD59-A6C34878D82A}">
+                    <a16:rowId xmlns:a16="http://schemas.microsoft.com/office/drawing/2014/main" val="10005"/>
+                  </a:ext>
+                </a:extLst>
+              </a:tr>
+              <a:tr h="241093">
+                <a:tc>
+                  <a:txBody>
+                    <a:bodyPr/>
+                    <a:lstStyle/>
+                    <a:p>
+                      <a:r>
+                        <a:rPr lang="en-US" sz="1000">
+                          <a:effectLst/>
+                          <a:latin typeface="CMR10" charset="0"/>
+                        </a:rPr>
+                        <a:t>6 </a:t>
+                      </a:r>
+                      <a:endParaRPr lang="en-US" sz="1400">
+                        <a:effectLst/>
+                      </a:endParaRPr>
+                    </a:p>
+                  </a:txBody>
+                  <a:tcPr anchor="ctr"/>
+                </a:tc>
+                <a:tc>
+                  <a:txBody>
+                    <a:bodyPr/>
+                    <a:lstStyle/>
+                    <a:p>
+                      <a:r>
+                        <a:rPr lang="en-US" sz="1000">
+                          <a:effectLst/>
+                          <a:latin typeface="CMR10" charset="0"/>
+                        </a:rPr>
+                        <a:t>//comment </a:t>
+                      </a:r>
+                      <a:endParaRPr lang="en-US" sz="1400">
+                        <a:effectLst/>
+                      </a:endParaRPr>
+                    </a:p>
+                  </a:txBody>
+                  <a:tcPr anchor="ctr"/>
+                </a:tc>
+                <a:tc>
+                  <a:txBody>
+                    <a:bodyPr/>
+                    <a:lstStyle/>
+                    <a:p>
+                      <a:r>
+                        <a:rPr lang="en-US" sz="1000">
+                          <a:effectLst/>
+                          <a:latin typeface="CMR10" charset="0"/>
+                        </a:rPr>
+                        <a:t>LINECOMMENT </a:t>
+                      </a:r>
+                      <a:endParaRPr lang="en-US" sz="1400">
+                        <a:effectLst/>
+                      </a:endParaRPr>
+                    </a:p>
+                  </a:txBody>
+                  <a:tcPr anchor="ctr"/>
+                </a:tc>
+                <a:tc>
+                  <a:txBody>
+                    <a:bodyPr/>
+                    <a:lstStyle/>
+                    <a:p>
+                      <a:r>
+                        <a:rPr lang="en-US" sz="1000">
+                          <a:effectLst/>
+                          <a:latin typeface="CMR10" charset="0"/>
+                        </a:rPr>
+                        <a:t>LINECOMMENT </a:t>
+                      </a:r>
+                      <a:endParaRPr lang="en-US" sz="1400">
+                        <a:effectLst/>
+                      </a:endParaRPr>
+                    </a:p>
+                  </a:txBody>
+                  <a:tcPr anchor="ctr"/>
+                </a:tc>
+                <a:tc>
+                  <a:txBody>
+                    <a:bodyPr/>
+                    <a:lstStyle/>
+                    <a:p>
+                      <a:r>
+                        <a:rPr lang="en-US" sz="1000">
+                          <a:effectLst/>
+                          <a:latin typeface="CMR10" charset="0"/>
+                        </a:rPr>
+                        <a:t>true </a:t>
+                      </a:r>
+                      <a:endParaRPr lang="en-US" sz="1400">
+                        <a:effectLst/>
+                      </a:endParaRPr>
+                    </a:p>
+                  </a:txBody>
+                  <a:tcPr anchor="ctr"/>
+                </a:tc>
+                <a:extLst>
+                  <a:ext uri="{0D108BD9-81ED-4DB2-BD59-A6C34878D82A}">
+                    <a16:rowId xmlns:a16="http://schemas.microsoft.com/office/drawing/2014/main" val="10006"/>
+                  </a:ext>
+                </a:extLst>
+              </a:tr>
+              <a:tr h="277422">
+                <a:tc>
+                  <a:txBody>
+                    <a:bodyPr/>
+                    <a:lstStyle/>
+                    <a:p>
+                      <a:r>
+                        <a:rPr lang="ru-RU" sz="1000">
+                          <a:effectLst/>
+                          <a:latin typeface="CMR10" charset="0"/>
+                        </a:rPr>
+                        <a:t>7 </a:t>
+                      </a:r>
+                      <a:endParaRPr lang="ru-RU" sz="1400">
+                        <a:effectLst/>
+                      </a:endParaRPr>
+                    </a:p>
+                  </a:txBody>
+                  <a:tcPr anchor="ctr"/>
+                </a:tc>
+                <a:tc>
+                  <a:txBody>
+                    <a:bodyPr/>
+                    <a:lstStyle/>
+                    <a:p>
+                      <a:r>
+                        <a:rPr lang="mr-IN" sz="1000">
+                          <a:effectLst/>
+                          <a:latin typeface="CMR10" charset="0"/>
+                        </a:rPr>
+                        <a:t>/*comment*/ </a:t>
+                      </a:r>
+                      <a:endParaRPr lang="mr-IN" sz="1400">
+                        <a:effectLst/>
+                      </a:endParaRPr>
+                    </a:p>
+                  </a:txBody>
+                  <a:tcPr anchor="ctr"/>
+                </a:tc>
+                <a:tc>
+                  <a:txBody>
+                    <a:bodyPr/>
+                    <a:lstStyle/>
+                    <a:p>
+                      <a:r>
+                        <a:rPr lang="en-US" sz="1000">
+                          <a:effectLst/>
+                          <a:latin typeface="CMR10" charset="0"/>
+                        </a:rPr>
+                        <a:t>BLOCKCOMMENT </a:t>
+                      </a:r>
+                      <a:endParaRPr lang="en-US" sz="1400">
+                        <a:effectLst/>
+                      </a:endParaRPr>
+                    </a:p>
+                  </a:txBody>
+                  <a:tcPr anchor="ctr"/>
+                </a:tc>
+                <a:tc>
+                  <a:txBody>
+                    <a:bodyPr/>
+                    <a:lstStyle/>
+                    <a:p>
+                      <a:r>
+                        <a:rPr lang="en-US" sz="1000">
+                          <a:effectLst/>
+                          <a:latin typeface="CMR10" charset="0"/>
+                        </a:rPr>
+                        <a:t>BLOCKCOMMENT </a:t>
+                      </a:r>
+                      <a:endParaRPr lang="en-US" sz="1400">
+                        <a:effectLst/>
+                      </a:endParaRPr>
+                    </a:p>
+                  </a:txBody>
+                  <a:tcPr anchor="ctr"/>
+                </a:tc>
+                <a:tc>
+                  <a:txBody>
+                    <a:bodyPr/>
+                    <a:lstStyle/>
+                    <a:p>
+                      <a:r>
+                        <a:rPr lang="en-US" sz="1000" dirty="0">
+                          <a:effectLst/>
+                          <a:latin typeface="CMR10" charset="0"/>
+                        </a:rPr>
+                        <a:t>true </a:t>
+                      </a:r>
+                      <a:endParaRPr lang="en-US" sz="1400" dirty="0">
+                        <a:effectLst/>
+                      </a:endParaRPr>
+                    </a:p>
+                  </a:txBody>
+                  <a:tcPr anchor="ctr"/>
+                </a:tc>
+                <a:extLst>
+                  <a:ext uri="{0D108BD9-81ED-4DB2-BD59-A6C34878D82A}">
+                    <a16:rowId xmlns:a16="http://schemas.microsoft.com/office/drawing/2014/main" val="10007"/>
+                  </a:ext>
+                </a:extLst>
+              </a:tr>
+            </a:tbl>
+          </a:graphicData>
+        </a:graphic>
+      </p:graphicFrame>
+      <p:graphicFrame>
+        <p:nvGraphicFramePr>
+          <p:cNvPr id="7" name="Table 6"/>
+          <p:cNvGraphicFramePr>
+            <a:graphicFrameLocks noGrp="1"/>
+          </p:cNvGraphicFramePr>
+          <p:nvPr>
+            <p:extLst>
+              <p:ext uri="{D42A27DB-BD31-4B8C-83A1-F6EECF244321}">
+                <p14:modId xmlns:p14="http://schemas.microsoft.com/office/powerpoint/2010/main" val="2727014017"/>
+              </p:ext>
+            </p:extLst>
+          </p:nvPr>
+        </p:nvGraphicFramePr>
+        <p:xfrm>
+          <a:off x="3279112" y="3847960"/>
+          <a:ext cx="4801076" cy="2396471"/>
+        </p:xfrm>
+        <a:graphic>
+          <a:graphicData uri="http://schemas.openxmlformats.org/drawingml/2006/table">
+            <a:tbl>
+              <a:tblPr firstRow="1" bandRow="1">
+                <a:tableStyleId>{5C22544A-7EE6-4342-B048-85BDC9FD1C3A}</a:tableStyleId>
+              </a:tblPr>
+              <a:tblGrid>
+                <a:gridCol w="414347">
+                  <a:extLst>
+                    <a:ext uri="{9D8B030D-6E8A-4147-A177-3AD203B41FA5}">
+                      <a16:colId xmlns:a16="http://schemas.microsoft.com/office/drawing/2014/main" val="20000"/>
+                    </a:ext>
+                  </a:extLst>
+                </a:gridCol>
+                <a:gridCol w="1410447">
+                  <a:extLst>
+                    <a:ext uri="{9D8B030D-6E8A-4147-A177-3AD203B41FA5}">
+                      <a16:colId xmlns:a16="http://schemas.microsoft.com/office/drawing/2014/main" val="20001"/>
+                    </a:ext>
+                  </a:extLst>
+                </a:gridCol>
+                <a:gridCol w="1256701">
+                  <a:extLst>
+                    <a:ext uri="{9D8B030D-6E8A-4147-A177-3AD203B41FA5}">
+                      <a16:colId xmlns:a16="http://schemas.microsoft.com/office/drawing/2014/main" val="20002"/>
+                    </a:ext>
+                  </a:extLst>
+                </a:gridCol>
+                <a:gridCol w="1127911">
+                  <a:extLst>
+                    <a:ext uri="{9D8B030D-6E8A-4147-A177-3AD203B41FA5}">
+                      <a16:colId xmlns:a16="http://schemas.microsoft.com/office/drawing/2014/main" val="20003"/>
+                    </a:ext>
+                  </a:extLst>
+                </a:gridCol>
+                <a:gridCol w="591670">
+                  <a:extLst>
+                    <a:ext uri="{9D8B030D-6E8A-4147-A177-3AD203B41FA5}">
+                      <a16:colId xmlns:a16="http://schemas.microsoft.com/office/drawing/2014/main" val="20004"/>
+                    </a:ext>
+                  </a:extLst>
+                </a:gridCol>
+              </a:tblGrid>
+              <a:tr h="288271">
+                <a:tc>
+                  <a:txBody>
+                    <a:bodyPr/>
+                    <a:lstStyle/>
+                    <a:p>
+                      <a:r>
+                        <a:rPr lang="en-US" sz="1000" dirty="0">
+                          <a:effectLst/>
+                          <a:latin typeface="CMR10" charset="0"/>
+                        </a:rPr>
+                        <a:t>test </a:t>
+                      </a:r>
+                      <a:endParaRPr lang="en-US" sz="1400" dirty="0">
+                        <a:effectLst/>
+                      </a:endParaRPr>
+                    </a:p>
+                  </a:txBody>
+                  <a:tcPr anchor="ctr"/>
+                </a:tc>
+                <a:tc>
+                  <a:txBody>
+                    <a:bodyPr/>
+                    <a:lstStyle/>
+                    <a:p>
+                      <a:r>
+                        <a:rPr lang="en-US" sz="1000" dirty="0">
+                          <a:effectLst/>
+                          <a:latin typeface="CMR10" charset="0"/>
+                        </a:rPr>
+                        <a:t>Input </a:t>
+                      </a:r>
+                      <a:endParaRPr lang="en-US" sz="1400" dirty="0">
+                        <a:effectLst/>
+                      </a:endParaRPr>
+                    </a:p>
+                  </a:txBody>
+                  <a:tcPr anchor="ctr"/>
+                </a:tc>
+                <a:tc>
+                  <a:txBody>
+                    <a:bodyPr/>
+                    <a:lstStyle/>
+                    <a:p>
+                      <a:r>
+                        <a:rPr lang="en-US" sz="1000" dirty="0">
+                          <a:effectLst/>
+                          <a:latin typeface="CMR10" charset="0"/>
+                        </a:rPr>
+                        <a:t>Expected Output </a:t>
+                      </a:r>
+                      <a:endParaRPr lang="en-US" sz="1400" dirty="0">
+                        <a:effectLst/>
+                      </a:endParaRPr>
+                    </a:p>
+                  </a:txBody>
+                  <a:tcPr anchor="ctr"/>
+                </a:tc>
+                <a:tc>
+                  <a:txBody>
+                    <a:bodyPr/>
+                    <a:lstStyle/>
+                    <a:p>
+                      <a:r>
+                        <a:rPr lang="en-US" sz="1000">
+                          <a:effectLst/>
+                          <a:latin typeface="CMR10" charset="0"/>
+                        </a:rPr>
+                        <a:t>Actual Output </a:t>
+                      </a:r>
+                      <a:endParaRPr lang="en-US" sz="1400">
+                        <a:effectLst/>
+                      </a:endParaRPr>
+                    </a:p>
+                  </a:txBody>
+                  <a:tcPr anchor="ctr"/>
+                </a:tc>
+                <a:tc>
+                  <a:txBody>
+                    <a:bodyPr/>
+                    <a:lstStyle/>
+                    <a:p>
+                      <a:r>
+                        <a:rPr lang="en-US" sz="1000">
+                          <a:effectLst/>
+                          <a:latin typeface="CMR10" charset="0"/>
+                        </a:rPr>
+                        <a:t>Result </a:t>
+                      </a:r>
+                      <a:endParaRPr lang="en-US" sz="1400">
+                        <a:effectLst/>
+                      </a:endParaRPr>
+                    </a:p>
+                  </a:txBody>
+                  <a:tcPr anchor="ctr"/>
+                </a:tc>
+                <a:extLst>
+                  <a:ext uri="{0D108BD9-81ED-4DB2-BD59-A6C34878D82A}">
+                    <a16:rowId xmlns:a16="http://schemas.microsoft.com/office/drawing/2014/main" val="10000"/>
+                  </a:ext>
+                </a:extLst>
+              </a:tr>
+              <a:tr h="370840">
+                <a:tc>
+                  <a:txBody>
+                    <a:bodyPr/>
+                    <a:lstStyle/>
+                    <a:p>
+                      <a:r>
+                        <a:rPr lang="ru-RU" sz="1000">
+                          <a:effectLst/>
+                          <a:latin typeface="CMR10" charset="0"/>
+                        </a:rPr>
+                        <a:t>1 </a:t>
+                      </a:r>
+                      <a:endParaRPr lang="ru-RU" sz="1400">
+                        <a:effectLst/>
+                      </a:endParaRPr>
+                    </a:p>
+                  </a:txBody>
+                  <a:tcPr anchor="ctr"/>
+                </a:tc>
+                <a:tc>
+                  <a:txBody>
+                    <a:bodyPr/>
+                    <a:lstStyle/>
+                    <a:p>
+                      <a:r>
+                        <a:rPr lang="en-US" sz="1000" dirty="0">
+                          <a:effectLst/>
+                          <a:latin typeface="CMR10" charset="0"/>
+                        </a:rPr>
+                        <a:t>empty file </a:t>
+                      </a:r>
+                      <a:endParaRPr lang="en-US" sz="1400" dirty="0">
+                        <a:effectLst/>
+                      </a:endParaRPr>
+                    </a:p>
+                  </a:txBody>
+                  <a:tcPr anchor="ctr"/>
+                </a:tc>
+                <a:tc>
+                  <a:txBody>
+                    <a:bodyPr/>
+                    <a:lstStyle/>
+                    <a:p>
+                      <a:r>
+                        <a:rPr lang="es-ES_tradnl" sz="1000" dirty="0">
+                          <a:effectLst/>
+                          <a:latin typeface="CMR10" charset="0"/>
+                        </a:rPr>
+                        <a:t>0 LOC, 0 LOD </a:t>
+                      </a:r>
+                      <a:endParaRPr lang="es-ES_tradnl" sz="1400" dirty="0">
+                        <a:effectLst/>
+                      </a:endParaRPr>
+                    </a:p>
+                  </a:txBody>
+                  <a:tcPr anchor="ctr"/>
+                </a:tc>
+                <a:tc>
+                  <a:txBody>
+                    <a:bodyPr/>
+                    <a:lstStyle/>
+                    <a:p>
+                      <a:r>
+                        <a:rPr lang="en-US" sz="1000" dirty="0" smtClean="0">
+                          <a:effectLst/>
+                          <a:latin typeface="CMR10" charset="0"/>
+                        </a:rPr>
+                        <a:t>0 LOC, 0 LOD</a:t>
+                      </a:r>
+                    </a:p>
+                  </a:txBody>
+                  <a:tcPr anchor="ctr"/>
+                </a:tc>
+                <a:tc>
+                  <a:txBody>
+                    <a:bodyPr/>
+                    <a:lstStyle/>
+                    <a:p>
+                      <a:r>
+                        <a:rPr lang="en-US" sz="1000" dirty="0" smtClean="0">
+                          <a:effectLst/>
+                          <a:latin typeface="CMR10" charset="0"/>
+                        </a:rPr>
+                        <a:t>true</a:t>
+                      </a:r>
+                      <a:r>
+                        <a:rPr lang="tr-TR" sz="1000" dirty="0" smtClean="0">
+                          <a:effectLst/>
+                          <a:latin typeface="CMR10" charset="0"/>
+                        </a:rPr>
+                        <a:t> </a:t>
+                      </a:r>
+                      <a:endParaRPr lang="tr-TR" sz="1400" dirty="0">
+                        <a:effectLst/>
+                      </a:endParaRPr>
+                    </a:p>
+                  </a:txBody>
+                  <a:tcPr anchor="ctr"/>
+                </a:tc>
+                <a:extLst>
+                  <a:ext uri="{0D108BD9-81ED-4DB2-BD59-A6C34878D82A}">
+                    <a16:rowId xmlns:a16="http://schemas.microsoft.com/office/drawing/2014/main" val="10001"/>
+                  </a:ext>
+                </a:extLst>
+              </a:tr>
+              <a:tr h="370840">
                 <a:tc>
                   <a:txBody>
                     <a:bodyPr/>
@@ -5485,13 +6473,13 @@
                     <a:lstStyle/>
                     <a:p>
                       <a:r>
-                        <a:rPr lang="mr-IN" sz="1000">
-                          <a:effectLst/>
-                          <a:latin typeface="CMR10" charset="0"/>
-                        </a:rPr>
-                        <a:t>- </a:t>
-                      </a:r>
-                      <a:endParaRPr lang="mr-IN" sz="1400">
+                        <a:rPr lang="en-US" sz="1000" dirty="0">
+                          <a:effectLst/>
+                          <a:latin typeface="CMR10" charset="0"/>
+                        </a:rPr>
+                        <a:t>15 lines without comments </a:t>
+                      </a:r>
+                      <a:endParaRPr lang="en-US" sz="1400" dirty="0">
                         <a:effectLst/>
                       </a:endParaRPr>
                     </a:p>
@@ -5504,11 +6492,89 @@
                     <a:lstStyle/>
                     <a:p>
                       <a:r>
+                        <a:rPr lang="es-ES_tradnl" sz="1000">
+                          <a:effectLst/>
+                          <a:latin typeface="CMR10" charset="0"/>
+                        </a:rPr>
+                        <a:t>15 LOC, 0 LOD </a:t>
+                      </a:r>
+                      <a:endParaRPr lang="es-ES_tradnl" sz="1400">
+                        <a:effectLst/>
+                      </a:endParaRPr>
+                    </a:p>
+                  </a:txBody>
+                  <a:tcPr anchor="ctr"/>
+                </a:tc>
+                <a:tc>
+                  <a:txBody>
+                    <a:bodyPr/>
+                    <a:lstStyle/>
+                    <a:p>
+                      <a:r>
+                        <a:rPr lang="en-US" sz="1000" dirty="0" smtClean="0">
+                          <a:effectLst/>
+                          <a:latin typeface="CMR10" charset="0"/>
+                        </a:rPr>
+                        <a:t>15 LOC,</a:t>
+                      </a:r>
+                      <a:r>
+                        <a:rPr lang="en-US" sz="1000" baseline="0" dirty="0" smtClean="0">
+                          <a:effectLst/>
+                          <a:latin typeface="CMR10" charset="0"/>
+                        </a:rPr>
+                        <a:t> 0 LOD</a:t>
+                      </a:r>
+                      <a:endParaRPr lang="tr-TR" sz="1400" dirty="0">
+                        <a:effectLst/>
+                      </a:endParaRPr>
+                    </a:p>
+                  </a:txBody>
+                  <a:tcPr anchor="ctr"/>
+                </a:tc>
+                <a:tc>
+                  <a:txBody>
+                    <a:bodyPr/>
+                    <a:lstStyle/>
+                    <a:p>
+                      <a:r>
+                        <a:rPr lang="en-US" sz="1000" dirty="0" smtClean="0">
+                          <a:effectLst/>
+                          <a:latin typeface="CMR10" charset="0"/>
+                        </a:rPr>
+                        <a:t>true</a:t>
+                      </a:r>
+                      <a:r>
+                        <a:rPr lang="tr-TR" sz="1000" dirty="0" smtClean="0">
+                          <a:effectLst/>
+                          <a:latin typeface="CMR10" charset="0"/>
+                        </a:rPr>
+                        <a:t> </a:t>
+                      </a:r>
+                      <a:endParaRPr lang="tr-TR" sz="1400" dirty="0">
+                        <a:effectLst/>
+                      </a:endParaRPr>
+                    </a:p>
+                  </a:txBody>
+                  <a:tcPr anchor="ctr"/>
+                </a:tc>
+                <a:extLst>
+                  <a:ext uri="{0D108BD9-81ED-4DB2-BD59-A6C34878D82A}">
+                    <a16:rowId xmlns:a16="http://schemas.microsoft.com/office/drawing/2014/main" val="10002"/>
+                  </a:ext>
+                </a:extLst>
+              </a:tr>
+              <a:tr h="370840">
+                <a:tc>
+                  <a:txBody>
+                    <a:bodyPr/>
+                    <a:lstStyle/>
+                    <a:p>
+                      <a:r>
                         <a:rPr lang="en-US" sz="1000">
                           <a:effectLst/>
                           <a:latin typeface="CMR10" charset="0"/>
                         </a:rPr>
-                        <a:t>SUB </a:t>
+                        <a:t>3 </a:t>
                       </a:r>
                       <a:endParaRPr lang="en-US" sz="1400">
                         <a:effectLst/>
@@ -5527,7 +6593,7 @@
                           <a:effectLst/>
                           <a:latin typeface="CMR10" charset="0"/>
                         </a:rPr>
-                        <a:t>SUB </a:t>
+                        <a:t>21 lines of just comments </a:t>
                       </a:r>
                       <a:endParaRPr lang="en-US" sz="1400">
                         <a:effectLst/>
@@ -5542,32 +6608,82 @@
                     <a:lstStyle/>
                     <a:p>
                       <a:r>
-                        <a:rPr lang="en-US" sz="1000">
-                          <a:effectLst/>
-                          <a:latin typeface="CMR10" charset="0"/>
-                        </a:rPr>
-                        <a:t>true </a:t>
-                      </a:r>
-                      <a:endParaRPr lang="en-US" sz="1400">
+                        <a:rPr lang="es-ES_tradnl" sz="1000">
+                          <a:effectLst/>
+                          <a:latin typeface="CMR10" charset="0"/>
+                        </a:rPr>
+                        <a:t>0 LOC, 21 LOD </a:t>
+                      </a:r>
+                      <a:endParaRPr lang="es-ES_tradnl" sz="1400">
                         <a:effectLst/>
                       </a:endParaRPr>
                     </a:p>
                   </a:txBody>
                   <a:tcPr anchor="ctr"/>
                 </a:tc>
-              </a:tr>
-              <a:tr h="241093">
                 <a:tc>
                   <a:txBody>
                     <a:bodyPr/>
                     <a:lstStyle/>
                     <a:p>
                       <a:r>
+                        <a:rPr lang="en-US" sz="1000" dirty="0" smtClean="0">
+                          <a:effectLst/>
+                          <a:latin typeface="CMR10" charset="0"/>
+                        </a:rPr>
+                        <a:t>0 LOC, 21 LOD</a:t>
+                      </a:r>
+                      <a:endParaRPr lang="tr-TR" sz="1400" dirty="0">
+                        <a:effectLst/>
+                      </a:endParaRPr>
+                    </a:p>
+                  </a:txBody>
+                  <a:tcPr anchor="ctr"/>
+                </a:tc>
+                <a:tc>
+                  <a:txBody>
+                    <a:bodyPr/>
+                    <a:lstStyle/>
+                    <a:p>
+                      <a:r>
+                        <a:rPr lang="en-US" sz="1000" dirty="0" smtClean="0">
+                          <a:effectLst/>
+                          <a:latin typeface="CMR10" charset="0"/>
+                        </a:rPr>
+                        <a:t>true</a:t>
+                      </a:r>
+                      <a:r>
+                        <a:rPr lang="tr-TR" sz="1000" dirty="0" smtClean="0">
+                          <a:effectLst/>
+                          <a:latin typeface="CMR10" charset="0"/>
+                        </a:rPr>
+                        <a:t> </a:t>
+                      </a:r>
+                      <a:endParaRPr lang="tr-TR" sz="1400" dirty="0">
+                        <a:effectLst/>
+                      </a:endParaRPr>
+                    </a:p>
+                  </a:txBody>
+                  <a:tcPr anchor="ctr"/>
+                </a:tc>
+                <a:extLst>
+                  <a:ext uri="{0D108BD9-81ED-4DB2-BD59-A6C34878D82A}">
+                    <a16:rowId xmlns:a16="http://schemas.microsoft.com/office/drawing/2014/main" val="10003"/>
+                  </a:ext>
+                </a:extLst>
+              </a:tr>
+              <a:tr h="370840">
+                <a:tc>
+                  <a:txBody>
+                    <a:bodyPr/>
+                    <a:lstStyle/>
+                    <a:p>
+                      <a:r>
                         <a:rPr lang="en-US" sz="1000">
                           <a:effectLst/>
                           <a:latin typeface="CMR10" charset="0"/>
                         </a:rPr>
-                        <a:t>3 </a:t>
+                        <a:t>4 </a:t>
                       </a:r>
                       <a:endParaRPr lang="en-US" sz="1400">
                         <a:effectLst/>
@@ -5582,18 +6698,31 @@
                     <a:lstStyle/>
                     <a:p>
                       <a:r>
-                        <a:rPr lang="en-US" sz="1000" dirty="0" err="1">
-                          <a:effectLst/>
-                          <a:latin typeface="CMR10" charset="0"/>
-                        </a:rPr>
-                        <a:t>int</a:t>
-                      </a:r>
-                      <a:r>
                         <a:rPr lang="en-US" sz="1000" dirty="0">
                           <a:effectLst/>
                           <a:latin typeface="CMR10" charset="0"/>
                         </a:rPr>
-                        <a:t> main() </a:t>
+                        <a:t>7 lines of comments </a:t>
+                      </a:r>
+                      <a:endParaRPr lang="en-US" sz="1000" dirty="0" smtClean="0">
+                        <a:effectLst/>
+                        <a:latin typeface="CMR10" charset="0"/>
+                      </a:endParaRPr>
+                    </a:p>
+                    <a:p>
+                      <a:r>
+                        <a:rPr lang="en-US" sz="1000" dirty="0" smtClean="0">
+                          <a:effectLst/>
+                          <a:latin typeface="CMR10" charset="0"/>
+                        </a:rPr>
+                        <a:t>8 </a:t>
+                      </a:r>
+                      <a:r>
+                        <a:rPr lang="en-US" sz="1000" dirty="0">
+                          <a:effectLst/>
+                          <a:latin typeface="CMR10" charset="0"/>
+                        </a:rPr>
+                        <a:t>lines of code </a:t>
                       </a:r>
                       <a:endParaRPr lang="en-US" sz="1400" dirty="0">
                         <a:effectLst/>
@@ -5608,11 +6737,89 @@
                     <a:lstStyle/>
                     <a:p>
                       <a:r>
+                        <a:rPr lang="es-ES_tradnl" sz="1000">
+                          <a:effectLst/>
+                          <a:latin typeface="CMR10" charset="0"/>
+                        </a:rPr>
+                        <a:t>8 LOC, 7 LOD </a:t>
+                      </a:r>
+                      <a:endParaRPr lang="es-ES_tradnl" sz="1400">
+                        <a:effectLst/>
+                      </a:endParaRPr>
+                    </a:p>
+                  </a:txBody>
+                  <a:tcPr anchor="ctr"/>
+                </a:tc>
+                <a:tc>
+                  <a:txBody>
+                    <a:bodyPr/>
+                    <a:lstStyle/>
+                    <a:p>
+                      <a:r>
+                        <a:rPr lang="en-US" sz="1000" dirty="0" smtClean="0">
+                          <a:effectLst/>
+                          <a:latin typeface="CMR10" charset="0"/>
+                        </a:rPr>
+                        <a:t>8</a:t>
+                      </a:r>
+                      <a:r>
+                        <a:rPr lang="en-US" sz="1000" baseline="0" dirty="0" smtClean="0">
+                          <a:effectLst/>
+                          <a:latin typeface="CMR10" charset="0"/>
+                        </a:rPr>
+                        <a:t> LOC, 7 LOD</a:t>
+                      </a:r>
+                      <a:endParaRPr lang="tr-TR" sz="1400" dirty="0">
+                        <a:effectLst/>
+                      </a:endParaRPr>
+                    </a:p>
+                  </a:txBody>
+                  <a:tcPr anchor="ctr"/>
+                </a:tc>
+                <a:tc>
+                  <a:txBody>
+                    <a:bodyPr/>
+                    <a:lstStyle/>
+                    <a:p>
+                      <a:r>
+                        <a:rPr lang="en-US" sz="1000" dirty="0" smtClean="0">
+                          <a:effectLst/>
+                          <a:latin typeface="CMR10" charset="0"/>
+                        </a:rPr>
+                        <a:t>true</a:t>
+                      </a:r>
+                      <a:r>
+                        <a:rPr lang="tr-TR" sz="1000" dirty="0" smtClean="0">
+                          <a:effectLst/>
+                          <a:latin typeface="CMR10" charset="0"/>
+                        </a:rPr>
+                        <a:t> </a:t>
+                      </a:r>
+                      <a:endParaRPr lang="tr-TR" sz="1400" dirty="0">
+                        <a:effectLst/>
+                      </a:endParaRPr>
+                    </a:p>
+                  </a:txBody>
+                  <a:tcPr anchor="ctr"/>
+                </a:tc>
+                <a:extLst>
+                  <a:ext uri="{0D108BD9-81ED-4DB2-BD59-A6C34878D82A}">
+                    <a16:rowId xmlns:a16="http://schemas.microsoft.com/office/drawing/2014/main" val="10004"/>
+                  </a:ext>
+                </a:extLst>
+              </a:tr>
+              <a:tr h="370840">
+                <a:tc>
+                  <a:txBody>
+                    <a:bodyPr/>
+                    <a:lstStyle/>
+                    <a:p>
+                      <a:r>
                         <a:rPr lang="en-US" sz="1000">
                           <a:effectLst/>
                           <a:latin typeface="CMR10" charset="0"/>
                         </a:rPr>
-                        <a:t>FUNCTION </a:t>
+                        <a:t>5 </a:t>
                       </a:r>
                       <a:endParaRPr lang="en-US" sz="1400">
                         <a:effectLst/>
@@ -5631,7 +6838,57 @@
                           <a:effectLst/>
                           <a:latin typeface="CMR10" charset="0"/>
                         </a:rPr>
-                        <a:t>FUNCTION </a:t>
+                        <a:t>2 </a:t>
+                      </a:r>
+                      <a:r>
+                        <a:rPr lang="en-US" sz="1000" dirty="0" smtClean="0">
+                          <a:effectLst/>
+                          <a:latin typeface="CMR10" charset="0"/>
+                        </a:rPr>
+                        <a:t>lines of code</a:t>
+                      </a:r>
+                      <a:r>
+                        <a:rPr lang="en-US" sz="1000" dirty="0">
+                          <a:effectLst/>
+                          <a:latin typeface="CMR10" charset="0"/>
+                        </a:rPr>
+                        <a:t/>
+                      </a:r>
+                      <a:br>
+                        <a:rPr lang="en-US" sz="1000" dirty="0">
+                          <a:effectLst/>
+                          <a:latin typeface="CMR10" charset="0"/>
+                        </a:rPr>
+                      </a:br>
+                      <a:r>
+                        <a:rPr lang="en-US" sz="1000" dirty="0">
+                          <a:effectLst/>
+                          <a:latin typeface="CMR10" charset="0"/>
+                        </a:rPr>
+                        <a:t>12 </a:t>
+                      </a:r>
+                      <a:r>
+                        <a:rPr lang="en-US" sz="1000" dirty="0" smtClean="0">
+                          <a:effectLst/>
+                          <a:latin typeface="CMR10" charset="0"/>
+                        </a:rPr>
+                        <a:t>lines of comments</a:t>
+                      </a:r>
+                    </a:p>
+                    <a:p>
+                      <a:r>
+                        <a:rPr lang="en-US" sz="1000" dirty="0" smtClean="0">
+                          <a:effectLst/>
+                          <a:latin typeface="CMR10" charset="0"/>
+                        </a:rPr>
+                        <a:t>53 </a:t>
+                      </a:r>
+                      <a:r>
+                        <a:rPr lang="en-US" sz="1000" dirty="0">
+                          <a:effectLst/>
+                          <a:latin typeface="CMR10" charset="0"/>
+                        </a:rPr>
+                        <a:t>lines of code </a:t>
                       </a:r>
                       <a:endParaRPr lang="en-US" sz="1400" dirty="0">
                         <a:effectLst/>
@@ -5646,653 +6903,11 @@
                     <a:lstStyle/>
                     <a:p>
                       <a:r>
-                        <a:rPr lang="en-US" sz="1000">
-                          <a:effectLst/>
-                          <a:latin typeface="CMR10" charset="0"/>
-                        </a:rPr>
-                        <a:t>true </a:t>
-                      </a:r>
-                      <a:endParaRPr lang="en-US" sz="1400">
-                        <a:effectLst/>
-                      </a:endParaRPr>
-                    </a:p>
-                  </a:txBody>
-                  <a:tcPr anchor="ctr"/>
-                </a:tc>
-              </a:tr>
-              <a:tr h="277422">
-                <a:tc>
-                  <a:txBody>
-                    <a:bodyPr/>
-                    <a:lstStyle/>
-                    <a:p>
-                      <a:r>
-                        <a:rPr lang="en-US" sz="1000">
-                          <a:effectLst/>
-                          <a:latin typeface="CMR10" charset="0"/>
-                        </a:rPr>
-                        <a:t>4 </a:t>
-                      </a:r>
-                      <a:endParaRPr lang="en-US" sz="1400">
-                        <a:effectLst/>
-                      </a:endParaRPr>
-                    </a:p>
-                  </a:txBody>
-                  <a:tcPr anchor="ctr"/>
-                </a:tc>
-                <a:tc>
-                  <a:txBody>
-                    <a:bodyPr/>
-                    <a:lstStyle/>
-                    <a:p>
-                      <a:r>
-                        <a:rPr lang="en-US" sz="1000" dirty="0">
-                          <a:effectLst/>
-                          <a:latin typeface="CMR10" charset="0"/>
-                        </a:rPr>
-                        <a:t>#include </a:t>
-                      </a:r>
-                      <a:r>
-                        <a:rPr lang="en-US" sz="1000" dirty="0">
-                          <a:effectLst/>
-                          <a:latin typeface="CMMI10" charset="0"/>
-                        </a:rPr>
-                        <a:t>&lt;</a:t>
-                      </a:r>
-                      <a:r>
-                        <a:rPr lang="en-US" sz="1000" dirty="0" err="1">
-                          <a:effectLst/>
-                          <a:latin typeface="CMR10" charset="0"/>
-                        </a:rPr>
-                        <a:t>iostream</a:t>
-                      </a:r>
-                      <a:r>
-                        <a:rPr lang="en-US" sz="1000" dirty="0">
-                          <a:effectLst/>
-                          <a:latin typeface="CMR10" charset="0"/>
-                        </a:rPr>
-                        <a:t> </a:t>
-                      </a:r>
-                      <a:r>
-                        <a:rPr lang="en-US" sz="1000" dirty="0">
-                          <a:effectLst/>
-                          <a:latin typeface="CMMI10" charset="0"/>
-                        </a:rPr>
-                        <a:t>&gt;</a:t>
-                      </a:r>
-                      <a:r>
-                        <a:rPr lang="en-US" sz="1000" dirty="0">
-                          <a:effectLst/>
-                          <a:latin typeface="CMR10" charset="0"/>
-                        </a:rPr>
-                        <a:t>(.</a:t>
-                      </a:r>
-                      <a:r>
-                        <a:rPr lang="en-US" sz="1000" dirty="0" err="1">
-                          <a:effectLst/>
-                          <a:latin typeface="CMR10" charset="0"/>
-                        </a:rPr>
-                        <a:t>cpp</a:t>
-                      </a:r>
-                      <a:r>
-                        <a:rPr lang="en-US" sz="1000" dirty="0">
-                          <a:effectLst/>
-                          <a:latin typeface="CMR10" charset="0"/>
-                        </a:rPr>
-                        <a:t>) </a:t>
-                      </a:r>
-                      <a:endParaRPr lang="en-US" sz="1400" dirty="0">
-                        <a:effectLst/>
-                      </a:endParaRPr>
-                    </a:p>
-                  </a:txBody>
-                  <a:tcPr anchor="ctr"/>
-                </a:tc>
-                <a:tc>
-                  <a:txBody>
-                    <a:bodyPr/>
-                    <a:lstStyle/>
-                    <a:p>
-                      <a:r>
-                        <a:rPr lang="en-US" sz="1000">
-                          <a:effectLst/>
-                          <a:latin typeface="CMR10" charset="0"/>
-                        </a:rPr>
-                        <a:t>IMPORT </a:t>
-                      </a:r>
-                      <a:endParaRPr lang="en-US" sz="1400">
-                        <a:effectLst/>
-                      </a:endParaRPr>
-                    </a:p>
-                  </a:txBody>
-                  <a:tcPr anchor="ctr"/>
-                </a:tc>
-                <a:tc>
-                  <a:txBody>
-                    <a:bodyPr/>
-                    <a:lstStyle/>
-                    <a:p>
-                      <a:r>
-                        <a:rPr lang="en-US" sz="1000">
-                          <a:effectLst/>
-                          <a:latin typeface="CMR10" charset="0"/>
-                        </a:rPr>
-                        <a:t>IMPORT </a:t>
-                      </a:r>
-                      <a:endParaRPr lang="en-US" sz="1400">
-                        <a:effectLst/>
-                      </a:endParaRPr>
-                    </a:p>
-                  </a:txBody>
-                  <a:tcPr anchor="ctr"/>
-                </a:tc>
-                <a:tc>
-                  <a:txBody>
-                    <a:bodyPr/>
-                    <a:lstStyle/>
-                    <a:p>
-                      <a:r>
-                        <a:rPr lang="en-US" sz="1000">
-                          <a:effectLst/>
-                          <a:latin typeface="CMR10" charset="0"/>
-                        </a:rPr>
-                        <a:t>true </a:t>
-                      </a:r>
-                      <a:endParaRPr lang="en-US" sz="1400">
-                        <a:effectLst/>
-                      </a:endParaRPr>
-                    </a:p>
-                  </a:txBody>
-                  <a:tcPr anchor="ctr"/>
-                </a:tc>
-              </a:tr>
-              <a:tr h="386409">
-                <a:tc>
-                  <a:txBody>
-                    <a:bodyPr/>
-                    <a:lstStyle/>
-                    <a:p>
-                      <a:r>
-                        <a:rPr lang="en-US" sz="1000">
-                          <a:effectLst/>
-                          <a:latin typeface="CMR10" charset="0"/>
-                        </a:rPr>
-                        <a:t>5 </a:t>
-                      </a:r>
-                      <a:endParaRPr lang="en-US" sz="1400">
-                        <a:effectLst/>
-                      </a:endParaRPr>
-                    </a:p>
-                  </a:txBody>
-                  <a:tcPr anchor="ctr"/>
-                </a:tc>
-                <a:tc>
-                  <a:txBody>
-                    <a:bodyPr/>
-                    <a:lstStyle/>
-                    <a:p>
-                      <a:r>
-                        <a:rPr lang="en-US" sz="1000" dirty="0">
-                          <a:effectLst/>
-                          <a:latin typeface="CMR10" charset="0"/>
-                        </a:rPr>
-                        <a:t>import </a:t>
-                      </a:r>
-                      <a:r>
-                        <a:rPr lang="en-US" sz="1000" dirty="0" err="1">
-                          <a:effectLst/>
-                          <a:latin typeface="CMR10" charset="0"/>
-                        </a:rPr>
-                        <a:t>java.util.Date</a:t>
-                      </a:r>
-                      <a:r>
-                        <a:rPr lang="en-US" sz="1000" dirty="0">
-                          <a:effectLst/>
-                          <a:latin typeface="CMR10" charset="0"/>
-                        </a:rPr>
-                        <a:t> (.java) </a:t>
-                      </a:r>
-                      <a:endParaRPr lang="en-US" sz="1400" dirty="0">
-                        <a:effectLst/>
-                      </a:endParaRPr>
-                    </a:p>
-                  </a:txBody>
-                  <a:tcPr anchor="ctr"/>
-                </a:tc>
-                <a:tc>
-                  <a:txBody>
-                    <a:bodyPr/>
-                    <a:lstStyle/>
-                    <a:p>
-                      <a:r>
-                        <a:rPr lang="en-US" sz="1000">
-                          <a:effectLst/>
-                          <a:latin typeface="CMR10" charset="0"/>
-                        </a:rPr>
-                        <a:t>IMPORT </a:t>
-                      </a:r>
-                      <a:endParaRPr lang="en-US" sz="1400">
-                        <a:effectLst/>
-                      </a:endParaRPr>
-                    </a:p>
-                  </a:txBody>
-                  <a:tcPr anchor="ctr"/>
-                </a:tc>
-                <a:tc>
-                  <a:txBody>
-                    <a:bodyPr/>
-                    <a:lstStyle/>
-                    <a:p>
-                      <a:r>
-                        <a:rPr lang="en-US" sz="1000">
-                          <a:effectLst/>
-                          <a:latin typeface="CMR10" charset="0"/>
-                        </a:rPr>
-                        <a:t>IMPORT </a:t>
-                      </a:r>
-                      <a:endParaRPr lang="en-US" sz="1400">
-                        <a:effectLst/>
-                      </a:endParaRPr>
-                    </a:p>
-                  </a:txBody>
-                  <a:tcPr anchor="ctr"/>
-                </a:tc>
-                <a:tc>
-                  <a:txBody>
-                    <a:bodyPr/>
-                    <a:lstStyle/>
-                    <a:p>
-                      <a:r>
-                        <a:rPr lang="en-US" sz="1000">
-                          <a:effectLst/>
-                          <a:latin typeface="CMR10" charset="0"/>
-                        </a:rPr>
-                        <a:t>true </a:t>
-                      </a:r>
-                      <a:endParaRPr lang="en-US" sz="1400">
-                        <a:effectLst/>
-                      </a:endParaRPr>
-                    </a:p>
-                  </a:txBody>
-                  <a:tcPr anchor="ctr"/>
-                </a:tc>
-              </a:tr>
-              <a:tr h="241093">
-                <a:tc>
-                  <a:txBody>
-                    <a:bodyPr/>
-                    <a:lstStyle/>
-                    <a:p>
-                      <a:r>
-                        <a:rPr lang="en-US" sz="1000">
-                          <a:effectLst/>
-                          <a:latin typeface="CMR10" charset="0"/>
-                        </a:rPr>
-                        <a:t>6 </a:t>
-                      </a:r>
-                      <a:endParaRPr lang="en-US" sz="1400">
-                        <a:effectLst/>
-                      </a:endParaRPr>
-                    </a:p>
-                  </a:txBody>
-                  <a:tcPr anchor="ctr"/>
-                </a:tc>
-                <a:tc>
-                  <a:txBody>
-                    <a:bodyPr/>
-                    <a:lstStyle/>
-                    <a:p>
-                      <a:r>
-                        <a:rPr lang="en-US" sz="1000">
-                          <a:effectLst/>
-                          <a:latin typeface="CMR10" charset="0"/>
-                        </a:rPr>
-                        <a:t>//comment </a:t>
-                      </a:r>
-                      <a:endParaRPr lang="en-US" sz="1400">
-                        <a:effectLst/>
-                      </a:endParaRPr>
-                    </a:p>
-                  </a:txBody>
-                  <a:tcPr anchor="ctr"/>
-                </a:tc>
-                <a:tc>
-                  <a:txBody>
-                    <a:bodyPr/>
-                    <a:lstStyle/>
-                    <a:p>
-                      <a:r>
-                        <a:rPr lang="en-US" sz="1000">
-                          <a:effectLst/>
-                          <a:latin typeface="CMR10" charset="0"/>
-                        </a:rPr>
-                        <a:t>LINECOMMENT </a:t>
-                      </a:r>
-                      <a:endParaRPr lang="en-US" sz="1400">
-                        <a:effectLst/>
-                      </a:endParaRPr>
-                    </a:p>
-                  </a:txBody>
-                  <a:tcPr anchor="ctr"/>
-                </a:tc>
-                <a:tc>
-                  <a:txBody>
-                    <a:bodyPr/>
-                    <a:lstStyle/>
-                    <a:p>
-                      <a:r>
-                        <a:rPr lang="en-US" sz="1000">
-                          <a:effectLst/>
-                          <a:latin typeface="CMR10" charset="0"/>
-                        </a:rPr>
-                        <a:t>LINECOMMENT </a:t>
-                      </a:r>
-                      <a:endParaRPr lang="en-US" sz="1400">
-                        <a:effectLst/>
-                      </a:endParaRPr>
-                    </a:p>
-                  </a:txBody>
-                  <a:tcPr anchor="ctr"/>
-                </a:tc>
-                <a:tc>
-                  <a:txBody>
-                    <a:bodyPr/>
-                    <a:lstStyle/>
-                    <a:p>
-                      <a:r>
-                        <a:rPr lang="en-US" sz="1000">
-                          <a:effectLst/>
-                          <a:latin typeface="CMR10" charset="0"/>
-                        </a:rPr>
-                        <a:t>true </a:t>
-                      </a:r>
-                      <a:endParaRPr lang="en-US" sz="1400">
-                        <a:effectLst/>
-                      </a:endParaRPr>
-                    </a:p>
-                  </a:txBody>
-                  <a:tcPr anchor="ctr"/>
-                </a:tc>
-              </a:tr>
-              <a:tr h="277422">
-                <a:tc>
-                  <a:txBody>
-                    <a:bodyPr/>
-                    <a:lstStyle/>
-                    <a:p>
-                      <a:r>
-                        <a:rPr lang="ru-RU" sz="1000">
-                          <a:effectLst/>
-                          <a:latin typeface="CMR10" charset="0"/>
-                        </a:rPr>
-                        <a:t>7 </a:t>
-                      </a:r>
-                      <a:endParaRPr lang="ru-RU" sz="1400">
-                        <a:effectLst/>
-                      </a:endParaRPr>
-                    </a:p>
-                  </a:txBody>
-                  <a:tcPr anchor="ctr"/>
-                </a:tc>
-                <a:tc>
-                  <a:txBody>
-                    <a:bodyPr/>
-                    <a:lstStyle/>
-                    <a:p>
-                      <a:r>
-                        <a:rPr lang="mr-IN" sz="1000">
-                          <a:effectLst/>
-                          <a:latin typeface="CMR10" charset="0"/>
-                        </a:rPr>
-                        <a:t>/*comment*/ </a:t>
-                      </a:r>
-                      <a:endParaRPr lang="mr-IN" sz="1400">
-                        <a:effectLst/>
-                      </a:endParaRPr>
-                    </a:p>
-                  </a:txBody>
-                  <a:tcPr anchor="ctr"/>
-                </a:tc>
-                <a:tc>
-                  <a:txBody>
-                    <a:bodyPr/>
-                    <a:lstStyle/>
-                    <a:p>
-                      <a:r>
-                        <a:rPr lang="en-US" sz="1000">
-                          <a:effectLst/>
-                          <a:latin typeface="CMR10" charset="0"/>
-                        </a:rPr>
-                        <a:t>BLOCKCOMMENT </a:t>
-                      </a:r>
-                      <a:endParaRPr lang="en-US" sz="1400">
-                        <a:effectLst/>
-                      </a:endParaRPr>
-                    </a:p>
-                  </a:txBody>
-                  <a:tcPr anchor="ctr"/>
-                </a:tc>
-                <a:tc>
-                  <a:txBody>
-                    <a:bodyPr/>
-                    <a:lstStyle/>
-                    <a:p>
-                      <a:r>
-                        <a:rPr lang="en-US" sz="1000">
-                          <a:effectLst/>
-                          <a:latin typeface="CMR10" charset="0"/>
-                        </a:rPr>
-                        <a:t>BLOCKCOMMENT </a:t>
-                      </a:r>
-                      <a:endParaRPr lang="en-US" sz="1400">
-                        <a:effectLst/>
-                      </a:endParaRPr>
-                    </a:p>
-                  </a:txBody>
-                  <a:tcPr anchor="ctr"/>
-                </a:tc>
-                <a:tc>
-                  <a:txBody>
-                    <a:bodyPr/>
-                    <a:lstStyle/>
-                    <a:p>
-                      <a:r>
-                        <a:rPr lang="en-US" sz="1000" dirty="0">
-                          <a:effectLst/>
-                          <a:latin typeface="CMR10" charset="0"/>
-                        </a:rPr>
-                        <a:t>true </a:t>
-                      </a:r>
-                      <a:endParaRPr lang="en-US" sz="1400" dirty="0">
-                        <a:effectLst/>
-                      </a:endParaRPr>
-                    </a:p>
-                  </a:txBody>
-                  <a:tcPr anchor="ctr"/>
-                </a:tc>
-              </a:tr>
-            </a:tbl>
-          </a:graphicData>
-        </a:graphic>
-      </p:graphicFrame>
-      <p:graphicFrame>
-        <p:nvGraphicFramePr>
-          <p:cNvPr id="7" name="Table 6"/>
-          <p:cNvGraphicFramePr>
-            <a:graphicFrameLocks noGrp="1"/>
-          </p:cNvGraphicFramePr>
-          <p:nvPr>
-            <p:extLst>
-              <p:ext uri="{D42A27DB-BD31-4B8C-83A1-F6EECF244321}">
-                <p14:modId xmlns:p14="http://schemas.microsoft.com/office/powerpoint/2010/main" val="1029291822"/>
-              </p:ext>
-            </p:extLst>
-          </p:nvPr>
-        </p:nvGraphicFramePr>
-        <p:xfrm>
-          <a:off x="3279112" y="3898760"/>
-          <a:ext cx="4638989" cy="2345671"/>
-        </p:xfrm>
-        <a:graphic>
-          <a:graphicData uri="http://schemas.openxmlformats.org/drawingml/2006/table">
-            <a:tbl>
-              <a:tblPr firstRow="1" bandRow="1">
-                <a:tableStyleId>{5C22544A-7EE6-4342-B048-85BDC9FD1C3A}</a:tableStyleId>
-              </a:tblPr>
-              <a:tblGrid>
-                <a:gridCol w="398585"/>
-                <a:gridCol w="1557494"/>
-                <a:gridCol w="1125416"/>
-                <a:gridCol w="974690"/>
-                <a:gridCol w="582804"/>
-              </a:tblGrid>
-              <a:tr h="288271">
-                <a:tc>
-                  <a:txBody>
-                    <a:bodyPr/>
-                    <a:lstStyle/>
-                    <a:p>
-                      <a:r>
-                        <a:rPr lang="en-US" sz="1000" dirty="0">
-                          <a:effectLst/>
-                          <a:latin typeface="CMR10" charset="0"/>
-                        </a:rPr>
-                        <a:t>test </a:t>
-                      </a:r>
-                      <a:endParaRPr lang="en-US" sz="1400" dirty="0">
-                        <a:effectLst/>
-                      </a:endParaRPr>
-                    </a:p>
-                  </a:txBody>
-                  <a:tcPr anchor="ctr"/>
-                </a:tc>
-                <a:tc>
-                  <a:txBody>
-                    <a:bodyPr/>
-                    <a:lstStyle/>
-                    <a:p>
-                      <a:r>
-                        <a:rPr lang="en-US" sz="1000" dirty="0">
-                          <a:effectLst/>
-                          <a:latin typeface="CMR10" charset="0"/>
-                        </a:rPr>
-                        <a:t>Input </a:t>
-                      </a:r>
-                      <a:endParaRPr lang="en-US" sz="1400" dirty="0">
-                        <a:effectLst/>
-                      </a:endParaRPr>
-                    </a:p>
-                  </a:txBody>
-                  <a:tcPr anchor="ctr"/>
-                </a:tc>
-                <a:tc>
-                  <a:txBody>
-                    <a:bodyPr/>
-                    <a:lstStyle/>
-                    <a:p>
-                      <a:r>
-                        <a:rPr lang="en-US" sz="1000" dirty="0">
-                          <a:effectLst/>
-                          <a:latin typeface="CMR10" charset="0"/>
-                        </a:rPr>
-                        <a:t>Expected Output </a:t>
-                      </a:r>
-                      <a:endParaRPr lang="en-US" sz="1400" dirty="0">
-                        <a:effectLst/>
-                      </a:endParaRPr>
-                    </a:p>
-                  </a:txBody>
-                  <a:tcPr anchor="ctr"/>
-                </a:tc>
-                <a:tc>
-                  <a:txBody>
-                    <a:bodyPr/>
-                    <a:lstStyle/>
-                    <a:p>
-                      <a:r>
-                        <a:rPr lang="en-US" sz="1000">
-                          <a:effectLst/>
-                          <a:latin typeface="CMR10" charset="0"/>
-                        </a:rPr>
-                        <a:t>Actual Output </a:t>
-                      </a:r>
-                      <a:endParaRPr lang="en-US" sz="1400">
-                        <a:effectLst/>
-                      </a:endParaRPr>
-                    </a:p>
-                  </a:txBody>
-                  <a:tcPr anchor="ctr"/>
-                </a:tc>
-                <a:tc>
-                  <a:txBody>
-                    <a:bodyPr/>
-                    <a:lstStyle/>
-                    <a:p>
-                      <a:r>
-                        <a:rPr lang="en-US" sz="1000">
-                          <a:effectLst/>
-                          <a:latin typeface="CMR10" charset="0"/>
-                        </a:rPr>
-                        <a:t>Result </a:t>
-                      </a:r>
-                      <a:endParaRPr lang="en-US" sz="1400">
-                        <a:effectLst/>
-                      </a:endParaRPr>
-                    </a:p>
-                  </a:txBody>
-                  <a:tcPr anchor="ctr"/>
-                </a:tc>
-              </a:tr>
-              <a:tr h="370840">
-                <a:tc>
-                  <a:txBody>
-                    <a:bodyPr/>
-                    <a:lstStyle/>
-                    <a:p>
-                      <a:r>
-                        <a:rPr lang="ru-RU" sz="1000">
-                          <a:effectLst/>
-                          <a:latin typeface="CMR10" charset="0"/>
-                        </a:rPr>
-                        <a:t>1 </a:t>
-                      </a:r>
-                      <a:endParaRPr lang="ru-RU" sz="1400">
-                        <a:effectLst/>
-                      </a:endParaRPr>
-                    </a:p>
-                  </a:txBody>
-                  <a:tcPr anchor="ctr"/>
-                </a:tc>
-                <a:tc>
-                  <a:txBody>
-                    <a:bodyPr/>
-                    <a:lstStyle/>
-                    <a:p>
-                      <a:r>
-                        <a:rPr lang="en-US" sz="1000" dirty="0">
-                          <a:effectLst/>
-                          <a:latin typeface="CMR10" charset="0"/>
-                        </a:rPr>
-                        <a:t>empty file </a:t>
-                      </a:r>
-                      <a:endParaRPr lang="en-US" sz="1400" dirty="0">
-                        <a:effectLst/>
-                      </a:endParaRPr>
-                    </a:p>
-                  </a:txBody>
-                  <a:tcPr anchor="ctr"/>
-                </a:tc>
-                <a:tc>
-                  <a:txBody>
-                    <a:bodyPr/>
-                    <a:lstStyle/>
-                    <a:p>
-                      <a:r>
                         <a:rPr lang="es-ES_tradnl" sz="1000">
                           <a:effectLst/>
                           <a:latin typeface="CMR10" charset="0"/>
                         </a:rPr>
-                        <a:t>0 LOC, 0 LOD </a:t>
+                        <a:t>55 LOC, 12 LOD </a:t>
                       </a:r>
                       <a:endParaRPr lang="es-ES_tradnl" sz="1400">
                         <a:effectLst/>
@@ -6307,11 +6922,18 @@
                     <a:lstStyle/>
                     <a:p>
                       <a:r>
-                        <a:rPr lang="tr-TR" sz="1000" dirty="0" smtClean="0">
-                          <a:effectLst/>
-                          <a:latin typeface="CMR10" charset="0"/>
-                        </a:rPr>
-                        <a:t>TBD </a:t>
+                        <a:rPr lang="en-US" sz="1000" dirty="0" smtClean="0">
+                          <a:effectLst/>
+                          <a:latin typeface="CMR10" charset="0"/>
+                        </a:rPr>
+                        <a:t>55</a:t>
+                      </a:r>
+                      <a:r>
+                        <a:rPr lang="en-US" sz="1000" baseline="0" dirty="0" smtClean="0">
+                          <a:effectLst/>
+                          <a:latin typeface="CMR10" charset="0"/>
+                        </a:rPr>
+                        <a:t> LOC, 12 LOD</a:t>
                       </a:r>
                       <a:endParaRPr lang="tr-TR" sz="1400" dirty="0">
                         <a:effectLst/>
@@ -6326,469 +6948,18 @@
                     <a:lstStyle/>
                     <a:p>
                       <a:r>
-                        <a:rPr lang="tr-TR" sz="1000">
-                          <a:effectLst/>
-                          <a:latin typeface="CMR10" charset="0"/>
-                        </a:rPr>
-                        <a:t>TBD </a:t>
-                      </a:r>
-                      <a:endParaRPr lang="tr-TR" sz="1400">
-                        <a:effectLst/>
-                      </a:endParaRPr>
-                    </a:p>
-                  </a:txBody>
-                  <a:tcPr anchor="ctr"/>
-                </a:tc>
-              </a:tr>
-              <a:tr h="370840">
-                <a:tc>
-                  <a:txBody>
-                    <a:bodyPr/>
-                    <a:lstStyle/>
-                    <a:p>
-                      <a:r>
-                        <a:rPr lang="is-IS" sz="1000">
-                          <a:effectLst/>
-                          <a:latin typeface="CMR10" charset="0"/>
-                        </a:rPr>
-                        <a:t>2 </a:t>
-                      </a:r>
-                      <a:endParaRPr lang="is-IS" sz="1400">
-                        <a:effectLst/>
-                      </a:endParaRPr>
-                    </a:p>
-                  </a:txBody>
-                  <a:tcPr anchor="ctr"/>
-                </a:tc>
-                <a:tc>
-                  <a:txBody>
-                    <a:bodyPr/>
-                    <a:lstStyle/>
-                    <a:p>
-                      <a:r>
-                        <a:rPr lang="en-US" sz="1000" dirty="0">
-                          <a:effectLst/>
-                          <a:latin typeface="CMR10" charset="0"/>
-                        </a:rPr>
-                        <a:t>15 lines without comments </a:t>
-                      </a:r>
-                      <a:endParaRPr lang="en-US" sz="1400" dirty="0">
-                        <a:effectLst/>
-                      </a:endParaRPr>
-                    </a:p>
-                  </a:txBody>
-                  <a:tcPr anchor="ctr"/>
-                </a:tc>
-                <a:tc>
-                  <a:txBody>
-                    <a:bodyPr/>
-                    <a:lstStyle/>
-                    <a:p>
-                      <a:r>
-                        <a:rPr lang="es-ES_tradnl" sz="1000">
-                          <a:effectLst/>
-                          <a:latin typeface="CMR10" charset="0"/>
-                        </a:rPr>
-                        <a:t>15 LOC, 0 LOD </a:t>
-                      </a:r>
-                      <a:endParaRPr lang="es-ES_tradnl" sz="1400">
-                        <a:effectLst/>
-                      </a:endParaRPr>
-                    </a:p>
-                  </a:txBody>
-                  <a:tcPr anchor="ctr"/>
-                </a:tc>
-                <a:tc>
-                  <a:txBody>
-                    <a:bodyPr/>
-                    <a:lstStyle/>
-                    <a:p>
-                      <a:r>
-                        <a:rPr lang="tr-TR" sz="1000">
-                          <a:effectLst/>
-                          <a:latin typeface="CMR10" charset="0"/>
-                        </a:rPr>
-                        <a:t>TBD </a:t>
-                      </a:r>
-                      <a:endParaRPr lang="tr-TR" sz="1400">
-                        <a:effectLst/>
-                      </a:endParaRPr>
-                    </a:p>
-                  </a:txBody>
-                  <a:tcPr anchor="ctr"/>
-                </a:tc>
-                <a:tc>
-                  <a:txBody>
-                    <a:bodyPr/>
-                    <a:lstStyle/>
-                    <a:p>
-                      <a:r>
-                        <a:rPr lang="tr-TR" sz="1000">
-                          <a:effectLst/>
-                          <a:latin typeface="CMR10" charset="0"/>
-                        </a:rPr>
-                        <a:t>TBD </a:t>
-                      </a:r>
-                      <a:endParaRPr lang="tr-TR" sz="1400">
-                        <a:effectLst/>
-                      </a:endParaRPr>
-                    </a:p>
-                  </a:txBody>
-                  <a:tcPr anchor="ctr"/>
-                </a:tc>
-              </a:tr>
-              <a:tr h="370840">
-                <a:tc>
-                  <a:txBody>
-                    <a:bodyPr/>
-                    <a:lstStyle/>
-                    <a:p>
-                      <a:r>
-                        <a:rPr lang="en-US" sz="1000">
-                          <a:effectLst/>
-                          <a:latin typeface="CMR10" charset="0"/>
-                        </a:rPr>
-                        <a:t>3 </a:t>
-                      </a:r>
-                      <a:endParaRPr lang="en-US" sz="1400">
-                        <a:effectLst/>
-                      </a:endParaRPr>
-                    </a:p>
-                  </a:txBody>
-                  <a:tcPr anchor="ctr"/>
-                </a:tc>
-                <a:tc>
-                  <a:txBody>
-                    <a:bodyPr/>
-                    <a:lstStyle/>
-                    <a:p>
-                      <a:r>
-                        <a:rPr lang="en-US" sz="1000">
-                          <a:effectLst/>
-                          <a:latin typeface="CMR10" charset="0"/>
-                        </a:rPr>
-                        <a:t>21 lines of just comments </a:t>
-                      </a:r>
-                      <a:endParaRPr lang="en-US" sz="1400">
-                        <a:effectLst/>
-                      </a:endParaRPr>
-                    </a:p>
-                  </a:txBody>
-                  <a:tcPr anchor="ctr"/>
-                </a:tc>
-                <a:tc>
-                  <a:txBody>
-                    <a:bodyPr/>
-                    <a:lstStyle/>
-                    <a:p>
-                      <a:r>
-                        <a:rPr lang="es-ES_tradnl" sz="1000">
-                          <a:effectLst/>
-                          <a:latin typeface="CMR10" charset="0"/>
-                        </a:rPr>
-                        <a:t>0 LOC, 21 LOD </a:t>
-                      </a:r>
-                      <a:endParaRPr lang="es-ES_tradnl" sz="1400">
-                        <a:effectLst/>
-                      </a:endParaRPr>
-                    </a:p>
-                  </a:txBody>
-                  <a:tcPr anchor="ctr"/>
-                </a:tc>
-                <a:tc>
-                  <a:txBody>
-                    <a:bodyPr/>
-                    <a:lstStyle/>
-                    <a:p>
-                      <a:r>
-                        <a:rPr lang="tr-TR" sz="1000">
-                          <a:effectLst/>
-                          <a:latin typeface="CMR10" charset="0"/>
-                        </a:rPr>
-                        <a:t>TBD </a:t>
-                      </a:r>
-                      <a:endParaRPr lang="tr-TR" sz="1400">
-                        <a:effectLst/>
-                      </a:endParaRPr>
-                    </a:p>
-                  </a:txBody>
-                  <a:tcPr anchor="ctr"/>
-                </a:tc>
-                <a:tc>
-                  <a:txBody>
-                    <a:bodyPr/>
-                    <a:lstStyle/>
-                    <a:p>
-                      <a:r>
-                        <a:rPr lang="tr-TR" sz="1000">
-                          <a:effectLst/>
-                          <a:latin typeface="CMR10" charset="0"/>
-                        </a:rPr>
-                        <a:t>TBD </a:t>
-                      </a:r>
-                      <a:endParaRPr lang="tr-TR" sz="1400">
-                        <a:effectLst/>
-                      </a:endParaRPr>
-                    </a:p>
-                  </a:txBody>
-                  <a:tcPr anchor="ctr"/>
-                </a:tc>
-              </a:tr>
-              <a:tr h="370840">
-                <a:tc>
-                  <a:txBody>
-                    <a:bodyPr/>
-                    <a:lstStyle/>
-                    <a:p>
-                      <a:r>
-                        <a:rPr lang="en-US" sz="1000">
-                          <a:effectLst/>
-                          <a:latin typeface="CMR10" charset="0"/>
-                        </a:rPr>
-                        <a:t>4 </a:t>
-                      </a:r>
-                      <a:endParaRPr lang="en-US" sz="1400">
-                        <a:effectLst/>
-                      </a:endParaRPr>
-                    </a:p>
-                  </a:txBody>
-                  <a:tcPr anchor="ctr"/>
-                </a:tc>
-                <a:tc>
-                  <a:txBody>
-                    <a:bodyPr/>
-                    <a:lstStyle/>
-                    <a:p>
-                      <a:r>
-                        <a:rPr lang="en-US" sz="1000" dirty="0">
-                          <a:effectLst/>
-                          <a:latin typeface="CMR10" charset="0"/>
-                        </a:rPr>
-                        <a:t>7 lines of comments </a:t>
-                      </a:r>
-                      <a:endParaRPr lang="en-US" sz="1000" dirty="0" smtClean="0">
-                        <a:effectLst/>
-                        <a:latin typeface="CMR10" charset="0"/>
-                      </a:endParaRPr>
-                    </a:p>
-                    <a:p>
-                      <a:r>
                         <a:rPr lang="en-US" sz="1000" dirty="0" smtClean="0">
                           <a:effectLst/>
                           <a:latin typeface="CMR10" charset="0"/>
                         </a:rPr>
-                        <a:t>8 </a:t>
-                      </a:r>
-                      <a:r>
-                        <a:rPr lang="en-US" sz="1000" dirty="0">
-                          <a:effectLst/>
-                          <a:latin typeface="CMR10" charset="0"/>
-                        </a:rPr>
-                        <a:t>lines of code </a:t>
-                      </a:r>
-                      <a:endParaRPr lang="en-US" sz="1400" dirty="0">
-                        <a:effectLst/>
-                      </a:endParaRPr>
-                    </a:p>
-                  </a:txBody>
-                  <a:tcPr anchor="ctr"/>
-                </a:tc>
-                <a:tc>
-                  <a:txBody>
-                    <a:bodyPr/>
-                    <a:lstStyle/>
-                    <a:p>
-                      <a:r>
-                        <a:rPr lang="es-ES_tradnl" sz="1000">
-                          <a:effectLst/>
-                          <a:latin typeface="CMR10" charset="0"/>
-                        </a:rPr>
-                        <a:t>8 LOC, 7 LOD </a:t>
-                      </a:r>
-                      <a:endParaRPr lang="es-ES_tradnl" sz="1400">
-                        <a:effectLst/>
-                      </a:endParaRPr>
-                    </a:p>
-                  </a:txBody>
-                  <a:tcPr anchor="ctr"/>
-                </a:tc>
-                <a:tc>
-                  <a:txBody>
-                    <a:bodyPr/>
-                    <a:lstStyle/>
-                    <a:p>
-                      <a:r>
-                        <a:rPr lang="tr-TR" sz="1000">
-                          <a:effectLst/>
-                          <a:latin typeface="CMR10" charset="0"/>
-                        </a:rPr>
-                        <a:t>TBD </a:t>
-                      </a:r>
-                      <a:endParaRPr lang="tr-TR" sz="1400">
-                        <a:effectLst/>
-                      </a:endParaRPr>
-                    </a:p>
-                  </a:txBody>
-                  <a:tcPr anchor="ctr"/>
-                </a:tc>
-                <a:tc>
-                  <a:txBody>
-                    <a:bodyPr/>
-                    <a:lstStyle/>
-                    <a:p>
-                      <a:r>
-                        <a:rPr lang="tr-TR" sz="1000">
-                          <a:effectLst/>
-                          <a:latin typeface="CMR10" charset="0"/>
-                        </a:rPr>
-                        <a:t>TBD </a:t>
-                      </a:r>
-                      <a:endParaRPr lang="tr-TR" sz="1400">
-                        <a:effectLst/>
-                      </a:endParaRPr>
-                    </a:p>
-                  </a:txBody>
-                  <a:tcPr anchor="ctr"/>
-                </a:tc>
-              </a:tr>
-              <a:tr h="370840">
-                <a:tc>
-                  <a:txBody>
-                    <a:bodyPr/>
-                    <a:lstStyle/>
-                    <a:p>
-                      <a:r>
-                        <a:rPr lang="en-US" sz="1000">
-                          <a:effectLst/>
-                          <a:latin typeface="CMR10" charset="0"/>
-                        </a:rPr>
-                        <a:t>5 </a:t>
-                      </a:r>
-                      <a:endParaRPr lang="en-US" sz="1400">
-                        <a:effectLst/>
-                      </a:endParaRPr>
-                    </a:p>
-                  </a:txBody>
-                  <a:tcPr anchor="ctr"/>
-                </a:tc>
-                <a:tc>
-                  <a:txBody>
-                    <a:bodyPr/>
-                    <a:lstStyle/>
-                    <a:p>
-                      <a:r>
-                        <a:rPr lang="en-US" sz="1000" dirty="0">
-                          <a:effectLst/>
-                          <a:latin typeface="CMR10" charset="0"/>
-                        </a:rPr>
-                        <a:t>2 </a:t>
-                      </a:r>
-                      <a:r>
-                        <a:rPr lang="en-US" sz="1000" dirty="0" smtClean="0">
-                          <a:effectLst/>
-                          <a:latin typeface="CMR10" charset="0"/>
-                        </a:rPr>
-                        <a:t>lines of code</a:t>
-                      </a:r>
-                      <a:r>
-                        <a:rPr lang="en-US" sz="1000" dirty="0">
-                          <a:effectLst/>
-                          <a:latin typeface="CMR10" charset="0"/>
-                        </a:rPr>
-                        <a:t/>
-                      </a:r>
-                      <a:br>
-                        <a:rPr lang="en-US" sz="1000" dirty="0">
-                          <a:effectLst/>
-                          <a:latin typeface="CMR10" charset="0"/>
-                        </a:rPr>
-                      </a:br>
-                      <a:r>
-                        <a:rPr lang="en-US" sz="1000" dirty="0">
-                          <a:effectLst/>
-                          <a:latin typeface="CMR10" charset="0"/>
-                        </a:rPr>
-                        <a:t>12 </a:t>
-                      </a:r>
-                      <a:r>
-                        <a:rPr lang="en-US" sz="1000" dirty="0" smtClean="0">
-                          <a:effectLst/>
-                          <a:latin typeface="CMR10" charset="0"/>
-                        </a:rPr>
-                        <a:t>lines of comments</a:t>
-                      </a:r>
-                    </a:p>
-                    <a:p>
-                      <a:r>
-                        <a:rPr lang="en-US" sz="1000" dirty="0" smtClean="0">
-                          <a:effectLst/>
-                          <a:latin typeface="CMR10" charset="0"/>
-                        </a:rPr>
-                        <a:t>53 </a:t>
-                      </a:r>
-                      <a:r>
-                        <a:rPr lang="en-US" sz="1000" dirty="0">
-                          <a:effectLst/>
-                          <a:latin typeface="CMR10" charset="0"/>
-                        </a:rPr>
-                        <a:t>lines of code </a:t>
-                      </a:r>
-                      <a:endParaRPr lang="en-US" sz="1400" dirty="0">
-                        <a:effectLst/>
-                      </a:endParaRPr>
-                    </a:p>
-                  </a:txBody>
-                  <a:tcPr anchor="ctr"/>
-                </a:tc>
-                <a:tc>
-                  <a:txBody>
-                    <a:bodyPr/>
-                    <a:lstStyle/>
-                    <a:p>
-                      <a:r>
-                        <a:rPr lang="es-ES_tradnl" sz="1000">
-                          <a:effectLst/>
-                          <a:latin typeface="CMR10" charset="0"/>
-                        </a:rPr>
-                        <a:t>55 LOC, 12 LOD </a:t>
-                      </a:r>
-                      <a:endParaRPr lang="es-ES_tradnl" sz="1400">
-                        <a:effectLst/>
-                      </a:endParaRPr>
-                    </a:p>
-                  </a:txBody>
-                  <a:tcPr anchor="ctr"/>
-                </a:tc>
-                <a:tc>
-                  <a:txBody>
-                    <a:bodyPr/>
-                    <a:lstStyle/>
-                    <a:p>
-                      <a:r>
-                        <a:rPr lang="tr-TR" sz="1000">
-                          <a:effectLst/>
-                          <a:latin typeface="CMR10" charset="0"/>
-                        </a:rPr>
-                        <a:t>TBD </a:t>
-                      </a:r>
-                      <a:endParaRPr lang="tr-TR" sz="1400">
-                        <a:effectLst/>
-                      </a:endParaRPr>
-                    </a:p>
-                  </a:txBody>
-                  <a:tcPr anchor="ctr"/>
-                </a:tc>
-                <a:tc>
-                  <a:txBody>
-                    <a:bodyPr/>
-                    <a:lstStyle/>
-                    <a:p>
-                      <a:r>
-                        <a:rPr lang="tr-TR" sz="1000" dirty="0">
-                          <a:effectLst/>
-                          <a:latin typeface="CMR10" charset="0"/>
-                        </a:rPr>
-                        <a:t>TBD </a:t>
+                        <a:t>true</a:t>
+                      </a:r>
+                      <a:r>
+                        <a:rPr lang="tr-TR" sz="1000" dirty="0" smtClean="0">
+                          <a:effectLst/>
+                          <a:latin typeface="CMR10" charset="0"/>
+                        </a:rPr>
+                        <a:t> </a:t>
                       </a:r>
                       <a:endParaRPr lang="tr-TR" sz="1400" dirty="0">
                         <a:effectLst/>
@@ -6797,6 +6968,11 @@
                   </a:txBody>
                   <a:tcPr anchor="ctr"/>
                 </a:tc>
+                <a:extLst>
+                  <a:ext uri="{0D108BD9-81ED-4DB2-BD59-A6C34878D82A}">
+                    <a16:rowId xmlns:a16="http://schemas.microsoft.com/office/drawing/2014/main" val="10005"/>
+                  </a:ext>
+                </a:extLst>
               </a:tr>
             </a:tbl>
           </a:graphicData>

</xml_diff>

<commit_message>
modify presentation and make ppsx version
</commit_message>
<xml_diff>
--- a/software-engineering-final.pptx
+++ b/software-engineering-final.pptx
@@ -6,21 +6,20 @@
   </p:sldMasterIdLst>
   <p:sldIdLst>
     <p:sldId id="256" r:id="rId2"/>
-    <p:sldId id="257" r:id="rId3"/>
-    <p:sldId id="267" r:id="rId4"/>
-    <p:sldId id="258" r:id="rId5"/>
-    <p:sldId id="266" r:id="rId6"/>
-    <p:sldId id="259" r:id="rId7"/>
-    <p:sldId id="268" r:id="rId8"/>
-    <p:sldId id="269" r:id="rId9"/>
-    <p:sldId id="270" r:id="rId10"/>
-    <p:sldId id="271" r:id="rId11"/>
-    <p:sldId id="261" r:id="rId12"/>
-    <p:sldId id="262" r:id="rId13"/>
-    <p:sldId id="263" r:id="rId14"/>
-    <p:sldId id="264" r:id="rId15"/>
-    <p:sldId id="260" r:id="rId16"/>
-    <p:sldId id="265" r:id="rId17"/>
+    <p:sldId id="267" r:id="rId3"/>
+    <p:sldId id="258" r:id="rId4"/>
+    <p:sldId id="266" r:id="rId5"/>
+    <p:sldId id="259" r:id="rId6"/>
+    <p:sldId id="268" r:id="rId7"/>
+    <p:sldId id="269" r:id="rId8"/>
+    <p:sldId id="270" r:id="rId9"/>
+    <p:sldId id="271" r:id="rId10"/>
+    <p:sldId id="261" r:id="rId11"/>
+    <p:sldId id="262" r:id="rId12"/>
+    <p:sldId id="263" r:id="rId13"/>
+    <p:sldId id="264" r:id="rId14"/>
+    <p:sldId id="260" r:id="rId15"/>
+    <p:sldId id="265" r:id="rId16"/>
   </p:sldIdLst>
   <p:sldSz cx="9144000" cy="6858000" type="screen4x3"/>
   <p:notesSz cx="6858000" cy="9144000"/>
@@ -258,7 +257,7 @@
           <a:p>
             <a:fld id="{94ABC641-97F1-8C45-A694-1B07B93F9841}" type="datetimeFigureOut">
               <a:rPr lang="en-US" smtClean="0"/>
-              <a:t>5/2/2017</a:t>
+              <a:t>5/2/17</a:t>
             </a:fld>
             <a:endParaRPr lang="en-US"/>
           </a:p>
@@ -428,7 +427,7 @@
           <a:p>
             <a:fld id="{94ABC641-97F1-8C45-A694-1B07B93F9841}" type="datetimeFigureOut">
               <a:rPr lang="en-US" smtClean="0"/>
-              <a:t>5/2/2017</a:t>
+              <a:t>5/2/17</a:t>
             </a:fld>
             <a:endParaRPr lang="en-US"/>
           </a:p>
@@ -608,7 +607,7 @@
           <a:p>
             <a:fld id="{94ABC641-97F1-8C45-A694-1B07B93F9841}" type="datetimeFigureOut">
               <a:rPr lang="en-US" smtClean="0"/>
-              <a:t>5/2/2017</a:t>
+              <a:t>5/2/17</a:t>
             </a:fld>
             <a:endParaRPr lang="en-US"/>
           </a:p>
@@ -778,7 +777,7 @@
           <a:p>
             <a:fld id="{94ABC641-97F1-8C45-A694-1B07B93F9841}" type="datetimeFigureOut">
               <a:rPr lang="en-US" smtClean="0"/>
-              <a:t>5/2/2017</a:t>
+              <a:t>5/2/17</a:t>
             </a:fld>
             <a:endParaRPr lang="en-US"/>
           </a:p>
@@ -1022,7 +1021,7 @@
           <a:p>
             <a:fld id="{94ABC641-97F1-8C45-A694-1B07B93F9841}" type="datetimeFigureOut">
               <a:rPr lang="en-US" smtClean="0"/>
-              <a:t>5/2/2017</a:t>
+              <a:t>5/2/17</a:t>
             </a:fld>
             <a:endParaRPr lang="en-US"/>
           </a:p>
@@ -1254,7 +1253,7 @@
           <a:p>
             <a:fld id="{94ABC641-97F1-8C45-A694-1B07B93F9841}" type="datetimeFigureOut">
               <a:rPr lang="en-US" smtClean="0"/>
-              <a:t>5/2/2017</a:t>
+              <a:t>5/2/17</a:t>
             </a:fld>
             <a:endParaRPr lang="en-US"/>
           </a:p>
@@ -1621,7 +1620,7 @@
           <a:p>
             <a:fld id="{94ABC641-97F1-8C45-A694-1B07B93F9841}" type="datetimeFigureOut">
               <a:rPr lang="en-US" smtClean="0"/>
-              <a:t>5/2/2017</a:t>
+              <a:t>5/2/17</a:t>
             </a:fld>
             <a:endParaRPr lang="en-US"/>
           </a:p>
@@ -1739,7 +1738,7 @@
           <a:p>
             <a:fld id="{94ABC641-97F1-8C45-A694-1B07B93F9841}" type="datetimeFigureOut">
               <a:rPr lang="en-US" smtClean="0"/>
-              <a:t>5/2/2017</a:t>
+              <a:t>5/2/17</a:t>
             </a:fld>
             <a:endParaRPr lang="en-US"/>
           </a:p>
@@ -1834,7 +1833,7 @@
           <a:p>
             <a:fld id="{94ABC641-97F1-8C45-A694-1B07B93F9841}" type="datetimeFigureOut">
               <a:rPr lang="en-US" smtClean="0"/>
-              <a:t>5/2/2017</a:t>
+              <a:t>5/2/17</a:t>
             </a:fld>
             <a:endParaRPr lang="en-US"/>
           </a:p>
@@ -2111,7 +2110,7 @@
           <a:p>
             <a:fld id="{94ABC641-97F1-8C45-A694-1B07B93F9841}" type="datetimeFigureOut">
               <a:rPr lang="en-US" smtClean="0"/>
-              <a:t>5/2/2017</a:t>
+              <a:t>5/2/17</a:t>
             </a:fld>
             <a:endParaRPr lang="en-US"/>
           </a:p>
@@ -2368,7 +2367,7 @@
           <a:p>
             <a:fld id="{94ABC641-97F1-8C45-A694-1B07B93F9841}" type="datetimeFigureOut">
               <a:rPr lang="en-US" smtClean="0"/>
-              <a:t>5/2/2017</a:t>
+              <a:t>5/2/17</a:t>
             </a:fld>
             <a:endParaRPr lang="en-US"/>
           </a:p>
@@ -2621,7 +2620,7 @@
           <a:p>
             <a:fld id="{94ABC641-97F1-8C45-A694-1B07B93F9841}" type="datetimeFigureOut">
               <a:rPr lang="en-US" smtClean="0"/>
-              <a:t>5/2/2017</a:t>
+              <a:t>5/2/17</a:t>
             </a:fld>
             <a:endParaRPr lang="en-US" dirty="0"/>
           </a:p>
@@ -3336,164 +3335,6 @@
           <a:p>
             <a:r>
               <a:rPr lang="en-US" dirty="0" smtClean="0"/>
-              <a:t>Original System Design</a:t>
-            </a:r>
-            <a:endParaRPr lang="en-US" dirty="0"/>
-          </a:p>
-        </p:txBody>
-      </p:sp>
-      <p:pic>
-        <p:nvPicPr>
-          <p:cNvPr id="4" name="Content Placeholder 3"/>
-          <p:cNvPicPr>
-            <a:picLocks noGrp="1" noChangeAspect="1"/>
-          </p:cNvPicPr>
-          <p:nvPr>
-            <p:ph idx="1"/>
-          </p:nvPr>
-        </p:nvPicPr>
-        <p:blipFill>
-          <a:blip r:embed="rId2">
-            <a:extLst>
-              <a:ext uri="{28A0092B-C50C-407E-A947-70E740481C1C}">
-                <a14:useLocalDpi xmlns:a14="http://schemas.microsoft.com/office/drawing/2010/main" val="0"/>
-              </a:ext>
-            </a:extLst>
-          </a:blip>
-          <a:stretch>
-            <a:fillRect/>
-          </a:stretch>
-        </p:blipFill>
-        <p:spPr>
-          <a:xfrm>
-            <a:off x="1537150" y="1825625"/>
-            <a:ext cx="6069700" cy="4351338"/>
-          </a:xfrm>
-        </p:spPr>
-      </p:pic>
-      <p:sp>
-        <p:nvSpPr>
-          <p:cNvPr id="5" name="TextBox 4"/>
-          <p:cNvSpPr txBox="1"/>
-          <p:nvPr/>
-        </p:nvSpPr>
-        <p:spPr>
-          <a:xfrm>
-            <a:off x="0" y="6311899"/>
-            <a:ext cx="1744717" cy="461665"/>
-          </a:xfrm>
-          <a:prstGeom prst="rect">
-            <a:avLst/>
-          </a:prstGeom>
-          <a:noFill/>
-        </p:spPr>
-        <p:txBody>
-          <a:bodyPr wrap="square" rtlCol="0">
-            <a:spAutoFit/>
-          </a:bodyPr>
-          <a:lstStyle/>
-          <a:p>
-            <a:r>
-              <a:rPr lang="en-US" sz="2400" dirty="0" smtClean="0">
-                <a:solidFill>
-                  <a:schemeClr val="bg1"/>
-                </a:solidFill>
-              </a:rPr>
-              <a:t>ID-10-T</a:t>
-            </a:r>
-            <a:endParaRPr lang="en-US" sz="2400" dirty="0">
-              <a:solidFill>
-                <a:schemeClr val="bg1"/>
-              </a:solidFill>
-            </a:endParaRPr>
-          </a:p>
-        </p:txBody>
-      </p:sp>
-      <p:sp>
-        <p:nvSpPr>
-          <p:cNvPr id="6" name="TextBox 5"/>
-          <p:cNvSpPr txBox="1"/>
-          <p:nvPr/>
-        </p:nvSpPr>
-        <p:spPr>
-          <a:xfrm>
-            <a:off x="4267200" y="6311899"/>
-            <a:ext cx="4876800" cy="461665"/>
-          </a:xfrm>
-          <a:prstGeom prst="rect">
-            <a:avLst/>
-          </a:prstGeom>
-          <a:noFill/>
-        </p:spPr>
-        <p:txBody>
-          <a:bodyPr wrap="square" rtlCol="0">
-            <a:spAutoFit/>
-          </a:bodyPr>
-          <a:lstStyle/>
-          <a:p>
-            <a:r>
-              <a:rPr lang="en-US" sz="2400" dirty="0" smtClean="0">
-                <a:solidFill>
-                  <a:schemeClr val="bg1"/>
-                </a:solidFill>
-              </a:rPr>
-              <a:t>Software Metrics Calculation System</a:t>
-            </a:r>
-            <a:endParaRPr lang="en-US" sz="2400" dirty="0">
-              <a:solidFill>
-                <a:schemeClr val="bg1"/>
-              </a:solidFill>
-            </a:endParaRPr>
-          </a:p>
-        </p:txBody>
-      </p:sp>
-    </p:spTree>
-    <p:extLst>
-      <p:ext uri="{BB962C8B-B14F-4D97-AF65-F5344CB8AC3E}">
-        <p14:creationId xmlns:p14="http://schemas.microsoft.com/office/powerpoint/2010/main" val="2264783950"/>
-      </p:ext>
-    </p:extLst>
-  </p:cSld>
-  <p:clrMapOvr>
-    <a:masterClrMapping/>
-  </p:clrMapOvr>
-</p:sld>
-</file>
-
-<file path=ppt/slides/slide11.xml><?xml version="1.0" encoding="utf-8"?>
-<p:sld xmlns:a="http://schemas.openxmlformats.org/drawingml/2006/main" xmlns:r="http://schemas.openxmlformats.org/officeDocument/2006/relationships" xmlns:p="http://schemas.openxmlformats.org/presentationml/2006/main">
-  <p:cSld>
-    <p:spTree>
-      <p:nvGrpSpPr>
-        <p:cNvPr id="1" name=""/>
-        <p:cNvGrpSpPr/>
-        <p:nvPr/>
-      </p:nvGrpSpPr>
-      <p:grpSpPr>
-        <a:xfrm>
-          <a:off x="0" y="0"/>
-          <a:ext cx="0" cy="0"/>
-          <a:chOff x="0" y="0"/>
-          <a:chExt cx="0" cy="0"/>
-        </a:xfrm>
-      </p:grpSpPr>
-      <p:sp>
-        <p:nvSpPr>
-          <p:cNvPr id="2" name="Title 1"/>
-          <p:cNvSpPr>
-            <a:spLocks noGrp="1"/>
-          </p:cNvSpPr>
-          <p:nvPr>
-            <p:ph type="title"/>
-          </p:nvPr>
-        </p:nvSpPr>
-        <p:spPr/>
-        <p:txBody>
-          <a:bodyPr/>
-          <a:lstStyle/>
-          <a:p>
-            <a:r>
-              <a:rPr lang="en-US" dirty="0" smtClean="0"/>
               <a:t>Test Report</a:t>
             </a:r>
             <a:endParaRPr lang="en-US" dirty="0"/>
@@ -3644,35 +3485,35 @@
                 <a:gridCol w="421769">
                   <a:extLst>
                     <a:ext uri="{9D8B030D-6E8A-4147-A177-3AD203B41FA5}">
-                      <a16:colId xmlns:a16="http://schemas.microsoft.com/office/drawing/2014/main" val="20000"/>
+                      <a16:colId xmlns:a16="http://schemas.microsoft.com/office/drawing/2014/main" xmlns="" val="20000"/>
                     </a:ext>
                   </a:extLst>
                 </a:gridCol>
                 <a:gridCol w="1691342">
                   <a:extLst>
                     <a:ext uri="{9D8B030D-6E8A-4147-A177-3AD203B41FA5}">
-                      <a16:colId xmlns:a16="http://schemas.microsoft.com/office/drawing/2014/main" val="20001"/>
+                      <a16:colId xmlns:a16="http://schemas.microsoft.com/office/drawing/2014/main" xmlns="" val="20001"/>
                     </a:ext>
                   </a:extLst>
                 </a:gridCol>
                 <a:gridCol w="1284941">
                   <a:extLst>
                     <a:ext uri="{9D8B030D-6E8A-4147-A177-3AD203B41FA5}">
-                      <a16:colId xmlns:a16="http://schemas.microsoft.com/office/drawing/2014/main" val="20002"/>
+                      <a16:colId xmlns:a16="http://schemas.microsoft.com/office/drawing/2014/main" xmlns="" val="20002"/>
                     </a:ext>
                   </a:extLst>
                 </a:gridCol>
                 <a:gridCol w="1272988">
                   <a:extLst>
                     <a:ext uri="{9D8B030D-6E8A-4147-A177-3AD203B41FA5}">
-                      <a16:colId xmlns:a16="http://schemas.microsoft.com/office/drawing/2014/main" val="20003"/>
+                      <a16:colId xmlns:a16="http://schemas.microsoft.com/office/drawing/2014/main" xmlns="" val="20003"/>
                     </a:ext>
                   </a:extLst>
                 </a:gridCol>
                 <a:gridCol w="573741">
                   <a:extLst>
                     <a:ext uri="{9D8B030D-6E8A-4147-A177-3AD203B41FA5}">
-                      <a16:colId xmlns:a16="http://schemas.microsoft.com/office/drawing/2014/main" val="20004"/>
+                      <a16:colId xmlns:a16="http://schemas.microsoft.com/office/drawing/2014/main" xmlns="" val="20004"/>
                     </a:ext>
                   </a:extLst>
                 </a:gridCol>
@@ -3775,7 +3616,7 @@
                 </a:tc>
                 <a:extLst>
                   <a:ext uri="{0D108BD9-81ED-4DB2-BD59-A6C34878D82A}">
-                    <a16:rowId xmlns:a16="http://schemas.microsoft.com/office/drawing/2014/main" val="10000"/>
+                    <a16:rowId xmlns:a16="http://schemas.microsoft.com/office/drawing/2014/main" xmlns="" val="10000"/>
                   </a:ext>
                 </a:extLst>
               </a:tr>
@@ -3877,7 +3718,7 @@
                 </a:tc>
                 <a:extLst>
                   <a:ext uri="{0D108BD9-81ED-4DB2-BD59-A6C34878D82A}">
-                    <a16:rowId xmlns:a16="http://schemas.microsoft.com/office/drawing/2014/main" val="10001"/>
+                    <a16:rowId xmlns:a16="http://schemas.microsoft.com/office/drawing/2014/main" xmlns="" val="10001"/>
                   </a:ext>
                 </a:extLst>
               </a:tr>
@@ -3979,7 +3820,7 @@
                 </a:tc>
                 <a:extLst>
                   <a:ext uri="{0D108BD9-81ED-4DB2-BD59-A6C34878D82A}">
-                    <a16:rowId xmlns:a16="http://schemas.microsoft.com/office/drawing/2014/main" val="10002"/>
+                    <a16:rowId xmlns:a16="http://schemas.microsoft.com/office/drawing/2014/main" xmlns="" val="10002"/>
                   </a:ext>
                 </a:extLst>
               </a:tr>
@@ -4088,7 +3929,7 @@
                 </a:tc>
                 <a:extLst>
                   <a:ext uri="{0D108BD9-81ED-4DB2-BD59-A6C34878D82A}">
-                    <a16:rowId xmlns:a16="http://schemas.microsoft.com/office/drawing/2014/main" val="10003"/>
+                    <a16:rowId xmlns:a16="http://schemas.microsoft.com/office/drawing/2014/main" xmlns="" val="10003"/>
                   </a:ext>
                 </a:extLst>
               </a:tr>
@@ -4239,7 +4080,7 @@
                 </a:tc>
                 <a:extLst>
                   <a:ext uri="{0D108BD9-81ED-4DB2-BD59-A6C34878D82A}">
-                    <a16:rowId xmlns:a16="http://schemas.microsoft.com/office/drawing/2014/main" val="10004"/>
+                    <a16:rowId xmlns:a16="http://schemas.microsoft.com/office/drawing/2014/main" xmlns="" val="10004"/>
                   </a:ext>
                 </a:extLst>
               </a:tr>
@@ -4355,7 +4196,7 @@
                 </a:tc>
                 <a:extLst>
                   <a:ext uri="{0D108BD9-81ED-4DB2-BD59-A6C34878D82A}">
-                    <a16:rowId xmlns:a16="http://schemas.microsoft.com/office/drawing/2014/main" val="10005"/>
+                    <a16:rowId xmlns:a16="http://schemas.microsoft.com/office/drawing/2014/main" xmlns="" val="10005"/>
                   </a:ext>
                 </a:extLst>
               </a:tr>
@@ -4457,7 +4298,7 @@
                 </a:tc>
                 <a:extLst>
                   <a:ext uri="{0D108BD9-81ED-4DB2-BD59-A6C34878D82A}">
-                    <a16:rowId xmlns:a16="http://schemas.microsoft.com/office/drawing/2014/main" val="10006"/>
+                    <a16:rowId xmlns:a16="http://schemas.microsoft.com/office/drawing/2014/main" xmlns="" val="10006"/>
                   </a:ext>
                 </a:extLst>
               </a:tr>
@@ -4559,7 +4400,7 @@
                 </a:tc>
                 <a:extLst>
                   <a:ext uri="{0D108BD9-81ED-4DB2-BD59-A6C34878D82A}">
-                    <a16:rowId xmlns:a16="http://schemas.microsoft.com/office/drawing/2014/main" val="10007"/>
+                    <a16:rowId xmlns:a16="http://schemas.microsoft.com/office/drawing/2014/main" xmlns="" val="10007"/>
                   </a:ext>
                 </a:extLst>
               </a:tr>
@@ -4595,35 +4436,35 @@
                 <a:gridCol w="414347">
                   <a:extLst>
                     <a:ext uri="{9D8B030D-6E8A-4147-A177-3AD203B41FA5}">
-                      <a16:colId xmlns:a16="http://schemas.microsoft.com/office/drawing/2014/main" val="20000"/>
+                      <a16:colId xmlns:a16="http://schemas.microsoft.com/office/drawing/2014/main" xmlns="" val="20000"/>
                     </a:ext>
                   </a:extLst>
                 </a:gridCol>
                 <a:gridCol w="1410447">
                   <a:extLst>
                     <a:ext uri="{9D8B030D-6E8A-4147-A177-3AD203B41FA5}">
-                      <a16:colId xmlns:a16="http://schemas.microsoft.com/office/drawing/2014/main" val="20001"/>
+                      <a16:colId xmlns:a16="http://schemas.microsoft.com/office/drawing/2014/main" xmlns="" val="20001"/>
                     </a:ext>
                   </a:extLst>
                 </a:gridCol>
                 <a:gridCol w="1256701">
                   <a:extLst>
                     <a:ext uri="{9D8B030D-6E8A-4147-A177-3AD203B41FA5}">
-                      <a16:colId xmlns:a16="http://schemas.microsoft.com/office/drawing/2014/main" val="20002"/>
+                      <a16:colId xmlns:a16="http://schemas.microsoft.com/office/drawing/2014/main" xmlns="" val="20002"/>
                     </a:ext>
                   </a:extLst>
                 </a:gridCol>
                 <a:gridCol w="1127911">
                   <a:extLst>
                     <a:ext uri="{9D8B030D-6E8A-4147-A177-3AD203B41FA5}">
-                      <a16:colId xmlns:a16="http://schemas.microsoft.com/office/drawing/2014/main" val="20003"/>
+                      <a16:colId xmlns:a16="http://schemas.microsoft.com/office/drawing/2014/main" xmlns="" val="20003"/>
                     </a:ext>
                   </a:extLst>
                 </a:gridCol>
                 <a:gridCol w="591670">
                   <a:extLst>
                     <a:ext uri="{9D8B030D-6E8A-4147-A177-3AD203B41FA5}">
-                      <a16:colId xmlns:a16="http://schemas.microsoft.com/office/drawing/2014/main" val="20004"/>
+                      <a16:colId xmlns:a16="http://schemas.microsoft.com/office/drawing/2014/main" xmlns="" val="20004"/>
                     </a:ext>
                   </a:extLst>
                 </a:gridCol>
@@ -4726,7 +4567,7 @@
                 </a:tc>
                 <a:extLst>
                   <a:ext uri="{0D108BD9-81ED-4DB2-BD59-A6C34878D82A}">
-                    <a16:rowId xmlns:a16="http://schemas.microsoft.com/office/drawing/2014/main" val="10000"/>
+                    <a16:rowId xmlns:a16="http://schemas.microsoft.com/office/drawing/2014/main" xmlns="" val="10000"/>
                   </a:ext>
                 </a:extLst>
               </a:tr>
@@ -4832,7 +4673,7 @@
                 </a:tc>
                 <a:extLst>
                   <a:ext uri="{0D108BD9-81ED-4DB2-BD59-A6C34878D82A}">
-                    <a16:rowId xmlns:a16="http://schemas.microsoft.com/office/drawing/2014/main" val="10001"/>
+                    <a16:rowId xmlns:a16="http://schemas.microsoft.com/office/drawing/2014/main" xmlns="" val="10001"/>
                   </a:ext>
                 </a:extLst>
               </a:tr>
@@ -4948,7 +4789,7 @@
                 </a:tc>
                 <a:extLst>
                   <a:ext uri="{0D108BD9-81ED-4DB2-BD59-A6C34878D82A}">
-                    <a16:rowId xmlns:a16="http://schemas.microsoft.com/office/drawing/2014/main" val="10002"/>
+                    <a16:rowId xmlns:a16="http://schemas.microsoft.com/office/drawing/2014/main" xmlns="" val="10002"/>
                   </a:ext>
                 </a:extLst>
               </a:tr>
@@ -5057,7 +4898,7 @@
                 </a:tc>
                 <a:extLst>
                   <a:ext uri="{0D108BD9-81ED-4DB2-BD59-A6C34878D82A}">
-                    <a16:rowId xmlns:a16="http://schemas.microsoft.com/office/drawing/2014/main" val="10003"/>
+                    <a16:rowId xmlns:a16="http://schemas.microsoft.com/office/drawing/2014/main" xmlns="" val="10003"/>
                   </a:ext>
                 </a:extLst>
               </a:tr>
@@ -5193,7 +5034,7 @@
                 </a:tc>
                 <a:extLst>
                   <a:ext uri="{0D108BD9-81ED-4DB2-BD59-A6C34878D82A}">
-                    <a16:rowId xmlns:a16="http://schemas.microsoft.com/office/drawing/2014/main" val="10004"/>
+                    <a16:rowId xmlns:a16="http://schemas.microsoft.com/office/drawing/2014/main" xmlns="" val="10004"/>
                   </a:ext>
                 </a:extLst>
               </a:tr>
@@ -5359,7 +5200,7 @@
                 </a:tc>
                 <a:extLst>
                   <a:ext uri="{0D108BD9-81ED-4DB2-BD59-A6C34878D82A}">
-                    <a16:rowId xmlns:a16="http://schemas.microsoft.com/office/drawing/2014/main" val="10005"/>
+                    <a16:rowId xmlns:a16="http://schemas.microsoft.com/office/drawing/2014/main" xmlns="" val="10005"/>
                   </a:ext>
                 </a:extLst>
               </a:tr>
@@ -5387,7 +5228,7 @@
 </p:sld>
 </file>
 
-<file path=ppt/slides/slide12.xml><?xml version="1.0" encoding="utf-8"?>
+<file path=ppt/slides/slide11.xml><?xml version="1.0" encoding="utf-8"?>
 <p:sld xmlns:a="http://schemas.openxmlformats.org/drawingml/2006/main" xmlns:r="http://schemas.openxmlformats.org/officeDocument/2006/relationships" xmlns:p="http://schemas.openxmlformats.org/presentationml/2006/main">
   <p:cSld>
     <p:spTree>
@@ -5646,7 +5487,7 @@
 </p:sld>
 </file>
 
-<file path=ppt/slides/slide13.xml><?xml version="1.0" encoding="utf-8"?>
+<file path=ppt/slides/slide12.xml><?xml version="1.0" encoding="utf-8"?>
 <p:sld xmlns:a="http://schemas.openxmlformats.org/drawingml/2006/main" xmlns:r="http://schemas.openxmlformats.org/officeDocument/2006/relationships" xmlns:p="http://schemas.openxmlformats.org/presentationml/2006/main">
   <p:cSld>
     <p:spTree>
@@ -6008,7 +5849,7 @@
 </p:sld>
 </file>
 
-<file path=ppt/slides/slide14.xml><?xml version="1.0" encoding="utf-8"?>
+<file path=ppt/slides/slide13.xml><?xml version="1.0" encoding="utf-8"?>
 <p:sld xmlns:a="http://schemas.openxmlformats.org/drawingml/2006/main" xmlns:r="http://schemas.openxmlformats.org/officeDocument/2006/relationships" xmlns:p="http://schemas.openxmlformats.org/presentationml/2006/main">
   <p:cSld>
     <p:spTree>
@@ -6279,7 +6120,7 @@
 </p:sld>
 </file>
 
-<file path=ppt/slides/slide15.xml><?xml version="1.0" encoding="utf-8"?>
+<file path=ppt/slides/slide14.xml><?xml version="1.0" encoding="utf-8"?>
 <p:sld xmlns:a="http://schemas.openxmlformats.org/drawingml/2006/main" xmlns:r="http://schemas.openxmlformats.org/officeDocument/2006/relationships" xmlns:p="http://schemas.openxmlformats.org/presentationml/2006/main">
   <p:cSld>
     <p:spTree>
@@ -6444,7 +6285,7 @@
 </p:sld>
 </file>
 
-<file path=ppt/slides/slide16.xml><?xml version="1.0" encoding="utf-8"?>
+<file path=ppt/slides/slide15.xml><?xml version="1.0" encoding="utf-8"?>
 <p:sld xmlns:a="http://schemas.openxmlformats.org/drawingml/2006/main" xmlns:r="http://schemas.openxmlformats.org/officeDocument/2006/relationships" xmlns:p="http://schemas.openxmlformats.org/presentationml/2006/main">
   <p:cSld>
     <p:spTree>
@@ -6721,192 +6562,63 @@
         <p:spPr/>
         <p:txBody>
           <a:bodyPr>
-            <a:normAutofit fontScale="92500" lnSpcReduction="20000"/>
+            <a:normAutofit/>
           </a:bodyPr>
           <a:lstStyle/>
           <a:p>
             <a:r>
               <a:rPr lang="en-US" dirty="0" smtClean="0"/>
-              <a:t>Introduction </a:t>
-            </a:r>
-            <a:r>
-              <a:rPr lang="en-US" dirty="0"/>
-              <a:t>and </a:t>
-            </a:r>
+              <a:t>Description of Problem</a:t>
+            </a:r>
+          </a:p>
+          <a:p>
             <a:r>
               <a:rPr lang="en-US" dirty="0" smtClean="0"/>
-              <a:t>Overview</a:t>
+              <a:t>Software Requirements</a:t>
+            </a:r>
+          </a:p>
+          <a:p>
+            <a:r>
+              <a:rPr lang="en-US" dirty="0" smtClean="0"/>
+              <a:t>System Design</a:t>
+            </a:r>
+          </a:p>
+          <a:p>
+            <a:r>
+              <a:rPr lang="en-US" dirty="0" smtClean="0"/>
+              <a:t>Test Report</a:t>
+            </a:r>
+          </a:p>
+          <a:p>
+            <a:r>
+              <a:rPr lang="en-US" dirty="0" smtClean="0"/>
+              <a:t>Deployment</a:t>
+            </a:r>
+          </a:p>
+          <a:p>
+            <a:r>
+              <a:rPr lang="en-US" dirty="0" smtClean="0"/>
+              <a:t>Process Used</a:t>
+            </a:r>
+          </a:p>
+          <a:p>
+            <a:r>
+              <a:rPr lang="en-US" dirty="0" smtClean="0"/>
+              <a:t>Lessons Learned</a:t>
+            </a:r>
+          </a:p>
+          <a:p>
+            <a:r>
+              <a:rPr lang="en-US" dirty="0" smtClean="0"/>
+              <a:t>Demo</a:t>
             </a:r>
             <a:endParaRPr lang="en-US" dirty="0"/>
           </a:p>
-          <a:p>
-            <a:r>
-              <a:rPr lang="en-US" dirty="0" smtClean="0"/>
-              <a:t>Description </a:t>
-            </a:r>
-            <a:r>
-              <a:rPr lang="en-US" dirty="0"/>
-              <a:t>of </a:t>
-            </a:r>
-            <a:r>
-              <a:rPr lang="en-US" dirty="0" smtClean="0"/>
-              <a:t>problem </a:t>
-            </a:r>
-            <a:r>
-              <a:rPr lang="en-US" dirty="0"/>
-              <a:t>/ </a:t>
-            </a:r>
-            <a:r>
-              <a:rPr lang="en-US" dirty="0" smtClean="0"/>
-              <a:t>user's work </a:t>
-            </a:r>
-            <a:r>
-              <a:rPr lang="en-US" dirty="0"/>
-              <a:t>context</a:t>
-            </a:r>
-          </a:p>
-          <a:p>
-            <a:r>
-              <a:rPr lang="en-US" dirty="0" smtClean="0"/>
-              <a:t>System Design(UML </a:t>
-            </a:r>
-            <a:r>
-              <a:rPr lang="en-US" dirty="0"/>
-              <a:t>Arch </a:t>
-            </a:r>
-            <a:r>
-              <a:rPr lang="en-US" dirty="0" smtClean="0"/>
-              <a:t>Diagram) Test Report–known </a:t>
-            </a:r>
-            <a:r>
-              <a:rPr lang="en-US" dirty="0"/>
-              <a:t>problems; </a:t>
-            </a:r>
-            <a:r>
-              <a:rPr lang="en-US" dirty="0" smtClean="0"/>
-              <a:t>deviations </a:t>
-            </a:r>
-            <a:r>
-              <a:rPr lang="en-US" dirty="0"/>
-              <a:t>from </a:t>
-            </a:r>
-            <a:r>
-              <a:rPr lang="en-US" dirty="0" err="1" smtClean="0"/>
-              <a:t>reqs</a:t>
-            </a:r>
-            <a:endParaRPr lang="en-US" dirty="0"/>
-          </a:p>
-          <a:p>
-            <a:r>
-              <a:rPr lang="en-US" dirty="0" smtClean="0"/>
-              <a:t>Deployment issues</a:t>
-            </a:r>
-            <a:endParaRPr lang="en-US" dirty="0"/>
-          </a:p>
-          <a:p>
-            <a:r>
-              <a:rPr lang="en-US" dirty="0"/>
-              <a:t>Process you used, </a:t>
-            </a:r>
-            <a:r>
-              <a:rPr lang="en-US" dirty="0" smtClean="0"/>
-              <a:t>team </a:t>
-            </a:r>
-            <a:r>
-              <a:rPr lang="en-US" dirty="0"/>
-              <a:t>organization </a:t>
-            </a:r>
-            <a:r>
-              <a:rPr lang="en-US" dirty="0" smtClean="0"/>
-              <a:t>–how </a:t>
-            </a:r>
-            <a:r>
-              <a:rPr lang="en-US" dirty="0"/>
-              <a:t>well you </a:t>
-            </a:r>
-            <a:r>
-              <a:rPr lang="en-US" dirty="0" smtClean="0"/>
-              <a:t>followed it</a:t>
-            </a:r>
-            <a:endParaRPr lang="en-US" dirty="0"/>
-          </a:p>
-          <a:p>
-            <a:r>
-              <a:rPr lang="en-US" dirty="0"/>
-              <a:t>What you’d do if </a:t>
-            </a:r>
-            <a:r>
-              <a:rPr lang="en-US" dirty="0" smtClean="0"/>
-              <a:t>you </a:t>
-            </a:r>
-            <a:r>
-              <a:rPr lang="en-US" dirty="0"/>
-              <a:t>had more time, </a:t>
-            </a:r>
-            <a:r>
-              <a:rPr lang="en-US" dirty="0" smtClean="0"/>
-              <a:t>or </a:t>
-            </a:r>
-            <a:r>
-              <a:rPr lang="en-US" dirty="0"/>
-              <a:t>what you’d do if </a:t>
-            </a:r>
-            <a:r>
-              <a:rPr lang="en-US" dirty="0" smtClean="0"/>
-              <a:t>you </a:t>
-            </a:r>
-            <a:r>
-              <a:rPr lang="en-US" dirty="0"/>
-              <a:t>had to do over; </a:t>
-            </a:r>
-            <a:r>
-              <a:rPr lang="en-US" dirty="0" smtClean="0"/>
-              <a:t>and what </a:t>
-            </a:r>
-            <a:r>
-              <a:rPr lang="en-US" dirty="0"/>
-              <a:t>you </a:t>
-            </a:r>
-            <a:r>
-              <a:rPr lang="en-US" dirty="0" smtClean="0"/>
-              <a:t>learned</a:t>
-            </a:r>
-            <a:endParaRPr lang="en-US" dirty="0"/>
-          </a:p>
-          <a:p>
-            <a:r>
-              <a:rPr lang="en-US" dirty="0" smtClean="0"/>
-              <a:t>Organization </a:t>
-            </a:r>
-            <a:r>
-              <a:rPr lang="en-US" dirty="0"/>
-              <a:t>of </a:t>
-            </a:r>
-            <a:r>
-              <a:rPr lang="en-US" dirty="0" smtClean="0"/>
-              <a:t>presentation</a:t>
-            </a:r>
-            <a:endParaRPr lang="en-US" dirty="0"/>
-          </a:p>
-          <a:p>
-            <a:r>
-              <a:rPr lang="en-US" dirty="0"/>
-              <a:t>Demo </a:t>
-            </a:r>
-            <a:r>
-              <a:rPr lang="en-US" dirty="0" smtClean="0"/>
-              <a:t>system</a:t>
-            </a:r>
-            <a:endParaRPr lang="en-US" dirty="0"/>
-          </a:p>
-          <a:p>
-            <a:endParaRPr lang="en-US" dirty="0"/>
-          </a:p>
-        </p:txBody>
-      </p:sp>
-      <p:sp>
-        <p:nvSpPr>
-          <p:cNvPr id="4" name="TextBox 3"/>
+        </p:txBody>
+      </p:sp>
+      <p:sp>
+        <p:nvSpPr>
+          <p:cNvPr id="6" name="TextBox 5"/>
           <p:cNvSpPr txBox="1"/>
           <p:nvPr/>
         </p:nvSpPr>
@@ -6944,7 +6656,7 @@
       </p:sp>
       <p:sp>
         <p:nvSpPr>
-          <p:cNvPr id="5" name="TextBox 4"/>
+          <p:cNvPr id="7" name="TextBox 6"/>
           <p:cNvSpPr txBox="1"/>
           <p:nvPr/>
         </p:nvSpPr>
@@ -6983,7 +6695,7 @@
     </p:spTree>
     <p:extLst>
       <p:ext uri="{BB962C8B-B14F-4D97-AF65-F5344CB8AC3E}">
-        <p14:creationId xmlns:p14="http://schemas.microsoft.com/office/powerpoint/2010/main" val="1954108226"/>
+        <p14:creationId xmlns:p14="http://schemas.microsoft.com/office/powerpoint/2010/main" val="2087672974"/>
       </p:ext>
     </p:extLst>
   </p:cSld>
@@ -7034,7 +6746,7 @@
           <a:p>
             <a:r>
               <a:rPr lang="en-US" dirty="0" smtClean="0"/>
-              <a:t>Overview</a:t>
+              <a:t>Description of Problem</a:t>
             </a:r>
             <a:endParaRPr lang="en-US" dirty="0"/>
           </a:p>
@@ -7052,56 +6764,82 @@
         </p:nvSpPr>
         <p:spPr/>
         <p:txBody>
-          <a:bodyPr>
-            <a:normAutofit/>
-          </a:bodyPr>
+          <a:bodyPr/>
           <a:lstStyle/>
           <a:p>
             <a:r>
               <a:rPr lang="en-US" dirty="0" smtClean="0"/>
-              <a:t>Description of Problem</a:t>
-            </a:r>
+              <a:t>Customer: Dr. </a:t>
+            </a:r>
+            <a:r>
+              <a:rPr lang="en-US" dirty="0" err="1" smtClean="0"/>
+              <a:t>Stringfellow</a:t>
+            </a:r>
+            <a:endParaRPr lang="en-US" dirty="0" smtClean="0"/>
           </a:p>
           <a:p>
             <a:r>
               <a:rPr lang="en-US" dirty="0" smtClean="0"/>
-              <a:t>Software Requirements</a:t>
-            </a:r>
-          </a:p>
-          <a:p>
+              <a:t>Needs:</a:t>
+            </a:r>
+          </a:p>
+          <a:p>
+            <a:pPr lvl="1"/>
             <a:r>
               <a:rPr lang="en-US" dirty="0" smtClean="0"/>
-              <a:t>System Design</a:t>
-            </a:r>
-          </a:p>
-          <a:p>
+              <a:t>Software to display metrics for 1</a:t>
+            </a:r>
+            <a:r>
+              <a:rPr lang="en-US" baseline="30000" dirty="0" smtClean="0"/>
+              <a:t>st</a:t>
+            </a:r>
             <a:r>
               <a:rPr lang="en-US" dirty="0" smtClean="0"/>
-              <a:t>Test Report</a:t>
-            </a:r>
-          </a:p>
-          <a:p>
+              <a:t> &amp; 2</a:t>
+            </a:r>
+            <a:r>
+              <a:rPr lang="en-US" baseline="30000" dirty="0" smtClean="0"/>
+              <a:t>nd</a:t>
+            </a:r>
             <a:r>
               <a:rPr lang="en-US" dirty="0" smtClean="0"/>
-              <a:t>Deployment</a:t>
-            </a:r>
+              <a:t> year CS student’s source code</a:t>
+            </a:r>
+            <a:endParaRPr lang="en-US" dirty="0"/>
           </a:p>
           <a:p>
             <a:r>
               <a:rPr lang="en-US" dirty="0" smtClean="0"/>
-              <a:t>Process Used</a:t>
-            </a:r>
-          </a:p>
-          <a:p>
+              <a:t>Requirements:</a:t>
+            </a:r>
+          </a:p>
+          <a:p>
+            <a:pPr lvl="1"/>
             <a:r>
               <a:rPr lang="en-US" dirty="0" smtClean="0"/>
-              <a:t>Lessons Learned</a:t>
-            </a:r>
-          </a:p>
-          <a:p>
+              <a:t>Run on student environments: Windows XP or later</a:t>
+            </a:r>
+          </a:p>
+          <a:p>
+            <a:pPr lvl="1"/>
             <a:r>
               <a:rPr lang="en-US" dirty="0" smtClean="0"/>
-              <a:t>Demo</a:t>
+              <a:t>Support C++ and/or Java</a:t>
+            </a:r>
+          </a:p>
+          <a:p>
+            <a:pPr lvl="1"/>
+            <a:r>
+              <a:rPr lang="en-US" dirty="0" smtClean="0"/>
+              <a:t>Metrics: LOC, LOD, Blank Lines, </a:t>
+            </a:r>
+            <a:r>
+              <a:rPr lang="en-US" dirty="0" err="1" smtClean="0"/>
+              <a:t>Cyclomatic</a:t>
+            </a:r>
+            <a:r>
+              <a:rPr lang="en-US" dirty="0" smtClean="0"/>
+              <a:t> Complexity</a:t>
             </a:r>
             <a:endParaRPr lang="en-US" dirty="0"/>
           </a:p>
@@ -7109,7 +6847,7 @@
       </p:sp>
       <p:sp>
         <p:nvSpPr>
-          <p:cNvPr id="6" name="TextBox 5"/>
+          <p:cNvPr id="4" name="TextBox 3"/>
           <p:cNvSpPr txBox="1"/>
           <p:nvPr/>
         </p:nvSpPr>
@@ -7147,7 +6885,7 @@
       </p:sp>
       <p:sp>
         <p:nvSpPr>
-          <p:cNvPr id="7" name="TextBox 6"/>
+          <p:cNvPr id="5" name="TextBox 4"/>
           <p:cNvSpPr txBox="1"/>
           <p:nvPr/>
         </p:nvSpPr>
@@ -7186,7 +6924,7 @@
     </p:spTree>
     <p:extLst>
       <p:ext uri="{BB962C8B-B14F-4D97-AF65-F5344CB8AC3E}">
-        <p14:creationId xmlns:p14="http://schemas.microsoft.com/office/powerpoint/2010/main" val="2087672974"/>
+        <p14:creationId xmlns:p14="http://schemas.microsoft.com/office/powerpoint/2010/main" val="1724068622"/>
       </p:ext>
     </p:extLst>
   </p:cSld>
@@ -7237,7 +6975,7 @@
           <a:p>
             <a:r>
               <a:rPr lang="en-US" dirty="0" smtClean="0"/>
-              <a:t>Description of Problem</a:t>
+              <a:t>Software Requirements</a:t>
             </a:r>
             <a:endParaRPr lang="en-US" dirty="0"/>
           </a:p>
@@ -7260,79 +6998,20 @@
           <a:p>
             <a:r>
               <a:rPr lang="en-US" dirty="0" smtClean="0"/>
-              <a:t>Customer: Dr. </a:t>
-            </a:r>
-            <a:r>
-              <a:rPr lang="en-US" dirty="0" err="1" smtClean="0"/>
-              <a:t>Stringfellow</a:t>
-            </a:r>
-            <a:endParaRPr lang="en-US" dirty="0" smtClean="0"/>
+              <a:t>Minimum Operating System: Windows XP, OS X 10.7, Linux 2.6.23</a:t>
+            </a:r>
           </a:p>
           <a:p>
             <a:r>
               <a:rPr lang="en-US" dirty="0" smtClean="0"/>
-              <a:t>Needs:</a:t>
-            </a:r>
-          </a:p>
-          <a:p>
-            <a:pPr lvl="1"/>
+              <a:t>Browser: Chrome, Firefox, Edge, Safari</a:t>
+            </a:r>
+          </a:p>
+          <a:p>
             <a:r>
               <a:rPr lang="en-US" dirty="0" smtClean="0"/>
-              <a:t>Software to display metrics for 1</a:t>
-            </a:r>
-            <a:r>
-              <a:rPr lang="en-US" baseline="30000" dirty="0" smtClean="0"/>
-              <a:t>st</a:t>
-            </a:r>
-            <a:r>
-              <a:rPr lang="en-US" dirty="0" smtClean="0"/>
-              <a:t> &amp; 2</a:t>
-            </a:r>
-            <a:r>
-              <a:rPr lang="en-US" baseline="30000" dirty="0" smtClean="0"/>
-              <a:t>nd</a:t>
-            </a:r>
-            <a:r>
-              <a:rPr lang="en-US" dirty="0" smtClean="0"/>
-              <a:t> year CS student’s source code</a:t>
-            </a:r>
-            <a:endParaRPr lang="en-US" dirty="0"/>
-          </a:p>
-          <a:p>
-            <a:r>
-              <a:rPr lang="en-US" dirty="0" smtClean="0"/>
-              <a:t>Requirements:</a:t>
-            </a:r>
-          </a:p>
-          <a:p>
-            <a:pPr lvl="1"/>
-            <a:r>
-              <a:rPr lang="en-US" dirty="0" smtClean="0"/>
-              <a:t>Run on student environments: Windows XP or later</a:t>
-            </a:r>
-          </a:p>
-          <a:p>
-            <a:pPr lvl="1"/>
-            <a:r>
-              <a:rPr lang="en-US" dirty="0" smtClean="0"/>
-              <a:t>Support C++ and/or Java</a:t>
-            </a:r>
-          </a:p>
-          <a:p>
-            <a:pPr lvl="1"/>
-            <a:r>
-              <a:rPr lang="en-US" dirty="0" smtClean="0"/>
-              <a:t>Metrics: LOC, LOD, Blank Lines, </a:t>
-            </a:r>
-            <a:r>
-              <a:rPr lang="en-US" dirty="0" err="1" smtClean="0"/>
-              <a:t>Cyclomatic</a:t>
-            </a:r>
-            <a:r>
-              <a:rPr lang="en-US" dirty="0" smtClean="0"/>
-              <a:t> Complexity</a:t>
-            </a:r>
-            <a:endParaRPr lang="en-US" dirty="0"/>
+              <a:t>Hardware: Anything that can run the above</a:t>
+            </a:r>
           </a:p>
         </p:txBody>
       </p:sp>
@@ -7415,7 +7094,7 @@
     </p:spTree>
     <p:extLst>
       <p:ext uri="{BB962C8B-B14F-4D97-AF65-F5344CB8AC3E}">
-        <p14:creationId xmlns:p14="http://schemas.microsoft.com/office/powerpoint/2010/main" val="1724068622"/>
+        <p14:creationId xmlns:p14="http://schemas.microsoft.com/office/powerpoint/2010/main" val="860132533"/>
       </p:ext>
     </p:extLst>
   </p:cSld>
@@ -7466,176 +7145,6 @@
           <a:p>
             <a:r>
               <a:rPr lang="en-US" dirty="0" smtClean="0"/>
-              <a:t>Software Requirements</a:t>
-            </a:r>
-            <a:endParaRPr lang="en-US" dirty="0"/>
-          </a:p>
-        </p:txBody>
-      </p:sp>
-      <p:sp>
-        <p:nvSpPr>
-          <p:cNvPr id="3" name="Content Placeholder 2"/>
-          <p:cNvSpPr>
-            <a:spLocks noGrp="1"/>
-          </p:cNvSpPr>
-          <p:nvPr>
-            <p:ph idx="1"/>
-          </p:nvPr>
-        </p:nvSpPr>
-        <p:spPr/>
-        <p:txBody>
-          <a:bodyPr/>
-          <a:lstStyle/>
-          <a:p>
-            <a:r>
-              <a:rPr lang="en-US" dirty="0" smtClean="0"/>
-              <a:t>Minimum Operating System: Windows XP, OS X 10.7, Linux 2.6.23</a:t>
-            </a:r>
-          </a:p>
-          <a:p>
-            <a:r>
-              <a:rPr lang="en-US" dirty="0" smtClean="0"/>
-              <a:t>Browser: Chrome, Firefox, Edge, Safari</a:t>
-            </a:r>
-          </a:p>
-          <a:p>
-            <a:r>
-              <a:rPr lang="en-US" dirty="0" smtClean="0"/>
-              <a:t>Hardware: Anything that can run the above</a:t>
-            </a:r>
-          </a:p>
-        </p:txBody>
-      </p:sp>
-      <p:sp>
-        <p:nvSpPr>
-          <p:cNvPr id="4" name="TextBox 3"/>
-          <p:cNvSpPr txBox="1"/>
-          <p:nvPr/>
-        </p:nvSpPr>
-        <p:spPr>
-          <a:xfrm>
-            <a:off x="0" y="6311899"/>
-            <a:ext cx="1744717" cy="461665"/>
-          </a:xfrm>
-          <a:prstGeom prst="rect">
-            <a:avLst/>
-          </a:prstGeom>
-          <a:noFill/>
-        </p:spPr>
-        <p:txBody>
-          <a:bodyPr wrap="square" rtlCol="0">
-            <a:spAutoFit/>
-          </a:bodyPr>
-          <a:lstStyle/>
-          <a:p>
-            <a:r>
-              <a:rPr lang="en-US" sz="2400" dirty="0" smtClean="0">
-                <a:solidFill>
-                  <a:schemeClr val="bg1"/>
-                </a:solidFill>
-              </a:rPr>
-              <a:t>ID-10-T</a:t>
-            </a:r>
-            <a:endParaRPr lang="en-US" sz="2400" dirty="0">
-              <a:solidFill>
-                <a:schemeClr val="bg1"/>
-              </a:solidFill>
-            </a:endParaRPr>
-          </a:p>
-        </p:txBody>
-      </p:sp>
-      <p:sp>
-        <p:nvSpPr>
-          <p:cNvPr id="5" name="TextBox 4"/>
-          <p:cNvSpPr txBox="1"/>
-          <p:nvPr/>
-        </p:nvSpPr>
-        <p:spPr>
-          <a:xfrm>
-            <a:off x="4267200" y="6311899"/>
-            <a:ext cx="4876800" cy="461665"/>
-          </a:xfrm>
-          <a:prstGeom prst="rect">
-            <a:avLst/>
-          </a:prstGeom>
-          <a:noFill/>
-        </p:spPr>
-        <p:txBody>
-          <a:bodyPr wrap="square" rtlCol="0">
-            <a:spAutoFit/>
-          </a:bodyPr>
-          <a:lstStyle/>
-          <a:p>
-            <a:r>
-              <a:rPr lang="en-US" sz="2400" dirty="0" smtClean="0">
-                <a:solidFill>
-                  <a:schemeClr val="bg1"/>
-                </a:solidFill>
-              </a:rPr>
-              <a:t>Software Metrics Calculation System</a:t>
-            </a:r>
-            <a:endParaRPr lang="en-US" sz="2400" dirty="0">
-              <a:solidFill>
-                <a:schemeClr val="bg1"/>
-              </a:solidFill>
-            </a:endParaRPr>
-          </a:p>
-        </p:txBody>
-      </p:sp>
-    </p:spTree>
-    <p:extLst>
-      <p:ext uri="{BB962C8B-B14F-4D97-AF65-F5344CB8AC3E}">
-        <p14:creationId xmlns:p14="http://schemas.microsoft.com/office/powerpoint/2010/main" val="860132533"/>
-      </p:ext>
-    </p:extLst>
-  </p:cSld>
-  <p:clrMapOvr>
-    <a:masterClrMapping/>
-  </p:clrMapOvr>
-  <p:timing>
-    <p:tnLst>
-      <p:par>
-        <p:cTn id="1" dur="indefinite" restart="never" nodeType="tmRoot"/>
-      </p:par>
-    </p:tnLst>
-  </p:timing>
-</p:sld>
-</file>
-
-<file path=ppt/slides/slide6.xml><?xml version="1.0" encoding="utf-8"?>
-<p:sld xmlns:a="http://schemas.openxmlformats.org/drawingml/2006/main" xmlns:r="http://schemas.openxmlformats.org/officeDocument/2006/relationships" xmlns:p="http://schemas.openxmlformats.org/presentationml/2006/main">
-  <p:cSld>
-    <p:spTree>
-      <p:nvGrpSpPr>
-        <p:cNvPr id="1" name=""/>
-        <p:cNvGrpSpPr/>
-        <p:nvPr/>
-      </p:nvGrpSpPr>
-      <p:grpSpPr>
-        <a:xfrm>
-          <a:off x="0" y="0"/>
-          <a:ext cx="0" cy="0"/>
-          <a:chOff x="0" y="0"/>
-          <a:chExt cx="0" cy="0"/>
-        </a:xfrm>
-      </p:grpSpPr>
-      <p:sp>
-        <p:nvSpPr>
-          <p:cNvPr id="2" name="Title 1"/>
-          <p:cNvSpPr>
-            <a:spLocks noGrp="1"/>
-          </p:cNvSpPr>
-          <p:nvPr>
-            <p:ph type="title"/>
-          </p:nvPr>
-        </p:nvSpPr>
-        <p:spPr/>
-        <p:txBody>
-          <a:bodyPr/>
-          <a:lstStyle/>
-          <a:p>
-            <a:r>
-              <a:rPr lang="en-US" dirty="0" smtClean="0"/>
               <a:t>System Design</a:t>
             </a:r>
             <a:endParaRPr lang="en-US" dirty="0"/>
@@ -7799,7 +7308,7 @@
 </p:sld>
 </file>
 
-<file path=ppt/slides/slide7.xml><?xml version="1.0" encoding="utf-8"?>
+<file path=ppt/slides/slide6.xml><?xml version="1.0" encoding="utf-8"?>
 <p:sld xmlns:a="http://schemas.openxmlformats.org/drawingml/2006/main" xmlns:r="http://schemas.openxmlformats.org/officeDocument/2006/relationships" xmlns:p="http://schemas.openxmlformats.org/presentationml/2006/main">
   <p:cSld>
     <p:spTree>
@@ -8536,6 +8045,633 @@
   <p:clrMapOvr>
     <a:masterClrMapping/>
   </p:clrMapOvr>
+  <p:timing>
+    <p:tnLst>
+      <p:par>
+        <p:cTn id="1" dur="indefinite" restart="never" nodeType="tmRoot"/>
+      </p:par>
+    </p:tnLst>
+  </p:timing>
+</p:sld>
+</file>
+
+<file path=ppt/slides/slide7.xml><?xml version="1.0" encoding="utf-8"?>
+<p:sld xmlns:a="http://schemas.openxmlformats.org/drawingml/2006/main" xmlns:r="http://schemas.openxmlformats.org/officeDocument/2006/relationships" xmlns:p="http://schemas.openxmlformats.org/presentationml/2006/main">
+  <p:cSld>
+    <p:spTree>
+      <p:nvGrpSpPr>
+        <p:cNvPr id="1" name=""/>
+        <p:cNvGrpSpPr/>
+        <p:nvPr/>
+      </p:nvGrpSpPr>
+      <p:grpSpPr>
+        <a:xfrm>
+          <a:off x="0" y="0"/>
+          <a:ext cx="0" cy="0"/>
+          <a:chOff x="0" y="0"/>
+          <a:chExt cx="0" cy="0"/>
+        </a:xfrm>
+      </p:grpSpPr>
+      <p:sp>
+        <p:nvSpPr>
+          <p:cNvPr id="2" name="Title 1"/>
+          <p:cNvSpPr>
+            <a:spLocks noGrp="1"/>
+          </p:cNvSpPr>
+          <p:nvPr>
+            <p:ph type="title"/>
+          </p:nvPr>
+        </p:nvSpPr>
+        <p:spPr/>
+        <p:txBody>
+          <a:bodyPr/>
+          <a:lstStyle/>
+          <a:p>
+            <a:r>
+              <a:rPr lang="en-US" dirty="0" err="1" smtClean="0"/>
+              <a:t>Lexer</a:t>
+            </a:r>
+            <a:endParaRPr lang="en-US" dirty="0"/>
+          </a:p>
+        </p:txBody>
+      </p:sp>
+      <p:sp>
+        <p:nvSpPr>
+          <p:cNvPr id="4" name="TextBox 3"/>
+          <p:cNvSpPr txBox="1"/>
+          <p:nvPr/>
+        </p:nvSpPr>
+        <p:spPr>
+          <a:xfrm>
+            <a:off x="628650" y="1816847"/>
+            <a:ext cx="8367996" cy="4401205"/>
+          </a:xfrm>
+          <a:prstGeom prst="rect">
+            <a:avLst/>
+          </a:prstGeom>
+          <a:noFill/>
+        </p:spPr>
+        <p:txBody>
+          <a:bodyPr wrap="none" rtlCol="0">
+            <a:spAutoFit/>
+          </a:bodyPr>
+          <a:lstStyle/>
+          <a:p>
+            <a:r>
+              <a:rPr lang="en-US" sz="1400" dirty="0" err="1" smtClean="0">
+                <a:latin typeface="Courier New" panose="02070309020205020404" pitchFamily="49" charset="0"/>
+                <a:cs typeface="Courier New" panose="02070309020205020404" pitchFamily="49" charset="0"/>
+              </a:rPr>
+              <a:t>func</a:t>
+            </a:r>
+            <a:r>
+              <a:rPr lang="en-US" sz="1400" dirty="0" smtClean="0">
+                <a:latin typeface="Courier New" panose="02070309020205020404" pitchFamily="49" charset="0"/>
+                <a:cs typeface="Courier New" panose="02070309020205020404" pitchFamily="49" charset="0"/>
+              </a:rPr>
+              <a:t> </a:t>
+            </a:r>
+            <a:r>
+              <a:rPr lang="en-US" sz="1400" dirty="0">
+                <a:latin typeface="Courier New" panose="02070309020205020404" pitchFamily="49" charset="0"/>
+                <a:cs typeface="Courier New" panose="02070309020205020404" pitchFamily="49" charset="0"/>
+              </a:rPr>
+              <a:t>Tokenize(language, source string) []Token {</a:t>
+            </a:r>
+          </a:p>
+          <a:p>
+            <a:r>
+              <a:rPr lang="en-US" sz="1400" dirty="0">
+                <a:latin typeface="Courier New" panose="02070309020205020404" pitchFamily="49" charset="0"/>
+                <a:cs typeface="Courier New" panose="02070309020205020404" pitchFamily="49" charset="0"/>
+              </a:rPr>
+              <a:t>	</a:t>
+            </a:r>
+            <a:r>
+              <a:rPr lang="en-US" sz="1400" dirty="0" err="1">
+                <a:latin typeface="Courier New" panose="02070309020205020404" pitchFamily="49" charset="0"/>
+                <a:cs typeface="Courier New" panose="02070309020205020404" pitchFamily="49" charset="0"/>
+              </a:rPr>
+              <a:t>var</a:t>
+            </a:r>
+            <a:r>
+              <a:rPr lang="en-US" sz="1400" dirty="0">
+                <a:latin typeface="Courier New" panose="02070309020205020404" pitchFamily="49" charset="0"/>
+                <a:cs typeface="Courier New" panose="02070309020205020404" pitchFamily="49" charset="0"/>
+              </a:rPr>
+              <a:t> next </a:t>
+            </a:r>
+            <a:r>
+              <a:rPr lang="en-US" sz="1400" dirty="0" err="1">
+                <a:latin typeface="Courier New" panose="02070309020205020404" pitchFamily="49" charset="0"/>
+                <a:cs typeface="Courier New" panose="02070309020205020404" pitchFamily="49" charset="0"/>
+              </a:rPr>
+              <a:t>NextToken</a:t>
+            </a:r>
+            <a:endParaRPr lang="en-US" sz="1400" dirty="0">
+              <a:latin typeface="Courier New" panose="02070309020205020404" pitchFamily="49" charset="0"/>
+              <a:cs typeface="Courier New" panose="02070309020205020404" pitchFamily="49" charset="0"/>
+            </a:endParaRPr>
+          </a:p>
+          <a:p>
+            <a:r>
+              <a:rPr lang="en-US" sz="1400" dirty="0">
+                <a:latin typeface="Courier New" panose="02070309020205020404" pitchFamily="49" charset="0"/>
+                <a:cs typeface="Courier New" panose="02070309020205020404" pitchFamily="49" charset="0"/>
+              </a:rPr>
+              <a:t>	</a:t>
+            </a:r>
+            <a:r>
+              <a:rPr lang="en-US" sz="1400" dirty="0" err="1">
+                <a:latin typeface="Courier New" panose="02070309020205020404" pitchFamily="49" charset="0"/>
+                <a:cs typeface="Courier New" panose="02070309020205020404" pitchFamily="49" charset="0"/>
+              </a:rPr>
+              <a:t>var</a:t>
+            </a:r>
+            <a:r>
+              <a:rPr lang="en-US" sz="1400" dirty="0">
+                <a:latin typeface="Courier New" panose="02070309020205020404" pitchFamily="49" charset="0"/>
+                <a:cs typeface="Courier New" panose="02070309020205020404" pitchFamily="49" charset="0"/>
+              </a:rPr>
+              <a:t> tokens []Token</a:t>
+            </a:r>
+          </a:p>
+          <a:p>
+            <a:r>
+              <a:rPr lang="en-US" sz="1400" dirty="0">
+                <a:latin typeface="Courier New" panose="02070309020205020404" pitchFamily="49" charset="0"/>
+                <a:cs typeface="Courier New" panose="02070309020205020404" pitchFamily="49" charset="0"/>
+              </a:rPr>
+              <a:t>	</a:t>
+            </a:r>
+            <a:r>
+              <a:rPr lang="en-US" sz="1400" dirty="0" err="1">
+                <a:latin typeface="Courier New" panose="02070309020205020404" pitchFamily="49" charset="0"/>
+                <a:cs typeface="Courier New" panose="02070309020205020404" pitchFamily="49" charset="0"/>
+              </a:rPr>
+              <a:t>var</a:t>
+            </a:r>
+            <a:r>
+              <a:rPr lang="en-US" sz="1400" dirty="0">
+                <a:latin typeface="Courier New" panose="02070309020205020404" pitchFamily="49" charset="0"/>
+                <a:cs typeface="Courier New" panose="02070309020205020404" pitchFamily="49" charset="0"/>
+              </a:rPr>
+              <a:t> </a:t>
+            </a:r>
+            <a:r>
+              <a:rPr lang="en-US" sz="1400" dirty="0" err="1">
+                <a:latin typeface="Courier New" panose="02070309020205020404" pitchFamily="49" charset="0"/>
+                <a:cs typeface="Courier New" panose="02070309020205020404" pitchFamily="49" charset="0"/>
+              </a:rPr>
+              <a:t>closeCall</a:t>
+            </a:r>
+            <a:r>
+              <a:rPr lang="en-US" sz="1400" dirty="0">
+                <a:latin typeface="Courier New" panose="02070309020205020404" pitchFamily="49" charset="0"/>
+                <a:cs typeface="Courier New" panose="02070309020205020404" pitchFamily="49" charset="0"/>
+              </a:rPr>
+              <a:t> Close</a:t>
+            </a:r>
+          </a:p>
+          <a:p>
+            <a:r>
+              <a:rPr lang="en-US" sz="1400" dirty="0">
+                <a:latin typeface="Courier New" panose="02070309020205020404" pitchFamily="49" charset="0"/>
+                <a:cs typeface="Courier New" panose="02070309020205020404" pitchFamily="49" charset="0"/>
+              </a:rPr>
+              <a:t>	switch language {</a:t>
+            </a:r>
+          </a:p>
+          <a:p>
+            <a:r>
+              <a:rPr lang="en-US" sz="1400" dirty="0">
+                <a:latin typeface="Courier New" panose="02070309020205020404" pitchFamily="49" charset="0"/>
+                <a:cs typeface="Courier New" panose="02070309020205020404" pitchFamily="49" charset="0"/>
+              </a:rPr>
+              <a:t>	case "c":</a:t>
+            </a:r>
+          </a:p>
+          <a:p>
+            <a:r>
+              <a:rPr lang="en-US" sz="1400" dirty="0">
+                <a:latin typeface="Courier New" panose="02070309020205020404" pitchFamily="49" charset="0"/>
+                <a:cs typeface="Courier New" panose="02070309020205020404" pitchFamily="49" charset="0"/>
+              </a:rPr>
+              <a:t>		</a:t>
+            </a:r>
+            <a:r>
+              <a:rPr lang="en-US" sz="1400" dirty="0" err="1">
+                <a:latin typeface="Courier New" panose="02070309020205020404" pitchFamily="49" charset="0"/>
+                <a:cs typeface="Courier New" panose="02070309020205020404" pitchFamily="49" charset="0"/>
+              </a:rPr>
+              <a:t>c.Parse</a:t>
+            </a:r>
+            <a:r>
+              <a:rPr lang="en-US" sz="1400" dirty="0">
+                <a:latin typeface="Courier New" panose="02070309020205020404" pitchFamily="49" charset="0"/>
+                <a:cs typeface="Courier New" panose="02070309020205020404" pitchFamily="49" charset="0"/>
+              </a:rPr>
+              <a:t>(source)</a:t>
+            </a:r>
+          </a:p>
+          <a:p>
+            <a:r>
+              <a:rPr lang="en-US" sz="1400" dirty="0">
+                <a:latin typeface="Courier New" panose="02070309020205020404" pitchFamily="49" charset="0"/>
+                <a:cs typeface="Courier New" panose="02070309020205020404" pitchFamily="49" charset="0"/>
+              </a:rPr>
+              <a:t>		next = </a:t>
+            </a:r>
+            <a:r>
+              <a:rPr lang="en-US" sz="1400" dirty="0" err="1">
+                <a:latin typeface="Courier New" panose="02070309020205020404" pitchFamily="49" charset="0"/>
+                <a:cs typeface="Courier New" panose="02070309020205020404" pitchFamily="49" charset="0"/>
+              </a:rPr>
+              <a:t>c.NextToken</a:t>
+            </a:r>
+            <a:endParaRPr lang="en-US" sz="1400" dirty="0">
+              <a:latin typeface="Courier New" panose="02070309020205020404" pitchFamily="49" charset="0"/>
+              <a:cs typeface="Courier New" panose="02070309020205020404" pitchFamily="49" charset="0"/>
+            </a:endParaRPr>
+          </a:p>
+          <a:p>
+            <a:r>
+              <a:rPr lang="en-US" sz="1400" dirty="0">
+                <a:latin typeface="Courier New" panose="02070309020205020404" pitchFamily="49" charset="0"/>
+                <a:cs typeface="Courier New" panose="02070309020205020404" pitchFamily="49" charset="0"/>
+              </a:rPr>
+              <a:t>		</a:t>
+            </a:r>
+            <a:r>
+              <a:rPr lang="en-US" sz="1400" dirty="0" err="1">
+                <a:latin typeface="Courier New" panose="02070309020205020404" pitchFamily="49" charset="0"/>
+                <a:cs typeface="Courier New" panose="02070309020205020404" pitchFamily="49" charset="0"/>
+              </a:rPr>
+              <a:t>closeCall</a:t>
+            </a:r>
+            <a:r>
+              <a:rPr lang="en-US" sz="1400" dirty="0">
+                <a:latin typeface="Courier New" panose="02070309020205020404" pitchFamily="49" charset="0"/>
+                <a:cs typeface="Courier New" panose="02070309020205020404" pitchFamily="49" charset="0"/>
+              </a:rPr>
+              <a:t> = </a:t>
+            </a:r>
+            <a:r>
+              <a:rPr lang="en-US" sz="1400" dirty="0" err="1">
+                <a:latin typeface="Courier New" panose="02070309020205020404" pitchFamily="49" charset="0"/>
+                <a:cs typeface="Courier New" panose="02070309020205020404" pitchFamily="49" charset="0"/>
+              </a:rPr>
+              <a:t>c.Close</a:t>
+            </a:r>
+            <a:endParaRPr lang="en-US" sz="1400" dirty="0">
+              <a:latin typeface="Courier New" panose="02070309020205020404" pitchFamily="49" charset="0"/>
+              <a:cs typeface="Courier New" panose="02070309020205020404" pitchFamily="49" charset="0"/>
+            </a:endParaRPr>
+          </a:p>
+          <a:p>
+            <a:r>
+              <a:rPr lang="en-US" sz="1400" dirty="0">
+                <a:latin typeface="Courier New" panose="02070309020205020404" pitchFamily="49" charset="0"/>
+                <a:cs typeface="Courier New" panose="02070309020205020404" pitchFamily="49" charset="0"/>
+              </a:rPr>
+              <a:t>	</a:t>
+            </a:r>
+            <a:r>
+              <a:rPr lang="en-US" sz="1400" dirty="0" smtClean="0">
+                <a:latin typeface="Courier New" panose="02070309020205020404" pitchFamily="49" charset="0"/>
+                <a:cs typeface="Courier New" panose="02070309020205020404" pitchFamily="49" charset="0"/>
+              </a:rPr>
+              <a:t>...</a:t>
+            </a:r>
+            <a:endParaRPr lang="en-US" sz="1400" dirty="0">
+              <a:latin typeface="Courier New" panose="02070309020205020404" pitchFamily="49" charset="0"/>
+              <a:cs typeface="Courier New" panose="02070309020205020404" pitchFamily="49" charset="0"/>
+            </a:endParaRPr>
+          </a:p>
+          <a:p>
+            <a:r>
+              <a:rPr lang="en-US" sz="1400" dirty="0">
+                <a:latin typeface="Courier New" panose="02070309020205020404" pitchFamily="49" charset="0"/>
+                <a:cs typeface="Courier New" panose="02070309020205020404" pitchFamily="49" charset="0"/>
+              </a:rPr>
+              <a:t>	}</a:t>
+            </a:r>
+          </a:p>
+          <a:p>
+            <a:endParaRPr lang="en-US" sz="1400" dirty="0">
+              <a:latin typeface="Courier New" panose="02070309020205020404" pitchFamily="49" charset="0"/>
+              <a:cs typeface="Courier New" panose="02070309020205020404" pitchFamily="49" charset="0"/>
+            </a:endParaRPr>
+          </a:p>
+          <a:p>
+            <a:r>
+              <a:rPr lang="en-US" sz="1400" dirty="0">
+                <a:latin typeface="Courier New" panose="02070309020205020404" pitchFamily="49" charset="0"/>
+                <a:cs typeface="Courier New" panose="02070309020205020404" pitchFamily="49" charset="0"/>
+              </a:rPr>
+              <a:t>	</a:t>
+            </a:r>
+            <a:r>
+              <a:rPr lang="en-US" sz="1400" dirty="0" err="1">
+                <a:latin typeface="Courier New" panose="02070309020205020404" pitchFamily="49" charset="0"/>
+                <a:cs typeface="Courier New" panose="02070309020205020404" pitchFamily="49" charset="0"/>
+              </a:rPr>
+              <a:t>ntoken</a:t>
+            </a:r>
+            <a:r>
+              <a:rPr lang="en-US" sz="1400" dirty="0">
+                <a:latin typeface="Courier New" panose="02070309020205020404" pitchFamily="49" charset="0"/>
+                <a:cs typeface="Courier New" panose="02070309020205020404" pitchFamily="49" charset="0"/>
+              </a:rPr>
+              <a:t>, </a:t>
+            </a:r>
+            <a:r>
+              <a:rPr lang="en-US" sz="1400" dirty="0" err="1">
+                <a:latin typeface="Courier New" panose="02070309020205020404" pitchFamily="49" charset="0"/>
+                <a:cs typeface="Courier New" panose="02070309020205020404" pitchFamily="49" charset="0"/>
+              </a:rPr>
+              <a:t>vtoken</a:t>
+            </a:r>
+            <a:r>
+              <a:rPr lang="en-US" sz="1400" dirty="0">
+                <a:latin typeface="Courier New" panose="02070309020205020404" pitchFamily="49" charset="0"/>
+                <a:cs typeface="Courier New" panose="02070309020205020404" pitchFamily="49" charset="0"/>
+              </a:rPr>
+              <a:t> := next</a:t>
+            </a:r>
+            <a:r>
+              <a:rPr lang="en-US" sz="1400" dirty="0" smtClean="0">
+                <a:latin typeface="Courier New" panose="02070309020205020404" pitchFamily="49" charset="0"/>
+                <a:cs typeface="Courier New" panose="02070309020205020404" pitchFamily="49" charset="0"/>
+              </a:rPr>
+              <a:t>()</a:t>
+            </a:r>
+            <a:endParaRPr lang="en-US" sz="1400" dirty="0">
+              <a:latin typeface="Courier New" panose="02070309020205020404" pitchFamily="49" charset="0"/>
+              <a:cs typeface="Courier New" panose="02070309020205020404" pitchFamily="49" charset="0"/>
+            </a:endParaRPr>
+          </a:p>
+          <a:p>
+            <a:r>
+              <a:rPr lang="en-US" sz="1400" dirty="0">
+                <a:latin typeface="Courier New" panose="02070309020205020404" pitchFamily="49" charset="0"/>
+                <a:cs typeface="Courier New" panose="02070309020205020404" pitchFamily="49" charset="0"/>
+              </a:rPr>
+              <a:t>	for </a:t>
+            </a:r>
+            <a:r>
+              <a:rPr lang="en-US" sz="1400" dirty="0" err="1">
+                <a:latin typeface="Courier New" panose="02070309020205020404" pitchFamily="49" charset="0"/>
+                <a:cs typeface="Courier New" panose="02070309020205020404" pitchFamily="49" charset="0"/>
+              </a:rPr>
+              <a:t>ntoken</a:t>
+            </a:r>
+            <a:r>
+              <a:rPr lang="en-US" sz="1400" dirty="0">
+                <a:latin typeface="Courier New" panose="02070309020205020404" pitchFamily="49" charset="0"/>
+                <a:cs typeface="Courier New" panose="02070309020205020404" pitchFamily="49" charset="0"/>
+              </a:rPr>
+              <a:t> != "NULL" {</a:t>
+            </a:r>
+          </a:p>
+          <a:p>
+            <a:r>
+              <a:rPr lang="en-US" sz="1400" dirty="0">
+                <a:latin typeface="Courier New" panose="02070309020205020404" pitchFamily="49" charset="0"/>
+                <a:cs typeface="Courier New" panose="02070309020205020404" pitchFamily="49" charset="0"/>
+              </a:rPr>
+              <a:t>		tokens = append(tokens, Token{Type: </a:t>
+            </a:r>
+            <a:r>
+              <a:rPr lang="en-US" sz="1400" dirty="0" err="1">
+                <a:latin typeface="Courier New" panose="02070309020205020404" pitchFamily="49" charset="0"/>
+                <a:cs typeface="Courier New" panose="02070309020205020404" pitchFamily="49" charset="0"/>
+              </a:rPr>
+              <a:t>ntoken</a:t>
+            </a:r>
+            <a:r>
+              <a:rPr lang="en-US" sz="1400" dirty="0">
+                <a:latin typeface="Courier New" panose="02070309020205020404" pitchFamily="49" charset="0"/>
+                <a:cs typeface="Courier New" panose="02070309020205020404" pitchFamily="49" charset="0"/>
+              </a:rPr>
+              <a:t>, Value: </a:t>
+            </a:r>
+            <a:r>
+              <a:rPr lang="en-US" sz="1400" dirty="0" err="1">
+                <a:latin typeface="Courier New" panose="02070309020205020404" pitchFamily="49" charset="0"/>
+                <a:cs typeface="Courier New" panose="02070309020205020404" pitchFamily="49" charset="0"/>
+              </a:rPr>
+              <a:t>vtoken</a:t>
+            </a:r>
+            <a:r>
+              <a:rPr lang="en-US" sz="1400" dirty="0" smtClean="0">
+                <a:latin typeface="Courier New" panose="02070309020205020404" pitchFamily="49" charset="0"/>
+                <a:cs typeface="Courier New" panose="02070309020205020404" pitchFamily="49" charset="0"/>
+              </a:rPr>
+              <a:t>})</a:t>
+            </a:r>
+          </a:p>
+          <a:p>
+            <a:r>
+              <a:rPr lang="en-US" sz="1400" dirty="0" smtClean="0">
+                <a:latin typeface="Courier New" panose="02070309020205020404" pitchFamily="49" charset="0"/>
+                <a:cs typeface="Courier New" panose="02070309020205020404" pitchFamily="49" charset="0"/>
+              </a:rPr>
+              <a:t>		</a:t>
+            </a:r>
+            <a:r>
+              <a:rPr lang="en-US" sz="1400" dirty="0" err="1" smtClean="0">
+                <a:latin typeface="Courier New" panose="02070309020205020404" pitchFamily="49" charset="0"/>
+                <a:cs typeface="Courier New" panose="02070309020205020404" pitchFamily="49" charset="0"/>
+              </a:rPr>
+              <a:t>ntoken</a:t>
+            </a:r>
+            <a:r>
+              <a:rPr lang="en-US" sz="1400" dirty="0" smtClean="0">
+                <a:latin typeface="Courier New" panose="02070309020205020404" pitchFamily="49" charset="0"/>
+                <a:cs typeface="Courier New" panose="02070309020205020404" pitchFamily="49" charset="0"/>
+              </a:rPr>
+              <a:t>, </a:t>
+            </a:r>
+            <a:r>
+              <a:rPr lang="en-US" sz="1400" dirty="0" err="1" smtClean="0">
+                <a:latin typeface="Courier New" panose="02070309020205020404" pitchFamily="49" charset="0"/>
+                <a:cs typeface="Courier New" panose="02070309020205020404" pitchFamily="49" charset="0"/>
+              </a:rPr>
+              <a:t>vtoken</a:t>
+            </a:r>
+            <a:r>
+              <a:rPr lang="en-US" sz="1400" dirty="0" smtClean="0">
+                <a:latin typeface="Courier New" panose="02070309020205020404" pitchFamily="49" charset="0"/>
+                <a:cs typeface="Courier New" panose="02070309020205020404" pitchFamily="49" charset="0"/>
+              </a:rPr>
+              <a:t> = next()</a:t>
+            </a:r>
+          </a:p>
+          <a:p>
+            <a:r>
+              <a:rPr lang="en-US" sz="1400" dirty="0">
+                <a:latin typeface="Courier New" panose="02070309020205020404" pitchFamily="49" charset="0"/>
+                <a:cs typeface="Courier New" panose="02070309020205020404" pitchFamily="49" charset="0"/>
+              </a:rPr>
+              <a:t>	</a:t>
+            </a:r>
+            <a:r>
+              <a:rPr lang="en-US" sz="1400" dirty="0" smtClean="0">
+                <a:latin typeface="Courier New" panose="02070309020205020404" pitchFamily="49" charset="0"/>
+                <a:cs typeface="Courier New" panose="02070309020205020404" pitchFamily="49" charset="0"/>
+              </a:rPr>
+              <a:t>}</a:t>
+            </a:r>
+            <a:endParaRPr lang="en-US" sz="1400" dirty="0">
+              <a:latin typeface="Courier New" panose="02070309020205020404" pitchFamily="49" charset="0"/>
+              <a:cs typeface="Courier New" panose="02070309020205020404" pitchFamily="49" charset="0"/>
+            </a:endParaRPr>
+          </a:p>
+          <a:p>
+            <a:r>
+              <a:rPr lang="en-US" sz="1400" dirty="0">
+                <a:latin typeface="Courier New" panose="02070309020205020404" pitchFamily="49" charset="0"/>
+                <a:cs typeface="Courier New" panose="02070309020205020404" pitchFamily="49" charset="0"/>
+              </a:rPr>
+              <a:t>	</a:t>
+            </a:r>
+            <a:r>
+              <a:rPr lang="en-US" sz="1400" dirty="0" err="1">
+                <a:latin typeface="Courier New" panose="02070309020205020404" pitchFamily="49" charset="0"/>
+                <a:cs typeface="Courier New" panose="02070309020205020404" pitchFamily="49" charset="0"/>
+              </a:rPr>
+              <a:t>closeCall</a:t>
+            </a:r>
+            <a:r>
+              <a:rPr lang="en-US" sz="1400" dirty="0" smtClean="0">
+                <a:latin typeface="Courier New" panose="02070309020205020404" pitchFamily="49" charset="0"/>
+                <a:cs typeface="Courier New" panose="02070309020205020404" pitchFamily="49" charset="0"/>
+              </a:rPr>
+              <a:t>()</a:t>
+            </a:r>
+            <a:endParaRPr lang="en-US" sz="1400" dirty="0">
+              <a:latin typeface="Courier New" panose="02070309020205020404" pitchFamily="49" charset="0"/>
+              <a:cs typeface="Courier New" panose="02070309020205020404" pitchFamily="49" charset="0"/>
+            </a:endParaRPr>
+          </a:p>
+          <a:p>
+            <a:r>
+              <a:rPr lang="en-US" sz="1400" dirty="0">
+                <a:latin typeface="Courier New" panose="02070309020205020404" pitchFamily="49" charset="0"/>
+                <a:cs typeface="Courier New" panose="02070309020205020404" pitchFamily="49" charset="0"/>
+              </a:rPr>
+              <a:t>	return tokens</a:t>
+            </a:r>
+          </a:p>
+          <a:p>
+            <a:r>
+              <a:rPr lang="en-US" sz="1400" dirty="0" smtClean="0">
+                <a:latin typeface="Courier New" panose="02070309020205020404" pitchFamily="49" charset="0"/>
+                <a:cs typeface="Courier New" panose="02070309020205020404" pitchFamily="49" charset="0"/>
+              </a:rPr>
+              <a:t>}</a:t>
+            </a:r>
+            <a:endParaRPr lang="en-US" sz="1400" dirty="0">
+              <a:latin typeface="Courier New" panose="02070309020205020404" pitchFamily="49" charset="0"/>
+              <a:cs typeface="Courier New" panose="02070309020205020404" pitchFamily="49" charset="0"/>
+            </a:endParaRPr>
+          </a:p>
+        </p:txBody>
+      </p:sp>
+      <p:sp>
+        <p:nvSpPr>
+          <p:cNvPr id="5" name="TextBox 4"/>
+          <p:cNvSpPr txBox="1"/>
+          <p:nvPr/>
+        </p:nvSpPr>
+        <p:spPr>
+          <a:xfrm>
+            <a:off x="0" y="6311899"/>
+            <a:ext cx="1744717" cy="461665"/>
+          </a:xfrm>
+          <a:prstGeom prst="rect">
+            <a:avLst/>
+          </a:prstGeom>
+          <a:noFill/>
+        </p:spPr>
+        <p:txBody>
+          <a:bodyPr wrap="square" rtlCol="0">
+            <a:spAutoFit/>
+          </a:bodyPr>
+          <a:lstStyle/>
+          <a:p>
+            <a:r>
+              <a:rPr lang="en-US" sz="2400" dirty="0" smtClean="0">
+                <a:solidFill>
+                  <a:schemeClr val="bg1"/>
+                </a:solidFill>
+              </a:rPr>
+              <a:t>ID-10-T</a:t>
+            </a:r>
+            <a:endParaRPr lang="en-US" sz="2400" dirty="0">
+              <a:solidFill>
+                <a:schemeClr val="bg1"/>
+              </a:solidFill>
+            </a:endParaRPr>
+          </a:p>
+        </p:txBody>
+      </p:sp>
+      <p:sp>
+        <p:nvSpPr>
+          <p:cNvPr id="6" name="TextBox 5"/>
+          <p:cNvSpPr txBox="1"/>
+          <p:nvPr/>
+        </p:nvSpPr>
+        <p:spPr>
+          <a:xfrm>
+            <a:off x="4267200" y="6311899"/>
+            <a:ext cx="4876800" cy="461665"/>
+          </a:xfrm>
+          <a:prstGeom prst="rect">
+            <a:avLst/>
+          </a:prstGeom>
+          <a:noFill/>
+        </p:spPr>
+        <p:txBody>
+          <a:bodyPr wrap="square" rtlCol="0">
+            <a:spAutoFit/>
+          </a:bodyPr>
+          <a:lstStyle/>
+          <a:p>
+            <a:r>
+              <a:rPr lang="en-US" sz="2400" dirty="0" smtClean="0">
+                <a:solidFill>
+                  <a:schemeClr val="bg1"/>
+                </a:solidFill>
+              </a:rPr>
+              <a:t>Software Metrics Calculation System</a:t>
+            </a:r>
+            <a:endParaRPr lang="en-US" sz="2400" dirty="0">
+              <a:solidFill>
+                <a:schemeClr val="bg1"/>
+              </a:solidFill>
+            </a:endParaRPr>
+          </a:p>
+        </p:txBody>
+      </p:sp>
+    </p:spTree>
+    <p:extLst>
+      <p:ext uri="{BB962C8B-B14F-4D97-AF65-F5344CB8AC3E}">
+        <p14:creationId xmlns:p14="http://schemas.microsoft.com/office/powerpoint/2010/main" val="1866719685"/>
+      </p:ext>
+    </p:extLst>
+  </p:cSld>
+  <p:clrMapOvr>
+    <a:masterClrMapping/>
+  </p:clrMapOvr>
+  <p:timing>
+    <p:tnLst>
+      <p:par>
+        <p:cTn id="1" dur="indefinite" restart="never" nodeType="tmRoot"/>
+      </p:par>
+    </p:tnLst>
+  </p:timing>
 </p:sld>
 </file>
 
@@ -8572,8 +8708,8 @@
           <a:lstStyle/>
           <a:p>
             <a:r>
-              <a:rPr lang="en-US" dirty="0" err="1" smtClean="0"/>
-              <a:t>Lexer</a:t>
+              <a:rPr lang="en-US" dirty="0" smtClean="0"/>
+              <a:t>Metrics</a:t>
             </a:r>
             <a:endParaRPr lang="en-US" dirty="0"/>
           </a:p>
@@ -8587,8 +8723,8 @@
         </p:nvSpPr>
         <p:spPr>
           <a:xfrm>
-            <a:off x="628650" y="1816847"/>
-            <a:ext cx="8367996" cy="4401205"/>
+            <a:off x="838445" y="2263897"/>
+            <a:ext cx="7467109" cy="2800767"/>
           </a:xfrm>
           <a:prstGeom prst="rect">
             <a:avLst/>
@@ -8602,464 +8738,275 @@
           <a:lstStyle/>
           <a:p>
             <a:r>
-              <a:rPr lang="en-US" sz="1400" dirty="0" err="1" smtClean="0">
+              <a:rPr lang="en-US" sz="1600" dirty="0" err="1">
                 <a:latin typeface="Courier New" panose="02070309020205020404" pitchFamily="49" charset="0"/>
                 <a:cs typeface="Courier New" panose="02070309020205020404" pitchFamily="49" charset="0"/>
               </a:rPr>
               <a:t>func</a:t>
             </a:r>
             <a:r>
-              <a:rPr lang="en-US" sz="1400" dirty="0" smtClean="0">
+              <a:rPr lang="en-US" sz="1600" dirty="0">
                 <a:latin typeface="Courier New" panose="02070309020205020404" pitchFamily="49" charset="0"/>
                 <a:cs typeface="Courier New" panose="02070309020205020404" pitchFamily="49" charset="0"/>
               </a:rPr>
               <a:t> </a:t>
             </a:r>
             <a:r>
-              <a:rPr lang="en-US" sz="1400" dirty="0">
-                <a:latin typeface="Courier New" panose="02070309020205020404" pitchFamily="49" charset="0"/>
-                <a:cs typeface="Courier New" panose="02070309020205020404" pitchFamily="49" charset="0"/>
-              </a:rPr>
-              <a:t>Tokenize(language, source string) []Token {</a:t>
-            </a:r>
-          </a:p>
-          <a:p>
-            <a:r>
-              <a:rPr lang="en-US" sz="1400" dirty="0">
+              <a:rPr lang="en-US" sz="1600" dirty="0" err="1">
+                <a:latin typeface="Courier New" panose="02070309020205020404" pitchFamily="49" charset="0"/>
+                <a:cs typeface="Courier New" panose="02070309020205020404" pitchFamily="49" charset="0"/>
+              </a:rPr>
+              <a:t>LinesOfDocumentation</a:t>
+            </a:r>
+            <a:r>
+              <a:rPr lang="en-US" sz="1600" dirty="0">
+                <a:latin typeface="Courier New" panose="02070309020205020404" pitchFamily="49" charset="0"/>
+                <a:cs typeface="Courier New" panose="02070309020205020404" pitchFamily="49" charset="0"/>
+              </a:rPr>
+              <a:t>(tokens []Token) (Result, error) </a:t>
+            </a:r>
+            <a:r>
+              <a:rPr lang="en-US" sz="1600" dirty="0" smtClean="0">
+                <a:latin typeface="Courier New" panose="02070309020205020404" pitchFamily="49" charset="0"/>
+                <a:cs typeface="Courier New" panose="02070309020205020404" pitchFamily="49" charset="0"/>
+              </a:rPr>
+              <a:t>{</a:t>
+            </a:r>
+          </a:p>
+          <a:p>
+            <a:r>
+              <a:rPr lang="en-US" sz="1600" dirty="0">
+                <a:latin typeface="Courier New" panose="02070309020205020404" pitchFamily="49" charset="0"/>
+                <a:cs typeface="Courier New" panose="02070309020205020404" pitchFamily="49" charset="0"/>
+              </a:rPr>
+              <a:t> </a:t>
+            </a:r>
+            <a:r>
+              <a:rPr lang="en-US" sz="1600" dirty="0" smtClean="0">
+                <a:latin typeface="Courier New" panose="02070309020205020404" pitchFamily="49" charset="0"/>
+                <a:cs typeface="Courier New" panose="02070309020205020404" pitchFamily="49" charset="0"/>
+              </a:rPr>
+              <a:t>   lines </a:t>
+            </a:r>
+            <a:r>
+              <a:rPr lang="en-US" sz="1600" dirty="0">
+                <a:latin typeface="Courier New" panose="02070309020205020404" pitchFamily="49" charset="0"/>
+                <a:cs typeface="Courier New" panose="02070309020205020404" pitchFamily="49" charset="0"/>
+              </a:rPr>
+              <a:t>:= 0</a:t>
+            </a:r>
+          </a:p>
+          <a:p>
+            <a:r>
+              <a:rPr lang="en-US" sz="1600" dirty="0" smtClean="0">
+                <a:latin typeface="Courier New" panose="02070309020205020404" pitchFamily="49" charset="0"/>
+                <a:cs typeface="Courier New" panose="02070309020205020404" pitchFamily="49" charset="0"/>
+              </a:rPr>
+              <a:t>    for </a:t>
+            </a:r>
+            <a:r>
+              <a:rPr lang="en-US" sz="1600" dirty="0">
+                <a:latin typeface="Courier New" panose="02070309020205020404" pitchFamily="49" charset="0"/>
+                <a:cs typeface="Courier New" panose="02070309020205020404" pitchFamily="49" charset="0"/>
+              </a:rPr>
+              <a:t>_, token := range tokens {</a:t>
+            </a:r>
+          </a:p>
+          <a:p>
+            <a:r>
+              <a:rPr lang="en-US" sz="1600" dirty="0">
                 <a:latin typeface="Courier New" panose="02070309020205020404" pitchFamily="49" charset="0"/>
                 <a:cs typeface="Courier New" panose="02070309020205020404" pitchFamily="49" charset="0"/>
               </a:rPr>
               <a:t>	</a:t>
             </a:r>
             <a:r>
-              <a:rPr lang="en-US" sz="1400" dirty="0" err="1">
-                <a:latin typeface="Courier New" panose="02070309020205020404" pitchFamily="49" charset="0"/>
-                <a:cs typeface="Courier New" panose="02070309020205020404" pitchFamily="49" charset="0"/>
-              </a:rPr>
-              <a:t>var</a:t>
-            </a:r>
-            <a:r>
-              <a:rPr lang="en-US" sz="1400" dirty="0">
-                <a:latin typeface="Courier New" panose="02070309020205020404" pitchFamily="49" charset="0"/>
-                <a:cs typeface="Courier New" panose="02070309020205020404" pitchFamily="49" charset="0"/>
-              </a:rPr>
-              <a:t> next </a:t>
-            </a:r>
-            <a:r>
-              <a:rPr lang="en-US" sz="1400" dirty="0" err="1">
-                <a:latin typeface="Courier New" panose="02070309020205020404" pitchFamily="49" charset="0"/>
-                <a:cs typeface="Courier New" panose="02070309020205020404" pitchFamily="49" charset="0"/>
-              </a:rPr>
-              <a:t>NextToken</a:t>
-            </a:r>
-            <a:endParaRPr lang="en-US" sz="1400" dirty="0">
+              <a:rPr lang="en-US" sz="1600" dirty="0" smtClean="0">
+                <a:latin typeface="Courier New" panose="02070309020205020404" pitchFamily="49" charset="0"/>
+                <a:cs typeface="Courier New" panose="02070309020205020404" pitchFamily="49" charset="0"/>
+              </a:rPr>
+              <a:t>if </a:t>
+            </a:r>
+            <a:r>
+              <a:rPr lang="en-US" sz="1600" dirty="0" err="1">
+                <a:latin typeface="Courier New" panose="02070309020205020404" pitchFamily="49" charset="0"/>
+                <a:cs typeface="Courier New" panose="02070309020205020404" pitchFamily="49" charset="0"/>
+              </a:rPr>
+              <a:t>token.Type</a:t>
+            </a:r>
+            <a:r>
+              <a:rPr lang="en-US" sz="1600" dirty="0">
+                <a:latin typeface="Courier New" panose="02070309020205020404" pitchFamily="49" charset="0"/>
+                <a:cs typeface="Courier New" panose="02070309020205020404" pitchFamily="49" charset="0"/>
+              </a:rPr>
+              <a:t> == "LINE_COMMENT" {</a:t>
+            </a:r>
+          </a:p>
+          <a:p>
+            <a:r>
+              <a:rPr lang="en-US" sz="1600" dirty="0">
+                <a:latin typeface="Courier New" panose="02070309020205020404" pitchFamily="49" charset="0"/>
+                <a:cs typeface="Courier New" panose="02070309020205020404" pitchFamily="49" charset="0"/>
+              </a:rPr>
+              <a:t>	</a:t>
+            </a:r>
+            <a:r>
+              <a:rPr lang="en-US" sz="1600" dirty="0" smtClean="0">
+                <a:latin typeface="Courier New" panose="02070309020205020404" pitchFamily="49" charset="0"/>
+                <a:cs typeface="Courier New" panose="02070309020205020404" pitchFamily="49" charset="0"/>
+              </a:rPr>
+              <a:t>    lines</a:t>
+            </a:r>
+            <a:r>
+              <a:rPr lang="en-US" sz="1600" dirty="0">
+                <a:latin typeface="Courier New" panose="02070309020205020404" pitchFamily="49" charset="0"/>
+                <a:cs typeface="Courier New" panose="02070309020205020404" pitchFamily="49" charset="0"/>
+              </a:rPr>
+              <a:t>++</a:t>
+            </a:r>
+          </a:p>
+          <a:p>
+            <a:r>
+              <a:rPr lang="en-US" sz="1600" dirty="0">
+                <a:latin typeface="Courier New" panose="02070309020205020404" pitchFamily="49" charset="0"/>
+                <a:cs typeface="Courier New" panose="02070309020205020404" pitchFamily="49" charset="0"/>
+              </a:rPr>
+              <a:t>	</a:t>
+            </a:r>
+            <a:r>
+              <a:rPr lang="en-US" sz="1600" dirty="0" smtClean="0">
+                <a:latin typeface="Courier New" panose="02070309020205020404" pitchFamily="49" charset="0"/>
+                <a:cs typeface="Courier New" panose="02070309020205020404" pitchFamily="49" charset="0"/>
+              </a:rPr>
+              <a:t>} </a:t>
+            </a:r>
+            <a:r>
+              <a:rPr lang="en-US" sz="1600" dirty="0">
+                <a:latin typeface="Courier New" panose="02070309020205020404" pitchFamily="49" charset="0"/>
+                <a:cs typeface="Courier New" panose="02070309020205020404" pitchFamily="49" charset="0"/>
+              </a:rPr>
+              <a:t>else if </a:t>
+            </a:r>
+            <a:r>
+              <a:rPr lang="en-US" sz="1600" dirty="0" err="1">
+                <a:latin typeface="Courier New" panose="02070309020205020404" pitchFamily="49" charset="0"/>
+                <a:cs typeface="Courier New" panose="02070309020205020404" pitchFamily="49" charset="0"/>
+              </a:rPr>
+              <a:t>token.Type</a:t>
+            </a:r>
+            <a:r>
+              <a:rPr lang="en-US" sz="1600" dirty="0">
+                <a:latin typeface="Courier New" panose="02070309020205020404" pitchFamily="49" charset="0"/>
+                <a:cs typeface="Courier New" panose="02070309020205020404" pitchFamily="49" charset="0"/>
+              </a:rPr>
+              <a:t> == "BLOCK_COMMENT" {</a:t>
+            </a:r>
+          </a:p>
+          <a:p>
+            <a:r>
+              <a:rPr lang="en-US" sz="1600" dirty="0">
+                <a:latin typeface="Courier New" panose="02070309020205020404" pitchFamily="49" charset="0"/>
+                <a:cs typeface="Courier New" panose="02070309020205020404" pitchFamily="49" charset="0"/>
+              </a:rPr>
+              <a:t>	</a:t>
+            </a:r>
+            <a:r>
+              <a:rPr lang="en-US" sz="1600" dirty="0" smtClean="0">
+                <a:latin typeface="Courier New" panose="02070309020205020404" pitchFamily="49" charset="0"/>
+                <a:cs typeface="Courier New" panose="02070309020205020404" pitchFamily="49" charset="0"/>
+              </a:rPr>
+              <a:t>    lines </a:t>
+            </a:r>
+            <a:r>
+              <a:rPr lang="en-US" sz="1600" dirty="0">
+                <a:latin typeface="Courier New" panose="02070309020205020404" pitchFamily="49" charset="0"/>
+                <a:cs typeface="Courier New" panose="02070309020205020404" pitchFamily="49" charset="0"/>
+              </a:rPr>
+              <a:t>+= </a:t>
+            </a:r>
+            <a:r>
+              <a:rPr lang="en-US" sz="1600" dirty="0" err="1">
+                <a:latin typeface="Courier New" panose="02070309020205020404" pitchFamily="49" charset="0"/>
+                <a:cs typeface="Courier New" panose="02070309020205020404" pitchFamily="49" charset="0"/>
+              </a:rPr>
+              <a:t>strings.Count</a:t>
+            </a:r>
+            <a:r>
+              <a:rPr lang="en-US" sz="1600" dirty="0">
+                <a:latin typeface="Courier New" panose="02070309020205020404" pitchFamily="49" charset="0"/>
+                <a:cs typeface="Courier New" panose="02070309020205020404" pitchFamily="49" charset="0"/>
+              </a:rPr>
+              <a:t>(</a:t>
+            </a:r>
+            <a:r>
+              <a:rPr lang="en-US" sz="1600" dirty="0" err="1">
+                <a:latin typeface="Courier New" panose="02070309020205020404" pitchFamily="49" charset="0"/>
+                <a:cs typeface="Courier New" panose="02070309020205020404" pitchFamily="49" charset="0"/>
+              </a:rPr>
+              <a:t>token.Value</a:t>
+            </a:r>
+            <a:r>
+              <a:rPr lang="en-US" sz="1600" dirty="0">
+                <a:latin typeface="Courier New" panose="02070309020205020404" pitchFamily="49" charset="0"/>
+                <a:cs typeface="Courier New" panose="02070309020205020404" pitchFamily="49" charset="0"/>
+              </a:rPr>
+              <a:t>, "\n") + 1</a:t>
+            </a:r>
+          </a:p>
+          <a:p>
+            <a:r>
+              <a:rPr lang="en-US" sz="1600" dirty="0">
+                <a:latin typeface="Courier New" panose="02070309020205020404" pitchFamily="49" charset="0"/>
+                <a:cs typeface="Courier New" panose="02070309020205020404" pitchFamily="49" charset="0"/>
+              </a:rPr>
+              <a:t>	</a:t>
+            </a:r>
+            <a:r>
+              <a:rPr lang="en-US" sz="1600" dirty="0" smtClean="0">
+                <a:latin typeface="Courier New" panose="02070309020205020404" pitchFamily="49" charset="0"/>
+                <a:cs typeface="Courier New" panose="02070309020205020404" pitchFamily="49" charset="0"/>
+              </a:rPr>
+              <a:t>}</a:t>
+            </a:r>
+            <a:endParaRPr lang="en-US" sz="1600" dirty="0">
               <a:latin typeface="Courier New" panose="02070309020205020404" pitchFamily="49" charset="0"/>
               <a:cs typeface="Courier New" panose="02070309020205020404" pitchFamily="49" charset="0"/>
             </a:endParaRPr>
           </a:p>
           <a:p>
             <a:r>
-              <a:rPr lang="en-US" sz="1400" dirty="0">
-                <a:latin typeface="Courier New" panose="02070309020205020404" pitchFamily="49" charset="0"/>
-                <a:cs typeface="Courier New" panose="02070309020205020404" pitchFamily="49" charset="0"/>
-              </a:rPr>
-              <a:t>	</a:t>
-            </a:r>
-            <a:r>
-              <a:rPr lang="en-US" sz="1400" dirty="0" err="1">
-                <a:latin typeface="Courier New" panose="02070309020205020404" pitchFamily="49" charset="0"/>
-                <a:cs typeface="Courier New" panose="02070309020205020404" pitchFamily="49" charset="0"/>
-              </a:rPr>
-              <a:t>var</a:t>
-            </a:r>
-            <a:r>
-              <a:rPr lang="en-US" sz="1400" dirty="0">
-                <a:latin typeface="Courier New" panose="02070309020205020404" pitchFamily="49" charset="0"/>
-                <a:cs typeface="Courier New" panose="02070309020205020404" pitchFamily="49" charset="0"/>
-              </a:rPr>
-              <a:t> tokens []Token</a:t>
-            </a:r>
-          </a:p>
-          <a:p>
-            <a:r>
-              <a:rPr lang="en-US" sz="1400" dirty="0">
-                <a:latin typeface="Courier New" panose="02070309020205020404" pitchFamily="49" charset="0"/>
-                <a:cs typeface="Courier New" panose="02070309020205020404" pitchFamily="49" charset="0"/>
-              </a:rPr>
-              <a:t>	</a:t>
-            </a:r>
-            <a:r>
-              <a:rPr lang="en-US" sz="1400" dirty="0" err="1">
-                <a:latin typeface="Courier New" panose="02070309020205020404" pitchFamily="49" charset="0"/>
-                <a:cs typeface="Courier New" panose="02070309020205020404" pitchFamily="49" charset="0"/>
-              </a:rPr>
-              <a:t>var</a:t>
-            </a:r>
-            <a:r>
-              <a:rPr lang="en-US" sz="1400" dirty="0">
-                <a:latin typeface="Courier New" panose="02070309020205020404" pitchFamily="49" charset="0"/>
-                <a:cs typeface="Courier New" panose="02070309020205020404" pitchFamily="49" charset="0"/>
-              </a:rPr>
-              <a:t> </a:t>
-            </a:r>
-            <a:r>
-              <a:rPr lang="en-US" sz="1400" dirty="0" err="1">
-                <a:latin typeface="Courier New" panose="02070309020205020404" pitchFamily="49" charset="0"/>
-                <a:cs typeface="Courier New" panose="02070309020205020404" pitchFamily="49" charset="0"/>
-              </a:rPr>
-              <a:t>closeCall</a:t>
-            </a:r>
-            <a:r>
-              <a:rPr lang="en-US" sz="1400" dirty="0">
-                <a:latin typeface="Courier New" panose="02070309020205020404" pitchFamily="49" charset="0"/>
-                <a:cs typeface="Courier New" panose="02070309020205020404" pitchFamily="49" charset="0"/>
-              </a:rPr>
-              <a:t> Close</a:t>
-            </a:r>
-          </a:p>
-          <a:p>
-            <a:r>
-              <a:rPr lang="en-US" sz="1400" dirty="0">
-                <a:latin typeface="Courier New" panose="02070309020205020404" pitchFamily="49" charset="0"/>
-                <a:cs typeface="Courier New" panose="02070309020205020404" pitchFamily="49" charset="0"/>
-              </a:rPr>
-              <a:t>	switch language {</a:t>
-            </a:r>
-          </a:p>
-          <a:p>
-            <a:r>
-              <a:rPr lang="en-US" sz="1400" dirty="0">
-                <a:latin typeface="Courier New" panose="02070309020205020404" pitchFamily="49" charset="0"/>
-                <a:cs typeface="Courier New" panose="02070309020205020404" pitchFamily="49" charset="0"/>
-              </a:rPr>
-              <a:t>	case "c":</a:t>
-            </a:r>
-          </a:p>
-          <a:p>
-            <a:r>
-              <a:rPr lang="en-US" sz="1400" dirty="0">
-                <a:latin typeface="Courier New" panose="02070309020205020404" pitchFamily="49" charset="0"/>
-                <a:cs typeface="Courier New" panose="02070309020205020404" pitchFamily="49" charset="0"/>
-              </a:rPr>
-              <a:t>		</a:t>
-            </a:r>
-            <a:r>
-              <a:rPr lang="en-US" sz="1400" dirty="0" err="1">
-                <a:latin typeface="Courier New" panose="02070309020205020404" pitchFamily="49" charset="0"/>
-                <a:cs typeface="Courier New" panose="02070309020205020404" pitchFamily="49" charset="0"/>
-              </a:rPr>
-              <a:t>c.Parse</a:t>
-            </a:r>
-            <a:r>
-              <a:rPr lang="en-US" sz="1400" dirty="0">
-                <a:latin typeface="Courier New" panose="02070309020205020404" pitchFamily="49" charset="0"/>
-                <a:cs typeface="Courier New" panose="02070309020205020404" pitchFamily="49" charset="0"/>
-              </a:rPr>
-              <a:t>(source)</a:t>
-            </a:r>
-          </a:p>
-          <a:p>
-            <a:r>
-              <a:rPr lang="en-US" sz="1400" dirty="0">
-                <a:latin typeface="Courier New" panose="02070309020205020404" pitchFamily="49" charset="0"/>
-                <a:cs typeface="Courier New" panose="02070309020205020404" pitchFamily="49" charset="0"/>
-              </a:rPr>
-              <a:t>		next = </a:t>
-            </a:r>
-            <a:r>
-              <a:rPr lang="en-US" sz="1400" dirty="0" err="1">
-                <a:latin typeface="Courier New" panose="02070309020205020404" pitchFamily="49" charset="0"/>
-                <a:cs typeface="Courier New" panose="02070309020205020404" pitchFamily="49" charset="0"/>
-              </a:rPr>
-              <a:t>c.NextToken</a:t>
-            </a:r>
-            <a:endParaRPr lang="en-US" sz="1400" dirty="0">
+              <a:rPr lang="en-US" sz="1600" dirty="0" smtClean="0">
+                <a:latin typeface="Courier New" panose="02070309020205020404" pitchFamily="49" charset="0"/>
+                <a:cs typeface="Courier New" panose="02070309020205020404" pitchFamily="49" charset="0"/>
+              </a:rPr>
+              <a:t>    }</a:t>
+            </a:r>
+            <a:endParaRPr lang="en-US" sz="1600" dirty="0">
               <a:latin typeface="Courier New" panose="02070309020205020404" pitchFamily="49" charset="0"/>
               <a:cs typeface="Courier New" panose="02070309020205020404" pitchFamily="49" charset="0"/>
             </a:endParaRPr>
           </a:p>
           <a:p>
             <a:r>
-              <a:rPr lang="en-US" sz="1400" dirty="0">
-                <a:latin typeface="Courier New" panose="02070309020205020404" pitchFamily="49" charset="0"/>
-                <a:cs typeface="Courier New" panose="02070309020205020404" pitchFamily="49" charset="0"/>
-              </a:rPr>
-              <a:t>		</a:t>
-            </a:r>
-            <a:r>
-              <a:rPr lang="en-US" sz="1400" dirty="0" err="1">
-                <a:latin typeface="Courier New" panose="02070309020205020404" pitchFamily="49" charset="0"/>
-                <a:cs typeface="Courier New" panose="02070309020205020404" pitchFamily="49" charset="0"/>
-              </a:rPr>
-              <a:t>closeCall</a:t>
-            </a:r>
-            <a:r>
-              <a:rPr lang="en-US" sz="1400" dirty="0">
-                <a:latin typeface="Courier New" panose="02070309020205020404" pitchFamily="49" charset="0"/>
-                <a:cs typeface="Courier New" panose="02070309020205020404" pitchFamily="49" charset="0"/>
-              </a:rPr>
-              <a:t> = </a:t>
-            </a:r>
-            <a:r>
-              <a:rPr lang="en-US" sz="1400" dirty="0" err="1">
-                <a:latin typeface="Courier New" panose="02070309020205020404" pitchFamily="49" charset="0"/>
-                <a:cs typeface="Courier New" panose="02070309020205020404" pitchFamily="49" charset="0"/>
-              </a:rPr>
-              <a:t>c.Close</a:t>
-            </a:r>
-            <a:endParaRPr lang="en-US" sz="1400" dirty="0">
+              <a:rPr lang="en-US" sz="1600" dirty="0" smtClean="0">
+                <a:latin typeface="Courier New" panose="02070309020205020404" pitchFamily="49" charset="0"/>
+                <a:cs typeface="Courier New" panose="02070309020205020404" pitchFamily="49" charset="0"/>
+              </a:rPr>
+              <a:t>    ...</a:t>
+            </a:r>
+            <a:endParaRPr lang="en-US" sz="1600" dirty="0">
               <a:latin typeface="Courier New" panose="02070309020205020404" pitchFamily="49" charset="0"/>
               <a:cs typeface="Courier New" panose="02070309020205020404" pitchFamily="49" charset="0"/>
             </a:endParaRPr>
           </a:p>
           <a:p>
             <a:r>
-              <a:rPr lang="en-US" sz="1400" dirty="0">
-                <a:latin typeface="Courier New" panose="02070309020205020404" pitchFamily="49" charset="0"/>
-                <a:cs typeface="Courier New" panose="02070309020205020404" pitchFamily="49" charset="0"/>
-              </a:rPr>
-              <a:t>	</a:t>
-            </a:r>
-            <a:r>
-              <a:rPr lang="en-US" sz="1400" dirty="0" smtClean="0">
-                <a:latin typeface="Courier New" panose="02070309020205020404" pitchFamily="49" charset="0"/>
-                <a:cs typeface="Courier New" panose="02070309020205020404" pitchFamily="49" charset="0"/>
-              </a:rPr>
-              <a:t>...</a:t>
-            </a:r>
-            <a:endParaRPr lang="en-US" sz="1400" dirty="0">
-              <a:latin typeface="Courier New" panose="02070309020205020404" pitchFamily="49" charset="0"/>
-              <a:cs typeface="Courier New" panose="02070309020205020404" pitchFamily="49" charset="0"/>
-            </a:endParaRPr>
-          </a:p>
-          <a:p>
-            <a:r>
-              <a:rPr lang="en-US" sz="1400" dirty="0">
-                <a:latin typeface="Courier New" panose="02070309020205020404" pitchFamily="49" charset="0"/>
-                <a:cs typeface="Courier New" panose="02070309020205020404" pitchFamily="49" charset="0"/>
-              </a:rPr>
-              <a:t>	}</a:t>
-            </a:r>
-          </a:p>
-          <a:p>
-            <a:endParaRPr lang="en-US" sz="1400" dirty="0">
-              <a:latin typeface="Courier New" panose="02070309020205020404" pitchFamily="49" charset="0"/>
-              <a:cs typeface="Courier New" panose="02070309020205020404" pitchFamily="49" charset="0"/>
-            </a:endParaRPr>
-          </a:p>
-          <a:p>
-            <a:r>
-              <a:rPr lang="en-US" sz="1400" dirty="0">
-                <a:latin typeface="Courier New" panose="02070309020205020404" pitchFamily="49" charset="0"/>
-                <a:cs typeface="Courier New" panose="02070309020205020404" pitchFamily="49" charset="0"/>
-              </a:rPr>
-              <a:t>	</a:t>
-            </a:r>
-            <a:r>
-              <a:rPr lang="en-US" sz="1400" dirty="0" err="1">
-                <a:latin typeface="Courier New" panose="02070309020205020404" pitchFamily="49" charset="0"/>
-                <a:cs typeface="Courier New" panose="02070309020205020404" pitchFamily="49" charset="0"/>
-              </a:rPr>
-              <a:t>ntoken</a:t>
-            </a:r>
-            <a:r>
-              <a:rPr lang="en-US" sz="1400" dirty="0">
-                <a:latin typeface="Courier New" panose="02070309020205020404" pitchFamily="49" charset="0"/>
-                <a:cs typeface="Courier New" panose="02070309020205020404" pitchFamily="49" charset="0"/>
-              </a:rPr>
-              <a:t>, </a:t>
-            </a:r>
-            <a:r>
-              <a:rPr lang="en-US" sz="1400" dirty="0" err="1">
-                <a:latin typeface="Courier New" panose="02070309020205020404" pitchFamily="49" charset="0"/>
-                <a:cs typeface="Courier New" panose="02070309020205020404" pitchFamily="49" charset="0"/>
-              </a:rPr>
-              <a:t>vtoken</a:t>
-            </a:r>
-            <a:r>
-              <a:rPr lang="en-US" sz="1400" dirty="0">
-                <a:latin typeface="Courier New" panose="02070309020205020404" pitchFamily="49" charset="0"/>
-                <a:cs typeface="Courier New" panose="02070309020205020404" pitchFamily="49" charset="0"/>
-              </a:rPr>
-              <a:t> := next</a:t>
-            </a:r>
-            <a:r>
-              <a:rPr lang="en-US" sz="1400" dirty="0" smtClean="0">
-                <a:latin typeface="Courier New" panose="02070309020205020404" pitchFamily="49" charset="0"/>
-                <a:cs typeface="Courier New" panose="02070309020205020404" pitchFamily="49" charset="0"/>
-              </a:rPr>
-              <a:t>()</a:t>
-            </a:r>
-            <a:endParaRPr lang="en-US" sz="1400" dirty="0">
-              <a:latin typeface="Courier New" panose="02070309020205020404" pitchFamily="49" charset="0"/>
-              <a:cs typeface="Courier New" panose="02070309020205020404" pitchFamily="49" charset="0"/>
-            </a:endParaRPr>
-          </a:p>
-          <a:p>
-            <a:r>
-              <a:rPr lang="en-US" sz="1400" dirty="0">
-                <a:latin typeface="Courier New" panose="02070309020205020404" pitchFamily="49" charset="0"/>
-                <a:cs typeface="Courier New" panose="02070309020205020404" pitchFamily="49" charset="0"/>
-              </a:rPr>
-              <a:t>	for </a:t>
-            </a:r>
-            <a:r>
-              <a:rPr lang="en-US" sz="1400" dirty="0" err="1">
-                <a:latin typeface="Courier New" panose="02070309020205020404" pitchFamily="49" charset="0"/>
-                <a:cs typeface="Courier New" panose="02070309020205020404" pitchFamily="49" charset="0"/>
-              </a:rPr>
-              <a:t>ntoken</a:t>
-            </a:r>
-            <a:r>
-              <a:rPr lang="en-US" sz="1400" dirty="0">
-                <a:latin typeface="Courier New" panose="02070309020205020404" pitchFamily="49" charset="0"/>
-                <a:cs typeface="Courier New" panose="02070309020205020404" pitchFamily="49" charset="0"/>
-              </a:rPr>
-              <a:t> != "NULL" {</a:t>
-            </a:r>
-          </a:p>
-          <a:p>
-            <a:r>
-              <a:rPr lang="en-US" sz="1400" dirty="0">
-                <a:latin typeface="Courier New" panose="02070309020205020404" pitchFamily="49" charset="0"/>
-                <a:cs typeface="Courier New" panose="02070309020205020404" pitchFamily="49" charset="0"/>
-              </a:rPr>
-              <a:t>		tokens = append(tokens, Token{Type: </a:t>
-            </a:r>
-            <a:r>
-              <a:rPr lang="en-US" sz="1400" dirty="0" err="1">
-                <a:latin typeface="Courier New" panose="02070309020205020404" pitchFamily="49" charset="0"/>
-                <a:cs typeface="Courier New" panose="02070309020205020404" pitchFamily="49" charset="0"/>
-              </a:rPr>
-              <a:t>ntoken</a:t>
-            </a:r>
-            <a:r>
-              <a:rPr lang="en-US" sz="1400" dirty="0">
-                <a:latin typeface="Courier New" panose="02070309020205020404" pitchFamily="49" charset="0"/>
-                <a:cs typeface="Courier New" panose="02070309020205020404" pitchFamily="49" charset="0"/>
-              </a:rPr>
-              <a:t>, Value: </a:t>
-            </a:r>
-            <a:r>
-              <a:rPr lang="en-US" sz="1400" dirty="0" err="1">
-                <a:latin typeface="Courier New" panose="02070309020205020404" pitchFamily="49" charset="0"/>
-                <a:cs typeface="Courier New" panose="02070309020205020404" pitchFamily="49" charset="0"/>
-              </a:rPr>
-              <a:t>vtoken</a:t>
-            </a:r>
-            <a:r>
-              <a:rPr lang="en-US" sz="1400" dirty="0" smtClean="0">
-                <a:latin typeface="Courier New" panose="02070309020205020404" pitchFamily="49" charset="0"/>
-                <a:cs typeface="Courier New" panose="02070309020205020404" pitchFamily="49" charset="0"/>
-              </a:rPr>
-              <a:t>})</a:t>
-            </a:r>
-          </a:p>
-          <a:p>
-            <a:r>
-              <a:rPr lang="en-US" sz="1400" dirty="0" smtClean="0">
-                <a:latin typeface="Courier New" panose="02070309020205020404" pitchFamily="49" charset="0"/>
-                <a:cs typeface="Courier New" panose="02070309020205020404" pitchFamily="49" charset="0"/>
-              </a:rPr>
-              <a:t>		</a:t>
-            </a:r>
-            <a:r>
-              <a:rPr lang="en-US" sz="1400" dirty="0" err="1" smtClean="0">
-                <a:latin typeface="Courier New" panose="02070309020205020404" pitchFamily="49" charset="0"/>
-                <a:cs typeface="Courier New" panose="02070309020205020404" pitchFamily="49" charset="0"/>
-              </a:rPr>
-              <a:t>ntoken</a:t>
-            </a:r>
-            <a:r>
-              <a:rPr lang="en-US" sz="1400" dirty="0" smtClean="0">
-                <a:latin typeface="Courier New" panose="02070309020205020404" pitchFamily="49" charset="0"/>
-                <a:cs typeface="Courier New" panose="02070309020205020404" pitchFamily="49" charset="0"/>
-              </a:rPr>
-              <a:t>, </a:t>
-            </a:r>
-            <a:r>
-              <a:rPr lang="en-US" sz="1400" dirty="0" err="1" smtClean="0">
-                <a:latin typeface="Courier New" panose="02070309020205020404" pitchFamily="49" charset="0"/>
-                <a:cs typeface="Courier New" panose="02070309020205020404" pitchFamily="49" charset="0"/>
-              </a:rPr>
-              <a:t>vtoken</a:t>
-            </a:r>
-            <a:r>
-              <a:rPr lang="en-US" sz="1400" dirty="0" smtClean="0">
-                <a:latin typeface="Courier New" panose="02070309020205020404" pitchFamily="49" charset="0"/>
-                <a:cs typeface="Courier New" panose="02070309020205020404" pitchFamily="49" charset="0"/>
-              </a:rPr>
-              <a:t> = next()</a:t>
-            </a:r>
-          </a:p>
-          <a:p>
-            <a:r>
-              <a:rPr lang="en-US" sz="1400" dirty="0">
-                <a:latin typeface="Courier New" panose="02070309020205020404" pitchFamily="49" charset="0"/>
-                <a:cs typeface="Courier New" panose="02070309020205020404" pitchFamily="49" charset="0"/>
-              </a:rPr>
-              <a:t>	</a:t>
-            </a:r>
-            <a:r>
-              <a:rPr lang="en-US" sz="1400" dirty="0" smtClean="0">
+              <a:rPr lang="en-US" sz="1600" dirty="0">
                 <a:latin typeface="Courier New" panose="02070309020205020404" pitchFamily="49" charset="0"/>
                 <a:cs typeface="Courier New" panose="02070309020205020404" pitchFamily="49" charset="0"/>
               </a:rPr>
               <a:t>}</a:t>
             </a:r>
-            <a:endParaRPr lang="en-US" sz="1400" dirty="0">
-              <a:latin typeface="Courier New" panose="02070309020205020404" pitchFamily="49" charset="0"/>
-              <a:cs typeface="Courier New" panose="02070309020205020404" pitchFamily="49" charset="0"/>
-            </a:endParaRPr>
-          </a:p>
-          <a:p>
-            <a:r>
-              <a:rPr lang="en-US" sz="1400" dirty="0">
-                <a:latin typeface="Courier New" panose="02070309020205020404" pitchFamily="49" charset="0"/>
-                <a:cs typeface="Courier New" panose="02070309020205020404" pitchFamily="49" charset="0"/>
-              </a:rPr>
-              <a:t>	</a:t>
-            </a:r>
-            <a:r>
-              <a:rPr lang="en-US" sz="1400" dirty="0" err="1">
-                <a:latin typeface="Courier New" panose="02070309020205020404" pitchFamily="49" charset="0"/>
-                <a:cs typeface="Courier New" panose="02070309020205020404" pitchFamily="49" charset="0"/>
-              </a:rPr>
-              <a:t>closeCall</a:t>
-            </a:r>
-            <a:r>
-              <a:rPr lang="en-US" sz="1400" dirty="0" smtClean="0">
-                <a:latin typeface="Courier New" panose="02070309020205020404" pitchFamily="49" charset="0"/>
-                <a:cs typeface="Courier New" panose="02070309020205020404" pitchFamily="49" charset="0"/>
-              </a:rPr>
-              <a:t>()</a:t>
-            </a:r>
-            <a:endParaRPr lang="en-US" sz="1400" dirty="0">
-              <a:latin typeface="Courier New" panose="02070309020205020404" pitchFamily="49" charset="0"/>
-              <a:cs typeface="Courier New" panose="02070309020205020404" pitchFamily="49" charset="0"/>
-            </a:endParaRPr>
-          </a:p>
-          <a:p>
-            <a:r>
-              <a:rPr lang="en-US" sz="1400" dirty="0">
-                <a:latin typeface="Courier New" panose="02070309020205020404" pitchFamily="49" charset="0"/>
-                <a:cs typeface="Courier New" panose="02070309020205020404" pitchFamily="49" charset="0"/>
-              </a:rPr>
-              <a:t>	return tokens</a:t>
-            </a:r>
-          </a:p>
-          <a:p>
-            <a:r>
-              <a:rPr lang="en-US" sz="1400" dirty="0" smtClean="0">
-                <a:latin typeface="Courier New" panose="02070309020205020404" pitchFamily="49" charset="0"/>
-                <a:cs typeface="Courier New" panose="02070309020205020404" pitchFamily="49" charset="0"/>
-              </a:rPr>
-              <a:t>}</a:t>
-            </a:r>
-            <a:endParaRPr lang="en-US" sz="1400" dirty="0">
-              <a:latin typeface="Courier New" panose="02070309020205020404" pitchFamily="49" charset="0"/>
-              <a:cs typeface="Courier New" panose="02070309020205020404" pitchFamily="49" charset="0"/>
-            </a:endParaRPr>
           </a:p>
         </p:txBody>
       </p:sp>
@@ -9142,13 +9089,20 @@
     </p:spTree>
     <p:extLst>
       <p:ext uri="{BB962C8B-B14F-4D97-AF65-F5344CB8AC3E}">
-        <p14:creationId xmlns:p14="http://schemas.microsoft.com/office/powerpoint/2010/main" val="1866719685"/>
+        <p14:creationId xmlns:p14="http://schemas.microsoft.com/office/powerpoint/2010/main" val="2910772930"/>
       </p:ext>
     </p:extLst>
   </p:cSld>
   <p:clrMapOvr>
     <a:masterClrMapping/>
   </p:clrMapOvr>
+  <p:timing>
+    <p:tnLst>
+      <p:par>
+        <p:cTn id="1" dur="indefinite" restart="never" nodeType="tmRoot"/>
+      </p:par>
+    </p:tnLst>
+  </p:timing>
 </p:sld>
 </file>
 
@@ -9186,307 +9140,41 @@
           <a:p>
             <a:r>
               <a:rPr lang="en-US" dirty="0" smtClean="0"/>
-              <a:t>Metrics</a:t>
+              <a:t>Original System Design</a:t>
             </a:r>
             <a:endParaRPr lang="en-US" dirty="0"/>
           </a:p>
         </p:txBody>
       </p:sp>
-      <p:sp>
-        <p:nvSpPr>
-          <p:cNvPr id="4" name="TextBox 3"/>
-          <p:cNvSpPr txBox="1"/>
-          <p:nvPr/>
-        </p:nvSpPr>
+      <p:pic>
+        <p:nvPicPr>
+          <p:cNvPr id="4" name="Content Placeholder 3"/>
+          <p:cNvPicPr>
+            <a:picLocks noGrp="1" noChangeAspect="1"/>
+          </p:cNvPicPr>
+          <p:nvPr>
+            <p:ph idx="1"/>
+          </p:nvPr>
+        </p:nvPicPr>
+        <p:blipFill>
+          <a:blip r:embed="rId2">
+            <a:extLst>
+              <a:ext uri="{28A0092B-C50C-407E-A947-70E740481C1C}">
+                <a14:useLocalDpi xmlns:a14="http://schemas.microsoft.com/office/drawing/2010/main" val="0"/>
+              </a:ext>
+            </a:extLst>
+          </a:blip>
+          <a:stretch>
+            <a:fillRect/>
+          </a:stretch>
+        </p:blipFill>
         <p:spPr>
           <a:xfrm>
-            <a:off x="838445" y="2263897"/>
-            <a:ext cx="7467109" cy="2800767"/>
+            <a:off x="1537150" y="1825625"/>
+            <a:ext cx="6069700" cy="4351338"/>
           </a:xfrm>
-          <a:prstGeom prst="rect">
-            <a:avLst/>
-          </a:prstGeom>
-          <a:noFill/>
         </p:spPr>
-        <p:txBody>
-          <a:bodyPr wrap="none" rtlCol="0">
-            <a:spAutoFit/>
-          </a:bodyPr>
-          <a:lstStyle/>
-          <a:p>
-            <a:r>
-              <a:rPr lang="en-US" sz="1600" dirty="0" err="1">
-                <a:latin typeface="Courier New" panose="02070309020205020404" pitchFamily="49" charset="0"/>
-                <a:cs typeface="Courier New" panose="02070309020205020404" pitchFamily="49" charset="0"/>
-              </a:rPr>
-              <a:t>func</a:t>
-            </a:r>
-            <a:r>
-              <a:rPr lang="en-US" sz="1600" dirty="0">
-                <a:latin typeface="Courier New" panose="02070309020205020404" pitchFamily="49" charset="0"/>
-                <a:cs typeface="Courier New" panose="02070309020205020404" pitchFamily="49" charset="0"/>
-              </a:rPr>
-              <a:t> </a:t>
-            </a:r>
-            <a:r>
-              <a:rPr lang="en-US" sz="1600" dirty="0" err="1">
-                <a:latin typeface="Courier New" panose="02070309020205020404" pitchFamily="49" charset="0"/>
-                <a:cs typeface="Courier New" panose="02070309020205020404" pitchFamily="49" charset="0"/>
-              </a:rPr>
-              <a:t>LinesOfDocumentation</a:t>
-            </a:r>
-            <a:r>
-              <a:rPr lang="en-US" sz="1600" dirty="0">
-                <a:latin typeface="Courier New" panose="02070309020205020404" pitchFamily="49" charset="0"/>
-                <a:cs typeface="Courier New" panose="02070309020205020404" pitchFamily="49" charset="0"/>
-              </a:rPr>
-              <a:t>(tokens []Token) (Result, error) </a:t>
-            </a:r>
-            <a:r>
-              <a:rPr lang="en-US" sz="1600" dirty="0" smtClean="0">
-                <a:latin typeface="Courier New" panose="02070309020205020404" pitchFamily="49" charset="0"/>
-                <a:cs typeface="Courier New" panose="02070309020205020404" pitchFamily="49" charset="0"/>
-              </a:rPr>
-              <a:t>{</a:t>
-            </a:r>
-          </a:p>
-          <a:p>
-            <a:r>
-              <a:rPr lang="en-US" sz="1600" dirty="0">
-                <a:latin typeface="Courier New" panose="02070309020205020404" pitchFamily="49" charset="0"/>
-                <a:cs typeface="Courier New" panose="02070309020205020404" pitchFamily="49" charset="0"/>
-              </a:rPr>
-              <a:t> </a:t>
-            </a:r>
-            <a:r>
-              <a:rPr lang="en-US" sz="1600" dirty="0" smtClean="0">
-                <a:latin typeface="Courier New" panose="02070309020205020404" pitchFamily="49" charset="0"/>
-                <a:cs typeface="Courier New" panose="02070309020205020404" pitchFamily="49" charset="0"/>
-              </a:rPr>
-              <a:t>   lines </a:t>
-            </a:r>
-            <a:r>
-              <a:rPr lang="en-US" sz="1600" dirty="0">
-                <a:latin typeface="Courier New" panose="02070309020205020404" pitchFamily="49" charset="0"/>
-                <a:cs typeface="Courier New" panose="02070309020205020404" pitchFamily="49" charset="0"/>
-              </a:rPr>
-              <a:t>:= 0</a:t>
-            </a:r>
-          </a:p>
-          <a:p>
-            <a:r>
-              <a:rPr lang="en-US" sz="1600" dirty="0" smtClean="0">
-                <a:latin typeface="Courier New" panose="02070309020205020404" pitchFamily="49" charset="0"/>
-                <a:cs typeface="Courier New" panose="02070309020205020404" pitchFamily="49" charset="0"/>
-              </a:rPr>
-              <a:t>    for </a:t>
-            </a:r>
-            <a:r>
-              <a:rPr lang="en-US" sz="1600" dirty="0">
-                <a:latin typeface="Courier New" panose="02070309020205020404" pitchFamily="49" charset="0"/>
-                <a:cs typeface="Courier New" panose="02070309020205020404" pitchFamily="49" charset="0"/>
-              </a:rPr>
-              <a:t>_, token := range tokens {</a:t>
-            </a:r>
-          </a:p>
-          <a:p>
-            <a:r>
-              <a:rPr lang="en-US" sz="1600" dirty="0">
-                <a:latin typeface="Courier New" panose="02070309020205020404" pitchFamily="49" charset="0"/>
-                <a:cs typeface="Courier New" panose="02070309020205020404" pitchFamily="49" charset="0"/>
-              </a:rPr>
-              <a:t>	</a:t>
-            </a:r>
-            <a:r>
-              <a:rPr lang="en-US" sz="1600" dirty="0" smtClean="0">
-                <a:latin typeface="Courier New" panose="02070309020205020404" pitchFamily="49" charset="0"/>
-                <a:cs typeface="Courier New" panose="02070309020205020404" pitchFamily="49" charset="0"/>
-              </a:rPr>
-              <a:t>if </a:t>
-            </a:r>
-            <a:r>
-              <a:rPr lang="en-US" sz="1600" dirty="0" err="1">
-                <a:latin typeface="Courier New" panose="02070309020205020404" pitchFamily="49" charset="0"/>
-                <a:cs typeface="Courier New" panose="02070309020205020404" pitchFamily="49" charset="0"/>
-              </a:rPr>
-              <a:t>token.Type</a:t>
-            </a:r>
-            <a:r>
-              <a:rPr lang="en-US" sz="1600" dirty="0">
-                <a:latin typeface="Courier New" panose="02070309020205020404" pitchFamily="49" charset="0"/>
-                <a:cs typeface="Courier New" panose="02070309020205020404" pitchFamily="49" charset="0"/>
-              </a:rPr>
-              <a:t> == "LINE_COMMENT" {</a:t>
-            </a:r>
-          </a:p>
-          <a:p>
-            <a:r>
-              <a:rPr lang="en-US" sz="1600" dirty="0">
-                <a:latin typeface="Courier New" panose="02070309020205020404" pitchFamily="49" charset="0"/>
-                <a:cs typeface="Courier New" panose="02070309020205020404" pitchFamily="49" charset="0"/>
-              </a:rPr>
-              <a:t>	</a:t>
-            </a:r>
-            <a:r>
-              <a:rPr lang="en-US" sz="1600" dirty="0" smtClean="0">
-                <a:latin typeface="Courier New" panose="02070309020205020404" pitchFamily="49" charset="0"/>
-                <a:cs typeface="Courier New" panose="02070309020205020404" pitchFamily="49" charset="0"/>
-              </a:rPr>
-              <a:t>    lines</a:t>
-            </a:r>
-            <a:r>
-              <a:rPr lang="en-US" sz="1600" dirty="0">
-                <a:latin typeface="Courier New" panose="02070309020205020404" pitchFamily="49" charset="0"/>
-                <a:cs typeface="Courier New" panose="02070309020205020404" pitchFamily="49" charset="0"/>
-              </a:rPr>
-              <a:t>++</a:t>
-            </a:r>
-          </a:p>
-          <a:p>
-            <a:r>
-              <a:rPr lang="en-US" sz="1600" dirty="0">
-                <a:latin typeface="Courier New" panose="02070309020205020404" pitchFamily="49" charset="0"/>
-                <a:cs typeface="Courier New" panose="02070309020205020404" pitchFamily="49" charset="0"/>
-              </a:rPr>
-              <a:t>	</a:t>
-            </a:r>
-            <a:r>
-              <a:rPr lang="en-US" sz="1600" dirty="0" smtClean="0">
-                <a:latin typeface="Courier New" panose="02070309020205020404" pitchFamily="49" charset="0"/>
-                <a:cs typeface="Courier New" panose="02070309020205020404" pitchFamily="49" charset="0"/>
-              </a:rPr>
-              <a:t>} </a:t>
-            </a:r>
-            <a:r>
-              <a:rPr lang="en-US" sz="1600" dirty="0">
-                <a:latin typeface="Courier New" panose="02070309020205020404" pitchFamily="49" charset="0"/>
-                <a:cs typeface="Courier New" panose="02070309020205020404" pitchFamily="49" charset="0"/>
-              </a:rPr>
-              <a:t>else if </a:t>
-            </a:r>
-            <a:r>
-              <a:rPr lang="en-US" sz="1600" dirty="0" err="1">
-                <a:latin typeface="Courier New" panose="02070309020205020404" pitchFamily="49" charset="0"/>
-                <a:cs typeface="Courier New" panose="02070309020205020404" pitchFamily="49" charset="0"/>
-              </a:rPr>
-              <a:t>token.Type</a:t>
-            </a:r>
-            <a:r>
-              <a:rPr lang="en-US" sz="1600" dirty="0">
-                <a:latin typeface="Courier New" panose="02070309020205020404" pitchFamily="49" charset="0"/>
-                <a:cs typeface="Courier New" panose="02070309020205020404" pitchFamily="49" charset="0"/>
-              </a:rPr>
-              <a:t> == "BLOCK_COMMENT" {</a:t>
-            </a:r>
-          </a:p>
-          <a:p>
-            <a:r>
-              <a:rPr lang="en-US" sz="1600" dirty="0">
-                <a:latin typeface="Courier New" panose="02070309020205020404" pitchFamily="49" charset="0"/>
-                <a:cs typeface="Courier New" panose="02070309020205020404" pitchFamily="49" charset="0"/>
-              </a:rPr>
-              <a:t>	</a:t>
-            </a:r>
-            <a:r>
-              <a:rPr lang="en-US" sz="1600" dirty="0" smtClean="0">
-                <a:latin typeface="Courier New" panose="02070309020205020404" pitchFamily="49" charset="0"/>
-                <a:cs typeface="Courier New" panose="02070309020205020404" pitchFamily="49" charset="0"/>
-              </a:rPr>
-              <a:t>    lines </a:t>
-            </a:r>
-            <a:r>
-              <a:rPr lang="en-US" sz="1600" dirty="0">
-                <a:latin typeface="Courier New" panose="02070309020205020404" pitchFamily="49" charset="0"/>
-                <a:cs typeface="Courier New" panose="02070309020205020404" pitchFamily="49" charset="0"/>
-              </a:rPr>
-              <a:t>+= </a:t>
-            </a:r>
-            <a:r>
-              <a:rPr lang="en-US" sz="1600" dirty="0" err="1">
-                <a:latin typeface="Courier New" panose="02070309020205020404" pitchFamily="49" charset="0"/>
-                <a:cs typeface="Courier New" panose="02070309020205020404" pitchFamily="49" charset="0"/>
-              </a:rPr>
-              <a:t>strings.Count</a:t>
-            </a:r>
-            <a:r>
-              <a:rPr lang="en-US" sz="1600" dirty="0">
-                <a:latin typeface="Courier New" panose="02070309020205020404" pitchFamily="49" charset="0"/>
-                <a:cs typeface="Courier New" panose="02070309020205020404" pitchFamily="49" charset="0"/>
-              </a:rPr>
-              <a:t>(</a:t>
-            </a:r>
-            <a:r>
-              <a:rPr lang="en-US" sz="1600" dirty="0" err="1">
-                <a:latin typeface="Courier New" panose="02070309020205020404" pitchFamily="49" charset="0"/>
-                <a:cs typeface="Courier New" panose="02070309020205020404" pitchFamily="49" charset="0"/>
-              </a:rPr>
-              <a:t>token.Value</a:t>
-            </a:r>
-            <a:r>
-              <a:rPr lang="en-US" sz="1600" dirty="0">
-                <a:latin typeface="Courier New" panose="02070309020205020404" pitchFamily="49" charset="0"/>
-                <a:cs typeface="Courier New" panose="02070309020205020404" pitchFamily="49" charset="0"/>
-              </a:rPr>
-              <a:t>, "\n") + 1</a:t>
-            </a:r>
-          </a:p>
-          <a:p>
-            <a:r>
-              <a:rPr lang="en-US" sz="1600" dirty="0">
-                <a:latin typeface="Courier New" panose="02070309020205020404" pitchFamily="49" charset="0"/>
-                <a:cs typeface="Courier New" panose="02070309020205020404" pitchFamily="49" charset="0"/>
-              </a:rPr>
-              <a:t>	</a:t>
-            </a:r>
-            <a:r>
-              <a:rPr lang="en-US" sz="1600" dirty="0" smtClean="0">
-                <a:latin typeface="Courier New" panose="02070309020205020404" pitchFamily="49" charset="0"/>
-                <a:cs typeface="Courier New" panose="02070309020205020404" pitchFamily="49" charset="0"/>
-              </a:rPr>
-              <a:t>}</a:t>
-            </a:r>
-            <a:endParaRPr lang="en-US" sz="1600" dirty="0">
-              <a:latin typeface="Courier New" panose="02070309020205020404" pitchFamily="49" charset="0"/>
-              <a:cs typeface="Courier New" panose="02070309020205020404" pitchFamily="49" charset="0"/>
-            </a:endParaRPr>
-          </a:p>
-          <a:p>
-            <a:r>
-              <a:rPr lang="en-US" sz="1600" dirty="0" smtClean="0">
-                <a:latin typeface="Courier New" panose="02070309020205020404" pitchFamily="49" charset="0"/>
-                <a:cs typeface="Courier New" panose="02070309020205020404" pitchFamily="49" charset="0"/>
-              </a:rPr>
-              <a:t>    }</a:t>
-            </a:r>
-            <a:endParaRPr lang="en-US" sz="1600" dirty="0">
-              <a:latin typeface="Courier New" panose="02070309020205020404" pitchFamily="49" charset="0"/>
-              <a:cs typeface="Courier New" panose="02070309020205020404" pitchFamily="49" charset="0"/>
-            </a:endParaRPr>
-          </a:p>
-          <a:p>
-            <a:r>
-              <a:rPr lang="en-US" sz="1600" dirty="0" smtClean="0">
-                <a:latin typeface="Courier New" panose="02070309020205020404" pitchFamily="49" charset="0"/>
-                <a:cs typeface="Courier New" panose="02070309020205020404" pitchFamily="49" charset="0"/>
-              </a:rPr>
-              <a:t>    ...</a:t>
-            </a:r>
-            <a:endParaRPr lang="en-US" sz="1600" dirty="0">
-              <a:latin typeface="Courier New" panose="02070309020205020404" pitchFamily="49" charset="0"/>
-              <a:cs typeface="Courier New" panose="02070309020205020404" pitchFamily="49" charset="0"/>
-            </a:endParaRPr>
-          </a:p>
-          <a:p>
-            <a:r>
-              <a:rPr lang="en-US" sz="1600" dirty="0">
-                <a:latin typeface="Courier New" panose="02070309020205020404" pitchFamily="49" charset="0"/>
-                <a:cs typeface="Courier New" panose="02070309020205020404" pitchFamily="49" charset="0"/>
-              </a:rPr>
-              <a:t>}</a:t>
-            </a:r>
-          </a:p>
-        </p:txBody>
-      </p:sp>
+      </p:pic>
       <p:sp>
         <p:nvSpPr>
           <p:cNvPr id="5" name="TextBox 4"/>
@@ -9566,13 +9254,20 @@
     </p:spTree>
     <p:extLst>
       <p:ext uri="{BB962C8B-B14F-4D97-AF65-F5344CB8AC3E}">
-        <p14:creationId xmlns:p14="http://schemas.microsoft.com/office/powerpoint/2010/main" val="2910772930"/>
+        <p14:creationId xmlns:p14="http://schemas.microsoft.com/office/powerpoint/2010/main" val="2264783950"/>
       </p:ext>
     </p:extLst>
   </p:cSld>
   <p:clrMapOvr>
     <a:masterClrMapping/>
   </p:clrMapOvr>
+  <p:timing>
+    <p:tnLst>
+      <p:par>
+        <p:cTn id="1" dur="indefinite" restart="never" nodeType="tmRoot"/>
+      </p:par>
+    </p:tnLst>
+  </p:timing>
 </p:sld>
 </file>
 

</xml_diff>

<commit_message>
modify presentation and add objective grading
</commit_message>
<xml_diff>
--- a/software-engineering-final.pptx
+++ b/software-engineering-final.pptx
@@ -15,11 +15,12 @@
     <p:sldId id="270" r:id="rId9"/>
     <p:sldId id="271" r:id="rId10"/>
     <p:sldId id="261" r:id="rId11"/>
-    <p:sldId id="262" r:id="rId12"/>
-    <p:sldId id="263" r:id="rId13"/>
-    <p:sldId id="264" r:id="rId14"/>
-    <p:sldId id="260" r:id="rId15"/>
-    <p:sldId id="265" r:id="rId16"/>
+    <p:sldId id="272" r:id="rId12"/>
+    <p:sldId id="262" r:id="rId13"/>
+    <p:sldId id="263" r:id="rId14"/>
+    <p:sldId id="264" r:id="rId15"/>
+    <p:sldId id="260" r:id="rId16"/>
+    <p:sldId id="265" r:id="rId17"/>
   </p:sldIdLst>
   <p:sldSz cx="9144000" cy="6858000" type="screen4x3"/>
   <p:notesSz cx="6858000" cy="9144000"/>
@@ -257,7 +258,7 @@
           <a:p>
             <a:fld id="{94ABC641-97F1-8C45-A694-1B07B93F9841}" type="datetimeFigureOut">
               <a:rPr lang="en-US" smtClean="0"/>
-              <a:t>5/2/17</a:t>
+              <a:t>5/4/17</a:t>
             </a:fld>
             <a:endParaRPr lang="en-US"/>
           </a:p>
@@ -427,7 +428,7 @@
           <a:p>
             <a:fld id="{94ABC641-97F1-8C45-A694-1B07B93F9841}" type="datetimeFigureOut">
               <a:rPr lang="en-US" smtClean="0"/>
-              <a:t>5/2/17</a:t>
+              <a:t>5/4/17</a:t>
             </a:fld>
             <a:endParaRPr lang="en-US"/>
           </a:p>
@@ -607,7 +608,7 @@
           <a:p>
             <a:fld id="{94ABC641-97F1-8C45-A694-1B07B93F9841}" type="datetimeFigureOut">
               <a:rPr lang="en-US" smtClean="0"/>
-              <a:t>5/2/17</a:t>
+              <a:t>5/4/17</a:t>
             </a:fld>
             <a:endParaRPr lang="en-US"/>
           </a:p>
@@ -777,7 +778,7 @@
           <a:p>
             <a:fld id="{94ABC641-97F1-8C45-A694-1B07B93F9841}" type="datetimeFigureOut">
               <a:rPr lang="en-US" smtClean="0"/>
-              <a:t>5/2/17</a:t>
+              <a:t>5/4/17</a:t>
             </a:fld>
             <a:endParaRPr lang="en-US"/>
           </a:p>
@@ -1021,7 +1022,7 @@
           <a:p>
             <a:fld id="{94ABC641-97F1-8C45-A694-1B07B93F9841}" type="datetimeFigureOut">
               <a:rPr lang="en-US" smtClean="0"/>
-              <a:t>5/2/17</a:t>
+              <a:t>5/4/17</a:t>
             </a:fld>
             <a:endParaRPr lang="en-US"/>
           </a:p>
@@ -1253,7 +1254,7 @@
           <a:p>
             <a:fld id="{94ABC641-97F1-8C45-A694-1B07B93F9841}" type="datetimeFigureOut">
               <a:rPr lang="en-US" smtClean="0"/>
-              <a:t>5/2/17</a:t>
+              <a:t>5/4/17</a:t>
             </a:fld>
             <a:endParaRPr lang="en-US"/>
           </a:p>
@@ -1620,7 +1621,7 @@
           <a:p>
             <a:fld id="{94ABC641-97F1-8C45-A694-1B07B93F9841}" type="datetimeFigureOut">
               <a:rPr lang="en-US" smtClean="0"/>
-              <a:t>5/2/17</a:t>
+              <a:t>5/4/17</a:t>
             </a:fld>
             <a:endParaRPr lang="en-US"/>
           </a:p>
@@ -1738,7 +1739,7 @@
           <a:p>
             <a:fld id="{94ABC641-97F1-8C45-A694-1B07B93F9841}" type="datetimeFigureOut">
               <a:rPr lang="en-US" smtClean="0"/>
-              <a:t>5/2/17</a:t>
+              <a:t>5/4/17</a:t>
             </a:fld>
             <a:endParaRPr lang="en-US"/>
           </a:p>
@@ -1833,7 +1834,7 @@
           <a:p>
             <a:fld id="{94ABC641-97F1-8C45-A694-1B07B93F9841}" type="datetimeFigureOut">
               <a:rPr lang="en-US" smtClean="0"/>
-              <a:t>5/2/17</a:t>
+              <a:t>5/4/17</a:t>
             </a:fld>
             <a:endParaRPr lang="en-US"/>
           </a:p>
@@ -2110,7 +2111,7 @@
           <a:p>
             <a:fld id="{94ABC641-97F1-8C45-A694-1B07B93F9841}" type="datetimeFigureOut">
               <a:rPr lang="en-US" smtClean="0"/>
-              <a:t>5/2/17</a:t>
+              <a:t>5/4/17</a:t>
             </a:fld>
             <a:endParaRPr lang="en-US"/>
           </a:p>
@@ -2367,7 +2368,7 @@
           <a:p>
             <a:fld id="{94ABC641-97F1-8C45-A694-1B07B93F9841}" type="datetimeFigureOut">
               <a:rPr lang="en-US" smtClean="0"/>
-              <a:t>5/2/17</a:t>
+              <a:t>5/4/17</a:t>
             </a:fld>
             <a:endParaRPr lang="en-US"/>
           </a:p>
@@ -2620,7 +2621,7 @@
           <a:p>
             <a:fld id="{94ABC641-97F1-8C45-A694-1B07B93F9841}" type="datetimeFigureOut">
               <a:rPr lang="en-US" smtClean="0"/>
-              <a:t>5/2/17</a:t>
+              <a:t>5/4/17</a:t>
             </a:fld>
             <a:endParaRPr lang="en-US" dirty="0"/>
           </a:p>
@@ -3485,35 +3486,35 @@
                 <a:gridCol w="421769">
                   <a:extLst>
                     <a:ext uri="{9D8B030D-6E8A-4147-A177-3AD203B41FA5}">
-                      <a16:colId xmlns:a16="http://schemas.microsoft.com/office/drawing/2014/main" xmlns="" val="20000"/>
+                      <a16:colId xmlns="" xmlns:a16="http://schemas.microsoft.com/office/drawing/2014/main" val="20000"/>
                     </a:ext>
                   </a:extLst>
                 </a:gridCol>
                 <a:gridCol w="1691342">
                   <a:extLst>
                     <a:ext uri="{9D8B030D-6E8A-4147-A177-3AD203B41FA5}">
-                      <a16:colId xmlns:a16="http://schemas.microsoft.com/office/drawing/2014/main" xmlns="" val="20001"/>
+                      <a16:colId xmlns="" xmlns:a16="http://schemas.microsoft.com/office/drawing/2014/main" val="20001"/>
                     </a:ext>
                   </a:extLst>
                 </a:gridCol>
                 <a:gridCol w="1284941">
                   <a:extLst>
                     <a:ext uri="{9D8B030D-6E8A-4147-A177-3AD203B41FA5}">
-                      <a16:colId xmlns:a16="http://schemas.microsoft.com/office/drawing/2014/main" xmlns="" val="20002"/>
+                      <a16:colId xmlns="" xmlns:a16="http://schemas.microsoft.com/office/drawing/2014/main" val="20002"/>
                     </a:ext>
                   </a:extLst>
                 </a:gridCol>
                 <a:gridCol w="1272988">
                   <a:extLst>
                     <a:ext uri="{9D8B030D-6E8A-4147-A177-3AD203B41FA5}">
-                      <a16:colId xmlns:a16="http://schemas.microsoft.com/office/drawing/2014/main" xmlns="" val="20003"/>
+                      <a16:colId xmlns="" xmlns:a16="http://schemas.microsoft.com/office/drawing/2014/main" val="20003"/>
                     </a:ext>
                   </a:extLst>
                 </a:gridCol>
                 <a:gridCol w="573741">
                   <a:extLst>
                     <a:ext uri="{9D8B030D-6E8A-4147-A177-3AD203B41FA5}">
-                      <a16:colId xmlns:a16="http://schemas.microsoft.com/office/drawing/2014/main" xmlns="" val="20004"/>
+                      <a16:colId xmlns="" xmlns:a16="http://schemas.microsoft.com/office/drawing/2014/main" val="20004"/>
                     </a:ext>
                   </a:extLst>
                 </a:gridCol>
@@ -3616,7 +3617,7 @@
                 </a:tc>
                 <a:extLst>
                   <a:ext uri="{0D108BD9-81ED-4DB2-BD59-A6C34878D82A}">
-                    <a16:rowId xmlns:a16="http://schemas.microsoft.com/office/drawing/2014/main" xmlns="" val="10000"/>
+                    <a16:rowId xmlns="" xmlns:a16="http://schemas.microsoft.com/office/drawing/2014/main" val="10000"/>
                   </a:ext>
                 </a:extLst>
               </a:tr>
@@ -3718,7 +3719,7 @@
                 </a:tc>
                 <a:extLst>
                   <a:ext uri="{0D108BD9-81ED-4DB2-BD59-A6C34878D82A}">
-                    <a16:rowId xmlns:a16="http://schemas.microsoft.com/office/drawing/2014/main" xmlns="" val="10001"/>
+                    <a16:rowId xmlns="" xmlns:a16="http://schemas.microsoft.com/office/drawing/2014/main" val="10001"/>
                   </a:ext>
                 </a:extLst>
               </a:tr>
@@ -3820,7 +3821,7 @@
                 </a:tc>
                 <a:extLst>
                   <a:ext uri="{0D108BD9-81ED-4DB2-BD59-A6C34878D82A}">
-                    <a16:rowId xmlns:a16="http://schemas.microsoft.com/office/drawing/2014/main" xmlns="" val="10002"/>
+                    <a16:rowId xmlns="" xmlns:a16="http://schemas.microsoft.com/office/drawing/2014/main" val="10002"/>
                   </a:ext>
                 </a:extLst>
               </a:tr>
@@ -3929,7 +3930,7 @@
                 </a:tc>
                 <a:extLst>
                   <a:ext uri="{0D108BD9-81ED-4DB2-BD59-A6C34878D82A}">
-                    <a16:rowId xmlns:a16="http://schemas.microsoft.com/office/drawing/2014/main" xmlns="" val="10003"/>
+                    <a16:rowId xmlns="" xmlns:a16="http://schemas.microsoft.com/office/drawing/2014/main" val="10003"/>
                   </a:ext>
                 </a:extLst>
               </a:tr>
@@ -4080,7 +4081,7 @@
                 </a:tc>
                 <a:extLst>
                   <a:ext uri="{0D108BD9-81ED-4DB2-BD59-A6C34878D82A}">
-                    <a16:rowId xmlns:a16="http://schemas.microsoft.com/office/drawing/2014/main" xmlns="" val="10004"/>
+                    <a16:rowId xmlns="" xmlns:a16="http://schemas.microsoft.com/office/drawing/2014/main" val="10004"/>
                   </a:ext>
                 </a:extLst>
               </a:tr>
@@ -4196,7 +4197,7 @@
                 </a:tc>
                 <a:extLst>
                   <a:ext uri="{0D108BD9-81ED-4DB2-BD59-A6C34878D82A}">
-                    <a16:rowId xmlns:a16="http://schemas.microsoft.com/office/drawing/2014/main" xmlns="" val="10005"/>
+                    <a16:rowId xmlns="" xmlns:a16="http://schemas.microsoft.com/office/drawing/2014/main" val="10005"/>
                   </a:ext>
                 </a:extLst>
               </a:tr>
@@ -4298,7 +4299,7 @@
                 </a:tc>
                 <a:extLst>
                   <a:ext uri="{0D108BD9-81ED-4DB2-BD59-A6C34878D82A}">
-                    <a16:rowId xmlns:a16="http://schemas.microsoft.com/office/drawing/2014/main" xmlns="" val="10006"/>
+                    <a16:rowId xmlns="" xmlns:a16="http://schemas.microsoft.com/office/drawing/2014/main" val="10006"/>
                   </a:ext>
                 </a:extLst>
               </a:tr>
@@ -4400,7 +4401,7 @@
                 </a:tc>
                 <a:extLst>
                   <a:ext uri="{0D108BD9-81ED-4DB2-BD59-A6C34878D82A}">
-                    <a16:rowId xmlns:a16="http://schemas.microsoft.com/office/drawing/2014/main" xmlns="" val="10007"/>
+                    <a16:rowId xmlns="" xmlns:a16="http://schemas.microsoft.com/office/drawing/2014/main" val="10007"/>
                   </a:ext>
                 </a:extLst>
               </a:tr>
@@ -4436,35 +4437,35 @@
                 <a:gridCol w="414347">
                   <a:extLst>
                     <a:ext uri="{9D8B030D-6E8A-4147-A177-3AD203B41FA5}">
-                      <a16:colId xmlns:a16="http://schemas.microsoft.com/office/drawing/2014/main" xmlns="" val="20000"/>
+                      <a16:colId xmlns="" xmlns:a16="http://schemas.microsoft.com/office/drawing/2014/main" val="20000"/>
                     </a:ext>
                   </a:extLst>
                 </a:gridCol>
                 <a:gridCol w="1410447">
                   <a:extLst>
                     <a:ext uri="{9D8B030D-6E8A-4147-A177-3AD203B41FA5}">
-                      <a16:colId xmlns:a16="http://schemas.microsoft.com/office/drawing/2014/main" xmlns="" val="20001"/>
+                      <a16:colId xmlns="" xmlns:a16="http://schemas.microsoft.com/office/drawing/2014/main" val="20001"/>
                     </a:ext>
                   </a:extLst>
                 </a:gridCol>
                 <a:gridCol w="1256701">
                   <a:extLst>
                     <a:ext uri="{9D8B030D-6E8A-4147-A177-3AD203B41FA5}">
-                      <a16:colId xmlns:a16="http://schemas.microsoft.com/office/drawing/2014/main" xmlns="" val="20002"/>
+                      <a16:colId xmlns="" xmlns:a16="http://schemas.microsoft.com/office/drawing/2014/main" val="20002"/>
                     </a:ext>
                   </a:extLst>
                 </a:gridCol>
                 <a:gridCol w="1127911">
                   <a:extLst>
                     <a:ext uri="{9D8B030D-6E8A-4147-A177-3AD203B41FA5}">
-                      <a16:colId xmlns:a16="http://schemas.microsoft.com/office/drawing/2014/main" xmlns="" val="20003"/>
+                      <a16:colId xmlns="" xmlns:a16="http://schemas.microsoft.com/office/drawing/2014/main" val="20003"/>
                     </a:ext>
                   </a:extLst>
                 </a:gridCol>
                 <a:gridCol w="591670">
                   <a:extLst>
                     <a:ext uri="{9D8B030D-6E8A-4147-A177-3AD203B41FA5}">
-                      <a16:colId xmlns:a16="http://schemas.microsoft.com/office/drawing/2014/main" xmlns="" val="20004"/>
+                      <a16:colId xmlns="" xmlns:a16="http://schemas.microsoft.com/office/drawing/2014/main" val="20004"/>
                     </a:ext>
                   </a:extLst>
                 </a:gridCol>
@@ -4567,7 +4568,7 @@
                 </a:tc>
                 <a:extLst>
                   <a:ext uri="{0D108BD9-81ED-4DB2-BD59-A6C34878D82A}">
-                    <a16:rowId xmlns:a16="http://schemas.microsoft.com/office/drawing/2014/main" xmlns="" val="10000"/>
+                    <a16:rowId xmlns="" xmlns:a16="http://schemas.microsoft.com/office/drawing/2014/main" val="10000"/>
                   </a:ext>
                 </a:extLst>
               </a:tr>
@@ -4673,7 +4674,7 @@
                 </a:tc>
                 <a:extLst>
                   <a:ext uri="{0D108BD9-81ED-4DB2-BD59-A6C34878D82A}">
-                    <a16:rowId xmlns:a16="http://schemas.microsoft.com/office/drawing/2014/main" xmlns="" val="10001"/>
+                    <a16:rowId xmlns="" xmlns:a16="http://schemas.microsoft.com/office/drawing/2014/main" val="10001"/>
                   </a:ext>
                 </a:extLst>
               </a:tr>
@@ -4789,7 +4790,7 @@
                 </a:tc>
                 <a:extLst>
                   <a:ext uri="{0D108BD9-81ED-4DB2-BD59-A6C34878D82A}">
-                    <a16:rowId xmlns:a16="http://schemas.microsoft.com/office/drawing/2014/main" xmlns="" val="10002"/>
+                    <a16:rowId xmlns="" xmlns:a16="http://schemas.microsoft.com/office/drawing/2014/main" val="10002"/>
                   </a:ext>
                 </a:extLst>
               </a:tr>
@@ -4898,7 +4899,7 @@
                 </a:tc>
                 <a:extLst>
                   <a:ext uri="{0D108BD9-81ED-4DB2-BD59-A6C34878D82A}">
-                    <a16:rowId xmlns:a16="http://schemas.microsoft.com/office/drawing/2014/main" xmlns="" val="10003"/>
+                    <a16:rowId xmlns="" xmlns:a16="http://schemas.microsoft.com/office/drawing/2014/main" val="10003"/>
                   </a:ext>
                 </a:extLst>
               </a:tr>
@@ -5034,7 +5035,7 @@
                 </a:tc>
                 <a:extLst>
                   <a:ext uri="{0D108BD9-81ED-4DB2-BD59-A6C34878D82A}">
-                    <a16:rowId xmlns:a16="http://schemas.microsoft.com/office/drawing/2014/main" xmlns="" val="10004"/>
+                    <a16:rowId xmlns="" xmlns:a16="http://schemas.microsoft.com/office/drawing/2014/main" val="10004"/>
                   </a:ext>
                 </a:extLst>
               </a:tr>
@@ -5200,7 +5201,7 @@
                 </a:tc>
                 <a:extLst>
                   <a:ext uri="{0D108BD9-81ED-4DB2-BD59-A6C34878D82A}">
-                    <a16:rowId xmlns:a16="http://schemas.microsoft.com/office/drawing/2014/main" xmlns="" val="10005"/>
+                    <a16:rowId xmlns="" xmlns:a16="http://schemas.microsoft.com/office/drawing/2014/main" val="10005"/>
                   </a:ext>
                 </a:extLst>
               </a:tr>
@@ -5229,6 +5230,310 @@
 </file>
 
 <file path=ppt/slides/slide11.xml><?xml version="1.0" encoding="utf-8"?>
+<p:sld xmlns:a="http://schemas.openxmlformats.org/drawingml/2006/main" xmlns:r="http://schemas.openxmlformats.org/officeDocument/2006/relationships" xmlns:p="http://schemas.openxmlformats.org/presentationml/2006/main">
+  <p:cSld>
+    <p:spTree>
+      <p:nvGrpSpPr>
+        <p:cNvPr id="1" name=""/>
+        <p:cNvGrpSpPr/>
+        <p:nvPr/>
+      </p:nvGrpSpPr>
+      <p:grpSpPr>
+        <a:xfrm>
+          <a:off x="0" y="0"/>
+          <a:ext cx="0" cy="0"/>
+          <a:chOff x="0" y="0"/>
+          <a:chExt cx="0" cy="0"/>
+        </a:xfrm>
+      </p:grpSpPr>
+      <p:sp>
+        <p:nvSpPr>
+          <p:cNvPr id="2" name="Title 1"/>
+          <p:cNvSpPr>
+            <a:spLocks noGrp="1"/>
+          </p:cNvSpPr>
+          <p:nvPr>
+            <p:ph type="title"/>
+          </p:nvPr>
+        </p:nvSpPr>
+        <p:spPr/>
+        <p:txBody>
+          <a:bodyPr/>
+          <a:lstStyle/>
+          <a:p>
+            <a:r>
+              <a:rPr lang="en-US" dirty="0" smtClean="0"/>
+              <a:t>Issue Found In Testing</a:t>
+            </a:r>
+            <a:endParaRPr lang="en-US" dirty="0"/>
+          </a:p>
+        </p:txBody>
+      </p:sp>
+      <p:sp>
+        <p:nvSpPr>
+          <p:cNvPr id="3" name="Content Placeholder 2"/>
+          <p:cNvSpPr>
+            <a:spLocks noGrp="1"/>
+          </p:cNvSpPr>
+          <p:nvPr>
+            <p:ph idx="1"/>
+          </p:nvPr>
+        </p:nvSpPr>
+        <p:spPr>
+          <a:xfrm>
+            <a:off x="628650" y="1395080"/>
+            <a:ext cx="8515350" cy="4916819"/>
+          </a:xfrm>
+        </p:spPr>
+        <p:txBody>
+          <a:bodyPr>
+            <a:normAutofit/>
+          </a:bodyPr>
+          <a:lstStyle/>
+          <a:p>
+            <a:r>
+              <a:rPr lang="en-US" dirty="0" smtClean="0"/>
+              <a:t>Block comments parse incorrectly in some cases</a:t>
+            </a:r>
+          </a:p>
+          <a:p>
+            <a:pPr lvl="1"/>
+            <a:r>
+              <a:rPr lang="en-US" sz="2800" dirty="0" smtClean="0">
+                <a:ea typeface="Courier New" charset="0"/>
+                <a:cs typeface="Courier New" charset="0"/>
+              </a:rPr>
+              <a:t>2 LOD, 1 LOC</a:t>
+            </a:r>
+            <a:r>
+              <a:rPr lang="en-US" sz="3200" dirty="0">
+                <a:latin typeface="Courier New" charset="0"/>
+                <a:ea typeface="Courier New" charset="0"/>
+                <a:cs typeface="Courier New" charset="0"/>
+              </a:rPr>
+              <a:t/>
+            </a:r>
+            <a:br>
+              <a:rPr lang="en-US" sz="3200" dirty="0">
+                <a:latin typeface="Courier New" charset="0"/>
+                <a:ea typeface="Courier New" charset="0"/>
+                <a:cs typeface="Courier New" charset="0"/>
+              </a:rPr>
+            </a:br>
+            <a:r>
+              <a:rPr lang="en-US" sz="3200" dirty="0" smtClean="0">
+                <a:latin typeface="Courier New" charset="0"/>
+                <a:ea typeface="Courier New" charset="0"/>
+                <a:cs typeface="Courier New" charset="0"/>
+              </a:rPr>
+              <a:t>/*comment*/</a:t>
+            </a:r>
+            <a:br>
+              <a:rPr lang="en-US" sz="3200" dirty="0" smtClean="0">
+                <a:latin typeface="Courier New" charset="0"/>
+                <a:ea typeface="Courier New" charset="0"/>
+                <a:cs typeface="Courier New" charset="0"/>
+              </a:rPr>
+            </a:br>
+            <a:r>
+              <a:rPr lang="en-US" sz="3200" dirty="0" smtClean="0">
+                <a:latin typeface="Courier New" charset="0"/>
+                <a:ea typeface="Courier New" charset="0"/>
+                <a:cs typeface="Courier New" charset="0"/>
+              </a:rPr>
+              <a:t>code</a:t>
+            </a:r>
+            <a:br>
+              <a:rPr lang="en-US" sz="3200" dirty="0" smtClean="0">
+                <a:latin typeface="Courier New" charset="0"/>
+                <a:ea typeface="Courier New" charset="0"/>
+                <a:cs typeface="Courier New" charset="0"/>
+              </a:rPr>
+            </a:br>
+            <a:r>
+              <a:rPr lang="en-US" sz="3200" dirty="0" smtClean="0">
+                <a:latin typeface="Courier New" charset="0"/>
+                <a:ea typeface="Courier New" charset="0"/>
+                <a:cs typeface="Courier New" charset="0"/>
+              </a:rPr>
+              <a:t>/*comment*/</a:t>
+            </a:r>
+          </a:p>
+          <a:p>
+            <a:pPr lvl="1"/>
+            <a:r>
+              <a:rPr lang="en-US" sz="2800" dirty="0" smtClean="0">
+                <a:ea typeface="Courier New" charset="0"/>
+                <a:cs typeface="Courier New" charset="0"/>
+              </a:rPr>
+              <a:t>3 LOD, 0 LOC</a:t>
+            </a:r>
+            <a:r>
+              <a:rPr lang="en-US" sz="3200" dirty="0" smtClean="0">
+                <a:latin typeface="Courier New" charset="0"/>
+                <a:ea typeface="Courier New" charset="0"/>
+                <a:cs typeface="Courier New" charset="0"/>
+              </a:rPr>
+              <a:t/>
+            </a:r>
+            <a:br>
+              <a:rPr lang="en-US" sz="3200" dirty="0" smtClean="0">
+                <a:latin typeface="Courier New" charset="0"/>
+                <a:ea typeface="Courier New" charset="0"/>
+                <a:cs typeface="Courier New" charset="0"/>
+              </a:rPr>
+            </a:br>
+            <a:r>
+              <a:rPr lang="en-US" sz="3200" dirty="0" smtClean="0">
+                <a:latin typeface="Courier New" charset="0"/>
+                <a:ea typeface="Courier New" charset="0"/>
+                <a:cs typeface="Courier New" charset="0"/>
+              </a:rPr>
+              <a:t>/*comment**/</a:t>
+            </a:r>
+            <a:br>
+              <a:rPr lang="en-US" sz="3200" dirty="0" smtClean="0">
+                <a:latin typeface="Courier New" charset="0"/>
+                <a:ea typeface="Courier New" charset="0"/>
+                <a:cs typeface="Courier New" charset="0"/>
+              </a:rPr>
+            </a:br>
+            <a:r>
+              <a:rPr lang="en-US" sz="3200" dirty="0" smtClean="0">
+                <a:latin typeface="Courier New" charset="0"/>
+                <a:ea typeface="Courier New" charset="0"/>
+                <a:cs typeface="Courier New" charset="0"/>
+              </a:rPr>
+              <a:t>code</a:t>
+            </a:r>
+            <a:br>
+              <a:rPr lang="en-US" sz="3200" dirty="0" smtClean="0">
+                <a:latin typeface="Courier New" charset="0"/>
+                <a:ea typeface="Courier New" charset="0"/>
+                <a:cs typeface="Courier New" charset="0"/>
+              </a:rPr>
+            </a:br>
+            <a:r>
+              <a:rPr lang="en-US" sz="3200" dirty="0" smtClean="0">
+                <a:latin typeface="Courier New" charset="0"/>
+                <a:ea typeface="Courier New" charset="0"/>
+                <a:cs typeface="Courier New" charset="0"/>
+              </a:rPr>
+              <a:t>/*comment*/</a:t>
+            </a:r>
+          </a:p>
+          <a:p>
+            <a:r>
+              <a:rPr lang="en-US" dirty="0" smtClean="0">
+                <a:ea typeface="Courier New" charset="0"/>
+                <a:cs typeface="Courier New" charset="0"/>
+              </a:rPr>
+              <a:t>Reason: Lex doesn’t support negative look-ahead regex</a:t>
+            </a:r>
+            <a:endParaRPr lang="en-US" dirty="0">
+              <a:ea typeface="Courier New" charset="0"/>
+              <a:cs typeface="Courier New" charset="0"/>
+            </a:endParaRPr>
+          </a:p>
+        </p:txBody>
+      </p:sp>
+      <p:sp>
+        <p:nvSpPr>
+          <p:cNvPr id="4" name="TextBox 3"/>
+          <p:cNvSpPr txBox="1"/>
+          <p:nvPr/>
+        </p:nvSpPr>
+        <p:spPr>
+          <a:xfrm>
+            <a:off x="0" y="6311899"/>
+            <a:ext cx="1744717" cy="461665"/>
+          </a:xfrm>
+          <a:prstGeom prst="rect">
+            <a:avLst/>
+          </a:prstGeom>
+          <a:noFill/>
+        </p:spPr>
+        <p:txBody>
+          <a:bodyPr wrap="square" rtlCol="0">
+            <a:spAutoFit/>
+          </a:bodyPr>
+          <a:lstStyle/>
+          <a:p>
+            <a:r>
+              <a:rPr lang="en-US" sz="2400" dirty="0" smtClean="0">
+                <a:solidFill>
+                  <a:schemeClr val="bg1"/>
+                </a:solidFill>
+              </a:rPr>
+              <a:t>ID-10-T</a:t>
+            </a:r>
+            <a:endParaRPr lang="en-US" sz="2400" dirty="0">
+              <a:solidFill>
+                <a:schemeClr val="bg1"/>
+              </a:solidFill>
+            </a:endParaRPr>
+          </a:p>
+        </p:txBody>
+      </p:sp>
+      <p:sp>
+        <p:nvSpPr>
+          <p:cNvPr id="5" name="TextBox 4"/>
+          <p:cNvSpPr txBox="1"/>
+          <p:nvPr/>
+        </p:nvSpPr>
+        <p:spPr>
+          <a:xfrm>
+            <a:off x="4267200" y="6311899"/>
+            <a:ext cx="4876800" cy="461665"/>
+          </a:xfrm>
+          <a:prstGeom prst="rect">
+            <a:avLst/>
+          </a:prstGeom>
+          <a:noFill/>
+        </p:spPr>
+        <p:txBody>
+          <a:bodyPr wrap="square" rtlCol="0">
+            <a:spAutoFit/>
+          </a:bodyPr>
+          <a:lstStyle/>
+          <a:p>
+            <a:r>
+              <a:rPr lang="en-US" sz="2400" dirty="0" smtClean="0">
+                <a:solidFill>
+                  <a:schemeClr val="bg1"/>
+                </a:solidFill>
+              </a:rPr>
+              <a:t>Software Metrics Calculation System</a:t>
+            </a:r>
+            <a:endParaRPr lang="en-US" sz="2400" dirty="0">
+              <a:solidFill>
+                <a:schemeClr val="bg1"/>
+              </a:solidFill>
+            </a:endParaRPr>
+          </a:p>
+        </p:txBody>
+      </p:sp>
+    </p:spTree>
+    <p:extLst>
+      <p:ext uri="{BB962C8B-B14F-4D97-AF65-F5344CB8AC3E}">
+        <p14:creationId xmlns:p14="http://schemas.microsoft.com/office/powerpoint/2010/main" val="99638203"/>
+      </p:ext>
+    </p:extLst>
+  </p:cSld>
+  <p:clrMapOvr>
+    <a:masterClrMapping/>
+  </p:clrMapOvr>
+  <p:timing>
+    <p:tnLst>
+      <p:par>
+        <p:cTn id="1" dur="indefinite" restart="never" nodeType="tmRoot"/>
+      </p:par>
+    </p:tnLst>
+  </p:timing>
+</p:sld>
+</file>
+
+<file path=ppt/slides/slide12.xml><?xml version="1.0" encoding="utf-8"?>
 <p:sld xmlns:a="http://schemas.openxmlformats.org/drawingml/2006/main" xmlns:r="http://schemas.openxmlformats.org/officeDocument/2006/relationships" xmlns:p="http://schemas.openxmlformats.org/presentationml/2006/main">
   <p:cSld>
     <p:spTree>
@@ -5487,7 +5792,7 @@
 </p:sld>
 </file>
 
-<file path=ppt/slides/slide12.xml><?xml version="1.0" encoding="utf-8"?>
+<file path=ppt/slides/slide13.xml><?xml version="1.0" encoding="utf-8"?>
 <p:sld xmlns:a="http://schemas.openxmlformats.org/drawingml/2006/main" xmlns:r="http://schemas.openxmlformats.org/officeDocument/2006/relationships" xmlns:p="http://schemas.openxmlformats.org/presentationml/2006/main">
   <p:cSld>
     <p:spTree>
@@ -5849,7 +6154,7 @@
 </p:sld>
 </file>
 
-<file path=ppt/slides/slide13.xml><?xml version="1.0" encoding="utf-8"?>
+<file path=ppt/slides/slide14.xml><?xml version="1.0" encoding="utf-8"?>
 <p:sld xmlns:a="http://schemas.openxmlformats.org/drawingml/2006/main" xmlns:r="http://schemas.openxmlformats.org/officeDocument/2006/relationships" xmlns:p="http://schemas.openxmlformats.org/presentationml/2006/main">
   <p:cSld>
     <p:spTree>
@@ -6120,7 +6425,7 @@
 </p:sld>
 </file>
 
-<file path=ppt/slides/slide14.xml><?xml version="1.0" encoding="utf-8"?>
+<file path=ppt/slides/slide15.xml><?xml version="1.0" encoding="utf-8"?>
 <p:sld xmlns:a="http://schemas.openxmlformats.org/drawingml/2006/main" xmlns:r="http://schemas.openxmlformats.org/officeDocument/2006/relationships" xmlns:p="http://schemas.openxmlformats.org/presentationml/2006/main">
   <p:cSld>
     <p:spTree>
@@ -6285,7 +6590,7 @@
 </p:sld>
 </file>
 
-<file path=ppt/slides/slide15.xml><?xml version="1.0" encoding="utf-8"?>
+<file path=ppt/slides/slide16.xml><?xml version="1.0" encoding="utf-8"?>
 <p:sld xmlns:a="http://schemas.openxmlformats.org/drawingml/2006/main" xmlns:r="http://schemas.openxmlformats.org/officeDocument/2006/relationships" xmlns:p="http://schemas.openxmlformats.org/presentationml/2006/main">
   <p:cSld>
     <p:spTree>
@@ -8341,7 +8646,7 @@
                 <a:latin typeface="Courier New" panose="02070309020205020404" pitchFamily="49" charset="0"/>
                 <a:cs typeface="Courier New" panose="02070309020205020404" pitchFamily="49" charset="0"/>
               </a:rPr>
-              <a:t>...</a:t>
+              <a:t>	...</a:t>
             </a:r>
             <a:endParaRPr lang="en-US" sz="1400" dirty="0">
               <a:latin typeface="Courier New" panose="02070309020205020404" pitchFamily="49" charset="0"/>

</xml_diff>